<commit_message>
am modificat prezentarea pentru a reprezenta fasiile de imagine sub forma unui semnal grafic si tipul de functie de procesare
</commit_message>
<xml_diff>
--- a/presentation/Cristofor_Rotsching_AAC2_Harta_particule_elementare.pptx
+++ b/presentation/Cristofor_Rotsching_AAC2_Harta_particule_elementare.pptx
@@ -19,6 +19,8 @@
     <p:sldId id="264" r:id="rId14"/>
     <p:sldId id="265" r:id="rId15"/>
     <p:sldId id="266" r:id="rId16"/>
+    <p:sldId id="267" r:id="rId17"/>
+    <p:sldId id="268" r:id="rId18"/>
   </p:sldIdLst>
   <p:sldSz cx="13004800" cy="9753600"/>
   <p:notesSz cx="7559675" cy="10691812"/>
@@ -88,10 +90,8 @@
             <a:noAutofit/>
           </a:bodyPr>
           <a:p>
-            <a:endParaRPr b="0" lang="en-US" sz="1800" spc="-1" strike="noStrike">
-              <a:solidFill>
-                <a:srgbClr val="000000"/>
-              </a:solidFill>
+            <a:pPr algn="ctr"/>
+            <a:endParaRPr b="0" lang="en-US" sz="4400" spc="-1" strike="noStrike">
               <a:latin typeface="Arial"/>
             </a:endParaRPr>
           </a:p>
@@ -121,10 +121,7 @@
             <a:normAutofit/>
           </a:bodyPr>
           <a:p>
-            <a:endParaRPr b="0" lang="en-US" sz="2800" spc="-1" strike="noStrike">
-              <a:solidFill>
-                <a:srgbClr val="000000"/>
-              </a:solidFill>
+            <a:endParaRPr b="0" lang="en-US" sz="3200" spc="-1" strike="noStrike">
               <a:latin typeface="Arial"/>
             </a:endParaRPr>
           </a:p>
@@ -154,10 +151,7 @@
             <a:normAutofit/>
           </a:bodyPr>
           <a:p>
-            <a:endParaRPr b="0" lang="en-US" sz="2800" spc="-1" strike="noStrike">
-              <a:solidFill>
-                <a:srgbClr val="000000"/>
-              </a:solidFill>
+            <a:endParaRPr b="0" lang="en-US" sz="3200" spc="-1" strike="noStrike">
               <a:latin typeface="Arial"/>
             </a:endParaRPr>
           </a:p>
@@ -209,10 +203,8 @@
             <a:noAutofit/>
           </a:bodyPr>
           <a:p>
-            <a:endParaRPr b="0" lang="en-US" sz="1800" spc="-1" strike="noStrike">
-              <a:solidFill>
-                <a:srgbClr val="000000"/>
-              </a:solidFill>
+            <a:pPr algn="ctr"/>
+            <a:endParaRPr b="0" lang="en-US" sz="4400" spc="-1" strike="noStrike">
               <a:latin typeface="Arial"/>
             </a:endParaRPr>
           </a:p>
@@ -242,10 +234,7 @@
             <a:normAutofit/>
           </a:bodyPr>
           <a:p>
-            <a:endParaRPr b="0" lang="en-US" sz="2800" spc="-1" strike="noStrike">
-              <a:solidFill>
-                <a:srgbClr val="000000"/>
-              </a:solidFill>
+            <a:endParaRPr b="0" lang="en-US" sz="3200" spc="-1" strike="noStrike">
               <a:latin typeface="Arial"/>
             </a:endParaRPr>
           </a:p>
@@ -275,10 +264,7 @@
             <a:normAutofit/>
           </a:bodyPr>
           <a:p>
-            <a:endParaRPr b="0" lang="en-US" sz="2800" spc="-1" strike="noStrike">
-              <a:solidFill>
-                <a:srgbClr val="000000"/>
-              </a:solidFill>
+            <a:endParaRPr b="0" lang="en-US" sz="3200" spc="-1" strike="noStrike">
               <a:latin typeface="Arial"/>
             </a:endParaRPr>
           </a:p>
@@ -308,10 +294,7 @@
             <a:normAutofit/>
           </a:bodyPr>
           <a:p>
-            <a:endParaRPr b="0" lang="en-US" sz="2800" spc="-1" strike="noStrike">
-              <a:solidFill>
-                <a:srgbClr val="000000"/>
-              </a:solidFill>
+            <a:endParaRPr b="0" lang="en-US" sz="3200" spc="-1" strike="noStrike">
               <a:latin typeface="Arial"/>
             </a:endParaRPr>
           </a:p>
@@ -341,10 +324,7 @@
             <a:normAutofit/>
           </a:bodyPr>
           <a:p>
-            <a:endParaRPr b="0" lang="en-US" sz="2800" spc="-1" strike="noStrike">
-              <a:solidFill>
-                <a:srgbClr val="000000"/>
-              </a:solidFill>
+            <a:endParaRPr b="0" lang="en-US" sz="3200" spc="-1" strike="noStrike">
               <a:latin typeface="Arial"/>
             </a:endParaRPr>
           </a:p>
@@ -396,10 +376,8 @@
             <a:noAutofit/>
           </a:bodyPr>
           <a:p>
-            <a:endParaRPr b="0" lang="en-US" sz="1800" spc="-1" strike="noStrike">
-              <a:solidFill>
-                <a:srgbClr val="000000"/>
-              </a:solidFill>
+            <a:pPr algn="ctr"/>
+            <a:endParaRPr b="0" lang="en-US" sz="4400" spc="-1" strike="noStrike">
               <a:latin typeface="Arial"/>
             </a:endParaRPr>
           </a:p>
@@ -429,10 +407,7 @@
             <a:normAutofit/>
           </a:bodyPr>
           <a:p>
-            <a:endParaRPr b="0" lang="en-US" sz="2800" spc="-1" strike="noStrike">
-              <a:solidFill>
-                <a:srgbClr val="000000"/>
-              </a:solidFill>
+            <a:endParaRPr b="0" lang="en-US" sz="3200" spc="-1" strike="noStrike">
               <a:latin typeface="Arial"/>
             </a:endParaRPr>
           </a:p>
@@ -462,10 +437,7 @@
             <a:normAutofit/>
           </a:bodyPr>
           <a:p>
-            <a:endParaRPr b="0" lang="en-US" sz="2800" spc="-1" strike="noStrike">
-              <a:solidFill>
-                <a:srgbClr val="000000"/>
-              </a:solidFill>
+            <a:endParaRPr b="0" lang="en-US" sz="3200" spc="-1" strike="noStrike">
               <a:latin typeface="Arial"/>
             </a:endParaRPr>
           </a:p>
@@ -495,10 +467,7 @@
             <a:normAutofit/>
           </a:bodyPr>
           <a:p>
-            <a:endParaRPr b="0" lang="en-US" sz="2800" spc="-1" strike="noStrike">
-              <a:solidFill>
-                <a:srgbClr val="000000"/>
-              </a:solidFill>
+            <a:endParaRPr b="0" lang="en-US" sz="3200" spc="-1" strike="noStrike">
               <a:latin typeface="Arial"/>
             </a:endParaRPr>
           </a:p>
@@ -528,10 +497,7 @@
             <a:normAutofit/>
           </a:bodyPr>
           <a:p>
-            <a:endParaRPr b="0" lang="en-US" sz="2800" spc="-1" strike="noStrike">
-              <a:solidFill>
-                <a:srgbClr val="000000"/>
-              </a:solidFill>
+            <a:endParaRPr b="0" lang="en-US" sz="3200" spc="-1" strike="noStrike">
               <a:latin typeface="Arial"/>
             </a:endParaRPr>
           </a:p>
@@ -561,10 +527,7 @@
             <a:normAutofit/>
           </a:bodyPr>
           <a:p>
-            <a:endParaRPr b="0" lang="en-US" sz="2800" spc="-1" strike="noStrike">
-              <a:solidFill>
-                <a:srgbClr val="000000"/>
-              </a:solidFill>
+            <a:endParaRPr b="0" lang="en-US" sz="3200" spc="-1" strike="noStrike">
               <a:latin typeface="Arial"/>
             </a:endParaRPr>
           </a:p>
@@ -594,10 +557,7 @@
             <a:normAutofit/>
           </a:bodyPr>
           <a:p>
-            <a:endParaRPr b="0" lang="en-US" sz="2800" spc="-1" strike="noStrike">
-              <a:solidFill>
-                <a:srgbClr val="000000"/>
-              </a:solidFill>
+            <a:endParaRPr b="0" lang="en-US" sz="3200" spc="-1" strike="noStrike">
               <a:latin typeface="Arial"/>
             </a:endParaRPr>
           </a:p>
@@ -671,10 +631,8 @@
             <a:noAutofit/>
           </a:bodyPr>
           <a:p>
-            <a:endParaRPr b="0" lang="en-US" sz="1800" spc="-1" strike="noStrike">
-              <a:solidFill>
-                <a:srgbClr val="000000"/>
-              </a:solidFill>
+            <a:pPr algn="ctr"/>
+            <a:endParaRPr b="0" lang="en-US" sz="4400" spc="-1" strike="noStrike">
               <a:latin typeface="Arial"/>
             </a:endParaRPr>
           </a:p>
@@ -757,10 +715,8 @@
             <a:noAutofit/>
           </a:bodyPr>
           <a:p>
-            <a:endParaRPr b="0" lang="en-US" sz="1800" spc="-1" strike="noStrike">
-              <a:solidFill>
-                <a:srgbClr val="000000"/>
-              </a:solidFill>
+            <a:pPr algn="ctr"/>
+            <a:endParaRPr b="0" lang="en-US" sz="4400" spc="-1" strike="noStrike">
               <a:latin typeface="Arial"/>
             </a:endParaRPr>
           </a:p>
@@ -790,10 +746,7 @@
             <a:normAutofit/>
           </a:bodyPr>
           <a:p>
-            <a:endParaRPr b="0" lang="en-US" sz="2800" spc="-1" strike="noStrike">
-              <a:solidFill>
-                <a:srgbClr val="000000"/>
-              </a:solidFill>
+            <a:endParaRPr b="0" lang="en-US" sz="3200" spc="-1" strike="noStrike">
               <a:latin typeface="Arial"/>
             </a:endParaRPr>
           </a:p>
@@ -845,10 +798,8 @@
             <a:noAutofit/>
           </a:bodyPr>
           <a:p>
-            <a:endParaRPr b="0" lang="en-US" sz="1800" spc="-1" strike="noStrike">
-              <a:solidFill>
-                <a:srgbClr val="000000"/>
-              </a:solidFill>
+            <a:pPr algn="ctr"/>
+            <a:endParaRPr b="0" lang="en-US" sz="4400" spc="-1" strike="noStrike">
               <a:latin typeface="Arial"/>
             </a:endParaRPr>
           </a:p>
@@ -878,10 +829,7 @@
             <a:normAutofit/>
           </a:bodyPr>
           <a:p>
-            <a:endParaRPr b="0" lang="en-US" sz="2800" spc="-1" strike="noStrike">
-              <a:solidFill>
-                <a:srgbClr val="000000"/>
-              </a:solidFill>
+            <a:endParaRPr b="0" lang="en-US" sz="3200" spc="-1" strike="noStrike">
               <a:latin typeface="Arial"/>
             </a:endParaRPr>
           </a:p>
@@ -911,10 +859,7 @@
             <a:normAutofit/>
           </a:bodyPr>
           <a:p>
-            <a:endParaRPr b="0" lang="en-US" sz="2800" spc="-1" strike="noStrike">
-              <a:solidFill>
-                <a:srgbClr val="000000"/>
-              </a:solidFill>
+            <a:endParaRPr b="0" lang="en-US" sz="3200" spc="-1" strike="noStrike">
               <a:latin typeface="Arial"/>
             </a:endParaRPr>
           </a:p>
@@ -966,10 +911,8 @@
             <a:noAutofit/>
           </a:bodyPr>
           <a:p>
-            <a:endParaRPr b="0" lang="en-US" sz="1800" spc="-1" strike="noStrike">
-              <a:solidFill>
-                <a:srgbClr val="000000"/>
-              </a:solidFill>
+            <a:pPr algn="ctr"/>
+            <a:endParaRPr b="0" lang="en-US" sz="4400" spc="-1" strike="noStrike">
               <a:latin typeface="Arial"/>
             </a:endParaRPr>
           </a:p>
@@ -1074,10 +1017,8 @@
             <a:noAutofit/>
           </a:bodyPr>
           <a:p>
-            <a:endParaRPr b="0" lang="en-US" sz="1800" spc="-1" strike="noStrike">
-              <a:solidFill>
-                <a:srgbClr val="000000"/>
-              </a:solidFill>
+            <a:pPr algn="ctr"/>
+            <a:endParaRPr b="0" lang="en-US" sz="4400" spc="-1" strike="noStrike">
               <a:latin typeface="Arial"/>
             </a:endParaRPr>
           </a:p>
@@ -1107,10 +1048,7 @@
             <a:normAutofit/>
           </a:bodyPr>
           <a:p>
-            <a:endParaRPr b="0" lang="en-US" sz="2800" spc="-1" strike="noStrike">
-              <a:solidFill>
-                <a:srgbClr val="000000"/>
-              </a:solidFill>
+            <a:endParaRPr b="0" lang="en-US" sz="3200" spc="-1" strike="noStrike">
               <a:latin typeface="Arial"/>
             </a:endParaRPr>
           </a:p>
@@ -1140,10 +1078,7 @@
             <a:normAutofit/>
           </a:bodyPr>
           <a:p>
-            <a:endParaRPr b="0" lang="en-US" sz="2800" spc="-1" strike="noStrike">
-              <a:solidFill>
-                <a:srgbClr val="000000"/>
-              </a:solidFill>
+            <a:endParaRPr b="0" lang="en-US" sz="3200" spc="-1" strike="noStrike">
               <a:latin typeface="Arial"/>
             </a:endParaRPr>
           </a:p>
@@ -1173,10 +1108,7 @@
             <a:normAutofit/>
           </a:bodyPr>
           <a:p>
-            <a:endParaRPr b="0" lang="en-US" sz="2800" spc="-1" strike="noStrike">
-              <a:solidFill>
-                <a:srgbClr val="000000"/>
-              </a:solidFill>
+            <a:endParaRPr b="0" lang="en-US" sz="3200" spc="-1" strike="noStrike">
               <a:latin typeface="Arial"/>
             </a:endParaRPr>
           </a:p>
@@ -1228,10 +1160,8 @@
             <a:noAutofit/>
           </a:bodyPr>
           <a:p>
-            <a:endParaRPr b="0" lang="en-US" sz="1800" spc="-1" strike="noStrike">
-              <a:solidFill>
-                <a:srgbClr val="000000"/>
-              </a:solidFill>
+            <a:pPr algn="ctr"/>
+            <a:endParaRPr b="0" lang="en-US" sz="4400" spc="-1" strike="noStrike">
               <a:latin typeface="Arial"/>
             </a:endParaRPr>
           </a:p>
@@ -1314,10 +1244,8 @@
             <a:noAutofit/>
           </a:bodyPr>
           <a:p>
-            <a:endParaRPr b="0" lang="en-US" sz="1800" spc="-1" strike="noStrike">
-              <a:solidFill>
-                <a:srgbClr val="000000"/>
-              </a:solidFill>
+            <a:pPr algn="ctr"/>
+            <a:endParaRPr b="0" lang="en-US" sz="4400" spc="-1" strike="noStrike">
               <a:latin typeface="Arial"/>
             </a:endParaRPr>
           </a:p>
@@ -1347,10 +1275,7 @@
             <a:normAutofit/>
           </a:bodyPr>
           <a:p>
-            <a:endParaRPr b="0" lang="en-US" sz="2800" spc="-1" strike="noStrike">
-              <a:solidFill>
-                <a:srgbClr val="000000"/>
-              </a:solidFill>
+            <a:endParaRPr b="0" lang="en-US" sz="3200" spc="-1" strike="noStrike">
               <a:latin typeface="Arial"/>
             </a:endParaRPr>
           </a:p>
@@ -1380,10 +1305,7 @@
             <a:normAutofit/>
           </a:bodyPr>
           <a:p>
-            <a:endParaRPr b="0" lang="en-US" sz="2800" spc="-1" strike="noStrike">
-              <a:solidFill>
-                <a:srgbClr val="000000"/>
-              </a:solidFill>
+            <a:endParaRPr b="0" lang="en-US" sz="3200" spc="-1" strike="noStrike">
               <a:latin typeface="Arial"/>
             </a:endParaRPr>
           </a:p>
@@ -1413,10 +1335,7 @@
             <a:normAutofit/>
           </a:bodyPr>
           <a:p>
-            <a:endParaRPr b="0" lang="en-US" sz="2800" spc="-1" strike="noStrike">
-              <a:solidFill>
-                <a:srgbClr val="000000"/>
-              </a:solidFill>
+            <a:endParaRPr b="0" lang="en-US" sz="3200" spc="-1" strike="noStrike">
               <a:latin typeface="Arial"/>
             </a:endParaRPr>
           </a:p>
@@ -1468,10 +1387,8 @@
             <a:noAutofit/>
           </a:bodyPr>
           <a:p>
-            <a:endParaRPr b="0" lang="en-US" sz="1800" spc="-1" strike="noStrike">
-              <a:solidFill>
-                <a:srgbClr val="000000"/>
-              </a:solidFill>
+            <a:pPr algn="ctr"/>
+            <a:endParaRPr b="0" lang="en-US" sz="4400" spc="-1" strike="noStrike">
               <a:latin typeface="Arial"/>
             </a:endParaRPr>
           </a:p>
@@ -1501,10 +1418,7 @@
             <a:normAutofit/>
           </a:bodyPr>
           <a:p>
-            <a:endParaRPr b="0" lang="en-US" sz="2800" spc="-1" strike="noStrike">
-              <a:solidFill>
-                <a:srgbClr val="000000"/>
-              </a:solidFill>
+            <a:endParaRPr b="0" lang="en-US" sz="3200" spc="-1" strike="noStrike">
               <a:latin typeface="Arial"/>
             </a:endParaRPr>
           </a:p>
@@ -1534,10 +1448,7 @@
             <a:normAutofit/>
           </a:bodyPr>
           <a:p>
-            <a:endParaRPr b="0" lang="en-US" sz="2800" spc="-1" strike="noStrike">
-              <a:solidFill>
-                <a:srgbClr val="000000"/>
-              </a:solidFill>
+            <a:endParaRPr b="0" lang="en-US" sz="3200" spc="-1" strike="noStrike">
               <a:latin typeface="Arial"/>
             </a:endParaRPr>
           </a:p>
@@ -1567,10 +1478,7 @@
             <a:normAutofit/>
           </a:bodyPr>
           <a:p>
-            <a:endParaRPr b="0" lang="en-US" sz="2800" spc="-1" strike="noStrike">
-              <a:solidFill>
-                <a:srgbClr val="000000"/>
-              </a:solidFill>
+            <a:endParaRPr b="0" lang="en-US" sz="3200" spc="-1" strike="noStrike">
               <a:latin typeface="Arial"/>
             </a:endParaRPr>
           </a:p>
@@ -1622,10 +1530,8 @@
             <a:noAutofit/>
           </a:bodyPr>
           <a:p>
-            <a:endParaRPr b="0" lang="en-US" sz="1800" spc="-1" strike="noStrike">
-              <a:solidFill>
-                <a:srgbClr val="000000"/>
-              </a:solidFill>
+            <a:pPr algn="ctr"/>
+            <a:endParaRPr b="0" lang="en-US" sz="4400" spc="-1" strike="noStrike">
               <a:latin typeface="Arial"/>
             </a:endParaRPr>
           </a:p>
@@ -1655,10 +1561,7 @@
             <a:normAutofit/>
           </a:bodyPr>
           <a:p>
-            <a:endParaRPr b="0" lang="en-US" sz="2800" spc="-1" strike="noStrike">
-              <a:solidFill>
-                <a:srgbClr val="000000"/>
-              </a:solidFill>
+            <a:endParaRPr b="0" lang="en-US" sz="3200" spc="-1" strike="noStrike">
               <a:latin typeface="Arial"/>
             </a:endParaRPr>
           </a:p>
@@ -1688,10 +1591,7 @@
             <a:normAutofit/>
           </a:bodyPr>
           <a:p>
-            <a:endParaRPr b="0" lang="en-US" sz="2800" spc="-1" strike="noStrike">
-              <a:solidFill>
-                <a:srgbClr val="000000"/>
-              </a:solidFill>
+            <a:endParaRPr b="0" lang="en-US" sz="3200" spc="-1" strike="noStrike">
               <a:latin typeface="Arial"/>
             </a:endParaRPr>
           </a:p>
@@ -1743,10 +1643,8 @@
             <a:noAutofit/>
           </a:bodyPr>
           <a:p>
-            <a:endParaRPr b="0" lang="en-US" sz="1800" spc="-1" strike="noStrike">
-              <a:solidFill>
-                <a:srgbClr val="000000"/>
-              </a:solidFill>
+            <a:pPr algn="ctr"/>
+            <a:endParaRPr b="0" lang="en-US" sz="4400" spc="-1" strike="noStrike">
               <a:latin typeface="Arial"/>
             </a:endParaRPr>
           </a:p>
@@ -1776,10 +1674,7 @@
             <a:normAutofit/>
           </a:bodyPr>
           <a:p>
-            <a:endParaRPr b="0" lang="en-US" sz="2800" spc="-1" strike="noStrike">
-              <a:solidFill>
-                <a:srgbClr val="000000"/>
-              </a:solidFill>
+            <a:endParaRPr b="0" lang="en-US" sz="3200" spc="-1" strike="noStrike">
               <a:latin typeface="Arial"/>
             </a:endParaRPr>
           </a:p>
@@ -1809,10 +1704,7 @@
             <a:normAutofit/>
           </a:bodyPr>
           <a:p>
-            <a:endParaRPr b="0" lang="en-US" sz="2800" spc="-1" strike="noStrike">
-              <a:solidFill>
-                <a:srgbClr val="000000"/>
-              </a:solidFill>
+            <a:endParaRPr b="0" lang="en-US" sz="3200" spc="-1" strike="noStrike">
               <a:latin typeface="Arial"/>
             </a:endParaRPr>
           </a:p>
@@ -1842,10 +1734,7 @@
             <a:normAutofit/>
           </a:bodyPr>
           <a:p>
-            <a:endParaRPr b="0" lang="en-US" sz="2800" spc="-1" strike="noStrike">
-              <a:solidFill>
-                <a:srgbClr val="000000"/>
-              </a:solidFill>
+            <a:endParaRPr b="0" lang="en-US" sz="3200" spc="-1" strike="noStrike">
               <a:latin typeface="Arial"/>
             </a:endParaRPr>
           </a:p>
@@ -1875,10 +1764,7 @@
             <a:normAutofit/>
           </a:bodyPr>
           <a:p>
-            <a:endParaRPr b="0" lang="en-US" sz="2800" spc="-1" strike="noStrike">
-              <a:solidFill>
-                <a:srgbClr val="000000"/>
-              </a:solidFill>
+            <a:endParaRPr b="0" lang="en-US" sz="3200" spc="-1" strike="noStrike">
               <a:latin typeface="Arial"/>
             </a:endParaRPr>
           </a:p>
@@ -1930,10 +1816,8 @@
             <a:noAutofit/>
           </a:bodyPr>
           <a:p>
-            <a:endParaRPr b="0" lang="en-US" sz="1800" spc="-1" strike="noStrike">
-              <a:solidFill>
-                <a:srgbClr val="000000"/>
-              </a:solidFill>
+            <a:pPr algn="ctr"/>
+            <a:endParaRPr b="0" lang="en-US" sz="4400" spc="-1" strike="noStrike">
               <a:latin typeface="Arial"/>
             </a:endParaRPr>
           </a:p>
@@ -1963,10 +1847,7 @@
             <a:normAutofit/>
           </a:bodyPr>
           <a:p>
-            <a:endParaRPr b="0" lang="en-US" sz="2800" spc="-1" strike="noStrike">
-              <a:solidFill>
-                <a:srgbClr val="000000"/>
-              </a:solidFill>
+            <a:endParaRPr b="0" lang="en-US" sz="3200" spc="-1" strike="noStrike">
               <a:latin typeface="Arial"/>
             </a:endParaRPr>
           </a:p>
@@ -1996,10 +1877,7 @@
             <a:normAutofit/>
           </a:bodyPr>
           <a:p>
-            <a:endParaRPr b="0" lang="en-US" sz="2800" spc="-1" strike="noStrike">
-              <a:solidFill>
-                <a:srgbClr val="000000"/>
-              </a:solidFill>
+            <a:endParaRPr b="0" lang="en-US" sz="3200" spc="-1" strike="noStrike">
               <a:latin typeface="Arial"/>
             </a:endParaRPr>
           </a:p>
@@ -2029,10 +1907,7 @@
             <a:normAutofit/>
           </a:bodyPr>
           <a:p>
-            <a:endParaRPr b="0" lang="en-US" sz="2800" spc="-1" strike="noStrike">
-              <a:solidFill>
-                <a:srgbClr val="000000"/>
-              </a:solidFill>
+            <a:endParaRPr b="0" lang="en-US" sz="3200" spc="-1" strike="noStrike">
               <a:latin typeface="Arial"/>
             </a:endParaRPr>
           </a:p>
@@ -2062,10 +1937,7 @@
             <a:normAutofit/>
           </a:bodyPr>
           <a:p>
-            <a:endParaRPr b="0" lang="en-US" sz="2800" spc="-1" strike="noStrike">
-              <a:solidFill>
-                <a:srgbClr val="000000"/>
-              </a:solidFill>
+            <a:endParaRPr b="0" lang="en-US" sz="3200" spc="-1" strike="noStrike">
               <a:latin typeface="Arial"/>
             </a:endParaRPr>
           </a:p>
@@ -2095,10 +1967,7 @@
             <a:normAutofit/>
           </a:bodyPr>
           <a:p>
-            <a:endParaRPr b="0" lang="en-US" sz="2800" spc="-1" strike="noStrike">
-              <a:solidFill>
-                <a:srgbClr val="000000"/>
-              </a:solidFill>
+            <a:endParaRPr b="0" lang="en-US" sz="3200" spc="-1" strike="noStrike">
               <a:latin typeface="Arial"/>
             </a:endParaRPr>
           </a:p>
@@ -2128,10 +1997,7 @@
             <a:normAutofit/>
           </a:bodyPr>
           <a:p>
-            <a:endParaRPr b="0" lang="en-US" sz="2800" spc="-1" strike="noStrike">
-              <a:solidFill>
-                <a:srgbClr val="000000"/>
-              </a:solidFill>
+            <a:endParaRPr b="0" lang="en-US" sz="3200" spc="-1" strike="noStrike">
               <a:latin typeface="Arial"/>
             </a:endParaRPr>
           </a:p>
@@ -2205,10 +2071,8 @@
             <a:noAutofit/>
           </a:bodyPr>
           <a:p>
-            <a:endParaRPr b="0" lang="en-US" sz="1800" spc="-1" strike="noStrike">
-              <a:solidFill>
-                <a:srgbClr val="000000"/>
-              </a:solidFill>
+            <a:pPr algn="ctr"/>
+            <a:endParaRPr b="0" lang="en-US" sz="4400" spc="-1" strike="noStrike">
               <a:latin typeface="Arial"/>
             </a:endParaRPr>
           </a:p>
@@ -2291,10 +2155,8 @@
             <a:noAutofit/>
           </a:bodyPr>
           <a:p>
-            <a:endParaRPr b="0" lang="en-US" sz="1800" spc="-1" strike="noStrike">
-              <a:solidFill>
-                <a:srgbClr val="000000"/>
-              </a:solidFill>
+            <a:pPr algn="ctr"/>
+            <a:endParaRPr b="0" lang="en-US" sz="4400" spc="-1" strike="noStrike">
               <a:latin typeface="Arial"/>
             </a:endParaRPr>
           </a:p>
@@ -2324,10 +2186,7 @@
             <a:normAutofit/>
           </a:bodyPr>
           <a:p>
-            <a:endParaRPr b="0" lang="en-US" sz="2800" spc="-1" strike="noStrike">
-              <a:solidFill>
-                <a:srgbClr val="000000"/>
-              </a:solidFill>
+            <a:endParaRPr b="0" lang="en-US" sz="3200" spc="-1" strike="noStrike">
               <a:latin typeface="Arial"/>
             </a:endParaRPr>
           </a:p>
@@ -2379,10 +2238,8 @@
             <a:noAutofit/>
           </a:bodyPr>
           <a:p>
-            <a:endParaRPr b="0" lang="en-US" sz="1800" spc="-1" strike="noStrike">
-              <a:solidFill>
-                <a:srgbClr val="000000"/>
-              </a:solidFill>
+            <a:pPr algn="ctr"/>
+            <a:endParaRPr b="0" lang="en-US" sz="4400" spc="-1" strike="noStrike">
               <a:latin typeface="Arial"/>
             </a:endParaRPr>
           </a:p>
@@ -2412,10 +2269,7 @@
             <a:normAutofit/>
           </a:bodyPr>
           <a:p>
-            <a:endParaRPr b="0" lang="en-US" sz="2800" spc="-1" strike="noStrike">
-              <a:solidFill>
-                <a:srgbClr val="000000"/>
-              </a:solidFill>
+            <a:endParaRPr b="0" lang="en-US" sz="3200" spc="-1" strike="noStrike">
               <a:latin typeface="Arial"/>
             </a:endParaRPr>
           </a:p>
@@ -2445,10 +2299,7 @@
             <a:normAutofit/>
           </a:bodyPr>
           <a:p>
-            <a:endParaRPr b="0" lang="en-US" sz="2800" spc="-1" strike="noStrike">
-              <a:solidFill>
-                <a:srgbClr val="000000"/>
-              </a:solidFill>
+            <a:endParaRPr b="0" lang="en-US" sz="3200" spc="-1" strike="noStrike">
               <a:latin typeface="Arial"/>
             </a:endParaRPr>
           </a:p>
@@ -2500,10 +2351,8 @@
             <a:noAutofit/>
           </a:bodyPr>
           <a:p>
-            <a:endParaRPr b="0" lang="en-US" sz="1800" spc="-1" strike="noStrike">
-              <a:solidFill>
-                <a:srgbClr val="000000"/>
-              </a:solidFill>
+            <a:pPr algn="ctr"/>
+            <a:endParaRPr b="0" lang="en-US" sz="4400" spc="-1" strike="noStrike">
               <a:latin typeface="Arial"/>
             </a:endParaRPr>
           </a:p>
@@ -2555,10 +2404,8 @@
             <a:noAutofit/>
           </a:bodyPr>
           <a:p>
-            <a:endParaRPr b="0" lang="en-US" sz="1800" spc="-1" strike="noStrike">
-              <a:solidFill>
-                <a:srgbClr val="000000"/>
-              </a:solidFill>
+            <a:pPr algn="ctr"/>
+            <a:endParaRPr b="0" lang="en-US" sz="4400" spc="-1" strike="noStrike">
               <a:latin typeface="Arial"/>
             </a:endParaRPr>
           </a:p>
@@ -2588,10 +2435,7 @@
             <a:normAutofit/>
           </a:bodyPr>
           <a:p>
-            <a:endParaRPr b="0" lang="en-US" sz="2800" spc="-1" strike="noStrike">
-              <a:solidFill>
-                <a:srgbClr val="000000"/>
-              </a:solidFill>
+            <a:endParaRPr b="0" lang="en-US" sz="3200" spc="-1" strike="noStrike">
               <a:latin typeface="Arial"/>
             </a:endParaRPr>
           </a:p>
@@ -2696,10 +2540,8 @@
             <a:noAutofit/>
           </a:bodyPr>
           <a:p>
-            <a:endParaRPr b="0" lang="en-US" sz="1800" spc="-1" strike="noStrike">
-              <a:solidFill>
-                <a:srgbClr val="000000"/>
-              </a:solidFill>
+            <a:pPr algn="ctr"/>
+            <a:endParaRPr b="0" lang="en-US" sz="4400" spc="-1" strike="noStrike">
               <a:latin typeface="Arial"/>
             </a:endParaRPr>
           </a:p>
@@ -2729,10 +2571,7 @@
             <a:normAutofit/>
           </a:bodyPr>
           <a:p>
-            <a:endParaRPr b="0" lang="en-US" sz="2800" spc="-1" strike="noStrike">
-              <a:solidFill>
-                <a:srgbClr val="000000"/>
-              </a:solidFill>
+            <a:endParaRPr b="0" lang="en-US" sz="3200" spc="-1" strike="noStrike">
               <a:latin typeface="Arial"/>
             </a:endParaRPr>
           </a:p>
@@ -2762,10 +2601,7 @@
             <a:normAutofit/>
           </a:bodyPr>
           <a:p>
-            <a:endParaRPr b="0" lang="en-US" sz="2800" spc="-1" strike="noStrike">
-              <a:solidFill>
-                <a:srgbClr val="000000"/>
-              </a:solidFill>
+            <a:endParaRPr b="0" lang="en-US" sz="3200" spc="-1" strike="noStrike">
               <a:latin typeface="Arial"/>
             </a:endParaRPr>
           </a:p>
@@ -2795,10 +2631,7 @@
             <a:normAutofit/>
           </a:bodyPr>
           <a:p>
-            <a:endParaRPr b="0" lang="en-US" sz="2800" spc="-1" strike="noStrike">
-              <a:solidFill>
-                <a:srgbClr val="000000"/>
-              </a:solidFill>
+            <a:endParaRPr b="0" lang="en-US" sz="3200" spc="-1" strike="noStrike">
               <a:latin typeface="Arial"/>
             </a:endParaRPr>
           </a:p>
@@ -2850,10 +2683,8 @@
             <a:noAutofit/>
           </a:bodyPr>
           <a:p>
-            <a:endParaRPr b="0" lang="en-US" sz="1800" spc="-1" strike="noStrike">
-              <a:solidFill>
-                <a:srgbClr val="000000"/>
-              </a:solidFill>
+            <a:pPr algn="ctr"/>
+            <a:endParaRPr b="0" lang="en-US" sz="4400" spc="-1" strike="noStrike">
               <a:latin typeface="Arial"/>
             </a:endParaRPr>
           </a:p>
@@ -2883,10 +2714,7 @@
             <a:normAutofit/>
           </a:bodyPr>
           <a:p>
-            <a:endParaRPr b="0" lang="en-US" sz="2800" spc="-1" strike="noStrike">
-              <a:solidFill>
-                <a:srgbClr val="000000"/>
-              </a:solidFill>
+            <a:endParaRPr b="0" lang="en-US" sz="3200" spc="-1" strike="noStrike">
               <a:latin typeface="Arial"/>
             </a:endParaRPr>
           </a:p>
@@ -2916,10 +2744,7 @@
             <a:normAutofit/>
           </a:bodyPr>
           <a:p>
-            <a:endParaRPr b="0" lang="en-US" sz="2800" spc="-1" strike="noStrike">
-              <a:solidFill>
-                <a:srgbClr val="000000"/>
-              </a:solidFill>
+            <a:endParaRPr b="0" lang="en-US" sz="3200" spc="-1" strike="noStrike">
               <a:latin typeface="Arial"/>
             </a:endParaRPr>
           </a:p>
@@ -2949,10 +2774,7 @@
             <a:normAutofit/>
           </a:bodyPr>
           <a:p>
-            <a:endParaRPr b="0" lang="en-US" sz="2800" spc="-1" strike="noStrike">
-              <a:solidFill>
-                <a:srgbClr val="000000"/>
-              </a:solidFill>
+            <a:endParaRPr b="0" lang="en-US" sz="3200" spc="-1" strike="noStrike">
               <a:latin typeface="Arial"/>
             </a:endParaRPr>
           </a:p>
@@ -3004,10 +2826,8 @@
             <a:noAutofit/>
           </a:bodyPr>
           <a:p>
-            <a:endParaRPr b="0" lang="en-US" sz="1800" spc="-1" strike="noStrike">
-              <a:solidFill>
-                <a:srgbClr val="000000"/>
-              </a:solidFill>
+            <a:pPr algn="ctr"/>
+            <a:endParaRPr b="0" lang="en-US" sz="4400" spc="-1" strike="noStrike">
               <a:latin typeface="Arial"/>
             </a:endParaRPr>
           </a:p>
@@ -3037,10 +2857,7 @@
             <a:normAutofit/>
           </a:bodyPr>
           <a:p>
-            <a:endParaRPr b="0" lang="en-US" sz="2800" spc="-1" strike="noStrike">
-              <a:solidFill>
-                <a:srgbClr val="000000"/>
-              </a:solidFill>
+            <a:endParaRPr b="0" lang="en-US" sz="3200" spc="-1" strike="noStrike">
               <a:latin typeface="Arial"/>
             </a:endParaRPr>
           </a:p>
@@ -3070,10 +2887,7 @@
             <a:normAutofit/>
           </a:bodyPr>
           <a:p>
-            <a:endParaRPr b="0" lang="en-US" sz="2800" spc="-1" strike="noStrike">
-              <a:solidFill>
-                <a:srgbClr val="000000"/>
-              </a:solidFill>
+            <a:endParaRPr b="0" lang="en-US" sz="3200" spc="-1" strike="noStrike">
               <a:latin typeface="Arial"/>
             </a:endParaRPr>
           </a:p>
@@ -3103,10 +2917,7 @@
             <a:normAutofit/>
           </a:bodyPr>
           <a:p>
-            <a:endParaRPr b="0" lang="en-US" sz="2800" spc="-1" strike="noStrike">
-              <a:solidFill>
-                <a:srgbClr val="000000"/>
-              </a:solidFill>
+            <a:endParaRPr b="0" lang="en-US" sz="3200" spc="-1" strike="noStrike">
               <a:latin typeface="Arial"/>
             </a:endParaRPr>
           </a:p>
@@ -3158,10 +2969,8 @@
             <a:noAutofit/>
           </a:bodyPr>
           <a:p>
-            <a:endParaRPr b="0" lang="en-US" sz="1800" spc="-1" strike="noStrike">
-              <a:solidFill>
-                <a:srgbClr val="000000"/>
-              </a:solidFill>
+            <a:pPr algn="ctr"/>
+            <a:endParaRPr b="0" lang="en-US" sz="4400" spc="-1" strike="noStrike">
               <a:latin typeface="Arial"/>
             </a:endParaRPr>
           </a:p>
@@ -3191,10 +3000,7 @@
             <a:normAutofit/>
           </a:bodyPr>
           <a:p>
-            <a:endParaRPr b="0" lang="en-US" sz="2800" spc="-1" strike="noStrike">
-              <a:solidFill>
-                <a:srgbClr val="000000"/>
-              </a:solidFill>
+            <a:endParaRPr b="0" lang="en-US" sz="3200" spc="-1" strike="noStrike">
               <a:latin typeface="Arial"/>
             </a:endParaRPr>
           </a:p>
@@ -3224,10 +3030,7 @@
             <a:normAutofit/>
           </a:bodyPr>
           <a:p>
-            <a:endParaRPr b="0" lang="en-US" sz="2800" spc="-1" strike="noStrike">
-              <a:solidFill>
-                <a:srgbClr val="000000"/>
-              </a:solidFill>
+            <a:endParaRPr b="0" lang="en-US" sz="3200" spc="-1" strike="noStrike">
               <a:latin typeface="Arial"/>
             </a:endParaRPr>
           </a:p>
@@ -3279,10 +3082,8 @@
             <a:noAutofit/>
           </a:bodyPr>
           <a:p>
-            <a:endParaRPr b="0" lang="en-US" sz="1800" spc="-1" strike="noStrike">
-              <a:solidFill>
-                <a:srgbClr val="000000"/>
-              </a:solidFill>
+            <a:pPr algn="ctr"/>
+            <a:endParaRPr b="0" lang="en-US" sz="4400" spc="-1" strike="noStrike">
               <a:latin typeface="Arial"/>
             </a:endParaRPr>
           </a:p>
@@ -3312,10 +3113,7 @@
             <a:normAutofit/>
           </a:bodyPr>
           <a:p>
-            <a:endParaRPr b="0" lang="en-US" sz="2800" spc="-1" strike="noStrike">
-              <a:solidFill>
-                <a:srgbClr val="000000"/>
-              </a:solidFill>
+            <a:endParaRPr b="0" lang="en-US" sz="3200" spc="-1" strike="noStrike">
               <a:latin typeface="Arial"/>
             </a:endParaRPr>
           </a:p>
@@ -3345,10 +3143,7 @@
             <a:normAutofit/>
           </a:bodyPr>
           <a:p>
-            <a:endParaRPr b="0" lang="en-US" sz="2800" spc="-1" strike="noStrike">
-              <a:solidFill>
-                <a:srgbClr val="000000"/>
-              </a:solidFill>
+            <a:endParaRPr b="0" lang="en-US" sz="3200" spc="-1" strike="noStrike">
               <a:latin typeface="Arial"/>
             </a:endParaRPr>
           </a:p>
@@ -3378,10 +3173,7 @@
             <a:normAutofit/>
           </a:bodyPr>
           <a:p>
-            <a:endParaRPr b="0" lang="en-US" sz="2800" spc="-1" strike="noStrike">
-              <a:solidFill>
-                <a:srgbClr val="000000"/>
-              </a:solidFill>
+            <a:endParaRPr b="0" lang="en-US" sz="3200" spc="-1" strike="noStrike">
               <a:latin typeface="Arial"/>
             </a:endParaRPr>
           </a:p>
@@ -3411,10 +3203,7 @@
             <a:normAutofit/>
           </a:bodyPr>
           <a:p>
-            <a:endParaRPr b="0" lang="en-US" sz="2800" spc="-1" strike="noStrike">
-              <a:solidFill>
-                <a:srgbClr val="000000"/>
-              </a:solidFill>
+            <a:endParaRPr b="0" lang="en-US" sz="3200" spc="-1" strike="noStrike">
               <a:latin typeface="Arial"/>
             </a:endParaRPr>
           </a:p>
@@ -3466,10 +3255,8 @@
             <a:noAutofit/>
           </a:bodyPr>
           <a:p>
-            <a:endParaRPr b="0" lang="en-US" sz="1800" spc="-1" strike="noStrike">
-              <a:solidFill>
-                <a:srgbClr val="000000"/>
-              </a:solidFill>
+            <a:pPr algn="ctr"/>
+            <a:endParaRPr b="0" lang="en-US" sz="4400" spc="-1" strike="noStrike">
               <a:latin typeface="Arial"/>
             </a:endParaRPr>
           </a:p>
@@ -3499,10 +3286,7 @@
             <a:normAutofit/>
           </a:bodyPr>
           <a:p>
-            <a:endParaRPr b="0" lang="en-US" sz="2800" spc="-1" strike="noStrike">
-              <a:solidFill>
-                <a:srgbClr val="000000"/>
-              </a:solidFill>
+            <a:endParaRPr b="0" lang="en-US" sz="3200" spc="-1" strike="noStrike">
               <a:latin typeface="Arial"/>
             </a:endParaRPr>
           </a:p>
@@ -3532,10 +3316,7 @@
             <a:normAutofit/>
           </a:bodyPr>
           <a:p>
-            <a:endParaRPr b="0" lang="en-US" sz="2800" spc="-1" strike="noStrike">
-              <a:solidFill>
-                <a:srgbClr val="000000"/>
-              </a:solidFill>
+            <a:endParaRPr b="0" lang="en-US" sz="3200" spc="-1" strike="noStrike">
               <a:latin typeface="Arial"/>
             </a:endParaRPr>
           </a:p>
@@ -3565,10 +3346,7 @@
             <a:normAutofit/>
           </a:bodyPr>
           <a:p>
-            <a:endParaRPr b="0" lang="en-US" sz="2800" spc="-1" strike="noStrike">
-              <a:solidFill>
-                <a:srgbClr val="000000"/>
-              </a:solidFill>
+            <a:endParaRPr b="0" lang="en-US" sz="3200" spc="-1" strike="noStrike">
               <a:latin typeface="Arial"/>
             </a:endParaRPr>
           </a:p>
@@ -3598,10 +3376,7 @@
             <a:normAutofit/>
           </a:bodyPr>
           <a:p>
-            <a:endParaRPr b="0" lang="en-US" sz="2800" spc="-1" strike="noStrike">
-              <a:solidFill>
-                <a:srgbClr val="000000"/>
-              </a:solidFill>
+            <a:endParaRPr b="0" lang="en-US" sz="3200" spc="-1" strike="noStrike">
               <a:latin typeface="Arial"/>
             </a:endParaRPr>
           </a:p>
@@ -3631,10 +3406,7 @@
             <a:normAutofit/>
           </a:bodyPr>
           <a:p>
-            <a:endParaRPr b="0" lang="en-US" sz="2800" spc="-1" strike="noStrike">
-              <a:solidFill>
-                <a:srgbClr val="000000"/>
-              </a:solidFill>
+            <a:endParaRPr b="0" lang="en-US" sz="3200" spc="-1" strike="noStrike">
               <a:latin typeface="Arial"/>
             </a:endParaRPr>
           </a:p>
@@ -3664,10 +3436,7 @@
             <a:normAutofit/>
           </a:bodyPr>
           <a:p>
-            <a:endParaRPr b="0" lang="en-US" sz="2800" spc="-1" strike="noStrike">
-              <a:solidFill>
-                <a:srgbClr val="000000"/>
-              </a:solidFill>
+            <a:endParaRPr b="0" lang="en-US" sz="3200" spc="-1" strike="noStrike">
               <a:latin typeface="Arial"/>
             </a:endParaRPr>
           </a:p>
@@ -3741,10 +3510,8 @@
             <a:noAutofit/>
           </a:bodyPr>
           <a:p>
-            <a:endParaRPr b="0" lang="en-US" sz="1800" spc="-1" strike="noStrike">
-              <a:solidFill>
-                <a:srgbClr val="000000"/>
-              </a:solidFill>
+            <a:pPr algn="ctr"/>
+            <a:endParaRPr b="0" lang="en-US" sz="4400" spc="-1" strike="noStrike">
               <a:latin typeface="Arial"/>
             </a:endParaRPr>
           </a:p>
@@ -3827,10 +3594,8 @@
             <a:noAutofit/>
           </a:bodyPr>
           <a:p>
-            <a:endParaRPr b="0" lang="en-US" sz="1800" spc="-1" strike="noStrike">
-              <a:solidFill>
-                <a:srgbClr val="000000"/>
-              </a:solidFill>
+            <a:pPr algn="ctr"/>
+            <a:endParaRPr b="0" lang="en-US" sz="4400" spc="-1" strike="noStrike">
               <a:latin typeface="Arial"/>
             </a:endParaRPr>
           </a:p>
@@ -3860,10 +3625,7 @@
             <a:normAutofit/>
           </a:bodyPr>
           <a:p>
-            <a:endParaRPr b="0" lang="en-US" sz="2800" spc="-1" strike="noStrike">
-              <a:solidFill>
-                <a:srgbClr val="000000"/>
-              </a:solidFill>
+            <a:endParaRPr b="0" lang="en-US" sz="3200" spc="-1" strike="noStrike">
               <a:latin typeface="Arial"/>
             </a:endParaRPr>
           </a:p>
@@ -3915,10 +3677,8 @@
             <a:noAutofit/>
           </a:bodyPr>
           <a:p>
-            <a:endParaRPr b="0" lang="en-US" sz="1800" spc="-1" strike="noStrike">
-              <a:solidFill>
-                <a:srgbClr val="000000"/>
-              </a:solidFill>
+            <a:pPr algn="ctr"/>
+            <a:endParaRPr b="0" lang="en-US" sz="4400" spc="-1" strike="noStrike">
               <a:latin typeface="Arial"/>
             </a:endParaRPr>
           </a:p>
@@ -3948,10 +3708,7 @@
             <a:normAutofit/>
           </a:bodyPr>
           <a:p>
-            <a:endParaRPr b="0" lang="en-US" sz="2800" spc="-1" strike="noStrike">
-              <a:solidFill>
-                <a:srgbClr val="000000"/>
-              </a:solidFill>
+            <a:endParaRPr b="0" lang="en-US" sz="3200" spc="-1" strike="noStrike">
               <a:latin typeface="Arial"/>
             </a:endParaRPr>
           </a:p>
@@ -3981,10 +3738,7 @@
             <a:normAutofit/>
           </a:bodyPr>
           <a:p>
-            <a:endParaRPr b="0" lang="en-US" sz="2800" spc="-1" strike="noStrike">
-              <a:solidFill>
-                <a:srgbClr val="000000"/>
-              </a:solidFill>
+            <a:endParaRPr b="0" lang="en-US" sz="3200" spc="-1" strike="noStrike">
               <a:latin typeface="Arial"/>
             </a:endParaRPr>
           </a:p>
@@ -4036,10 +3790,8 @@
             <a:noAutofit/>
           </a:bodyPr>
           <a:p>
-            <a:endParaRPr b="0" lang="en-US" sz="1800" spc="-1" strike="noStrike">
-              <a:solidFill>
-                <a:srgbClr val="000000"/>
-              </a:solidFill>
+            <a:pPr algn="ctr"/>
+            <a:endParaRPr b="0" lang="en-US" sz="4400" spc="-1" strike="noStrike">
               <a:latin typeface="Arial"/>
             </a:endParaRPr>
           </a:p>
@@ -4069,10 +3821,7 @@
             <a:normAutofit/>
           </a:bodyPr>
           <a:p>
-            <a:endParaRPr b="0" lang="en-US" sz="2800" spc="-1" strike="noStrike">
-              <a:solidFill>
-                <a:srgbClr val="000000"/>
-              </a:solidFill>
+            <a:endParaRPr b="0" lang="en-US" sz="3200" spc="-1" strike="noStrike">
               <a:latin typeface="Arial"/>
             </a:endParaRPr>
           </a:p>
@@ -4102,10 +3851,7 @@
             <a:normAutofit/>
           </a:bodyPr>
           <a:p>
-            <a:endParaRPr b="0" lang="en-US" sz="2800" spc="-1" strike="noStrike">
-              <a:solidFill>
-                <a:srgbClr val="000000"/>
-              </a:solidFill>
+            <a:endParaRPr b="0" lang="en-US" sz="3200" spc="-1" strike="noStrike">
               <a:latin typeface="Arial"/>
             </a:endParaRPr>
           </a:p>
@@ -4157,10 +3903,8 @@
             <a:noAutofit/>
           </a:bodyPr>
           <a:p>
-            <a:endParaRPr b="0" lang="en-US" sz="1800" spc="-1" strike="noStrike">
-              <a:solidFill>
-                <a:srgbClr val="000000"/>
-              </a:solidFill>
+            <a:pPr algn="ctr"/>
+            <a:endParaRPr b="0" lang="en-US" sz="4400" spc="-1" strike="noStrike">
               <a:latin typeface="Arial"/>
             </a:endParaRPr>
           </a:p>
@@ -4265,10 +4009,8 @@
             <a:noAutofit/>
           </a:bodyPr>
           <a:p>
-            <a:endParaRPr b="0" lang="en-US" sz="1800" spc="-1" strike="noStrike">
-              <a:solidFill>
-                <a:srgbClr val="000000"/>
-              </a:solidFill>
+            <a:pPr algn="ctr"/>
+            <a:endParaRPr b="0" lang="en-US" sz="4400" spc="-1" strike="noStrike">
               <a:latin typeface="Arial"/>
             </a:endParaRPr>
           </a:p>
@@ -4298,10 +4040,7 @@
             <a:normAutofit/>
           </a:bodyPr>
           <a:p>
-            <a:endParaRPr b="0" lang="en-US" sz="2800" spc="-1" strike="noStrike">
-              <a:solidFill>
-                <a:srgbClr val="000000"/>
-              </a:solidFill>
+            <a:endParaRPr b="0" lang="en-US" sz="3200" spc="-1" strike="noStrike">
               <a:latin typeface="Arial"/>
             </a:endParaRPr>
           </a:p>
@@ -4331,10 +4070,7 @@
             <a:normAutofit/>
           </a:bodyPr>
           <a:p>
-            <a:endParaRPr b="0" lang="en-US" sz="2800" spc="-1" strike="noStrike">
-              <a:solidFill>
-                <a:srgbClr val="000000"/>
-              </a:solidFill>
+            <a:endParaRPr b="0" lang="en-US" sz="3200" spc="-1" strike="noStrike">
               <a:latin typeface="Arial"/>
             </a:endParaRPr>
           </a:p>
@@ -4364,10 +4100,7 @@
             <a:normAutofit/>
           </a:bodyPr>
           <a:p>
-            <a:endParaRPr b="0" lang="en-US" sz="2800" spc="-1" strike="noStrike">
-              <a:solidFill>
-                <a:srgbClr val="000000"/>
-              </a:solidFill>
+            <a:endParaRPr b="0" lang="en-US" sz="3200" spc="-1" strike="noStrike">
               <a:latin typeface="Arial"/>
             </a:endParaRPr>
           </a:p>
@@ -4419,10 +4152,8 @@
             <a:noAutofit/>
           </a:bodyPr>
           <a:p>
-            <a:endParaRPr b="0" lang="en-US" sz="1800" spc="-1" strike="noStrike">
-              <a:solidFill>
-                <a:srgbClr val="000000"/>
-              </a:solidFill>
+            <a:pPr algn="ctr"/>
+            <a:endParaRPr b="0" lang="en-US" sz="4400" spc="-1" strike="noStrike">
               <a:latin typeface="Arial"/>
             </a:endParaRPr>
           </a:p>
@@ -4452,10 +4183,7 @@
             <a:normAutofit/>
           </a:bodyPr>
           <a:p>
-            <a:endParaRPr b="0" lang="en-US" sz="2800" spc="-1" strike="noStrike">
-              <a:solidFill>
-                <a:srgbClr val="000000"/>
-              </a:solidFill>
+            <a:endParaRPr b="0" lang="en-US" sz="3200" spc="-1" strike="noStrike">
               <a:latin typeface="Arial"/>
             </a:endParaRPr>
           </a:p>
@@ -4485,10 +4213,7 @@
             <a:normAutofit/>
           </a:bodyPr>
           <a:p>
-            <a:endParaRPr b="0" lang="en-US" sz="2800" spc="-1" strike="noStrike">
-              <a:solidFill>
-                <a:srgbClr val="000000"/>
-              </a:solidFill>
+            <a:endParaRPr b="0" lang="en-US" sz="3200" spc="-1" strike="noStrike">
               <a:latin typeface="Arial"/>
             </a:endParaRPr>
           </a:p>
@@ -4518,10 +4243,7 @@
             <a:normAutofit/>
           </a:bodyPr>
           <a:p>
-            <a:endParaRPr b="0" lang="en-US" sz="2800" spc="-1" strike="noStrike">
-              <a:solidFill>
-                <a:srgbClr val="000000"/>
-              </a:solidFill>
+            <a:endParaRPr b="0" lang="en-US" sz="3200" spc="-1" strike="noStrike">
               <a:latin typeface="Arial"/>
             </a:endParaRPr>
           </a:p>
@@ -4573,10 +4295,8 @@
             <a:noAutofit/>
           </a:bodyPr>
           <a:p>
-            <a:endParaRPr b="0" lang="en-US" sz="1800" spc="-1" strike="noStrike">
-              <a:solidFill>
-                <a:srgbClr val="000000"/>
-              </a:solidFill>
+            <a:pPr algn="ctr"/>
+            <a:endParaRPr b="0" lang="en-US" sz="4400" spc="-1" strike="noStrike">
               <a:latin typeface="Arial"/>
             </a:endParaRPr>
           </a:p>
@@ -4606,10 +4326,7 @@
             <a:normAutofit/>
           </a:bodyPr>
           <a:p>
-            <a:endParaRPr b="0" lang="en-US" sz="2800" spc="-1" strike="noStrike">
-              <a:solidFill>
-                <a:srgbClr val="000000"/>
-              </a:solidFill>
+            <a:endParaRPr b="0" lang="en-US" sz="3200" spc="-1" strike="noStrike">
               <a:latin typeface="Arial"/>
             </a:endParaRPr>
           </a:p>
@@ -4639,10 +4356,7 @@
             <a:normAutofit/>
           </a:bodyPr>
           <a:p>
-            <a:endParaRPr b="0" lang="en-US" sz="2800" spc="-1" strike="noStrike">
-              <a:solidFill>
-                <a:srgbClr val="000000"/>
-              </a:solidFill>
+            <a:endParaRPr b="0" lang="en-US" sz="3200" spc="-1" strike="noStrike">
               <a:latin typeface="Arial"/>
             </a:endParaRPr>
           </a:p>
@@ -4672,10 +4386,7 @@
             <a:normAutofit/>
           </a:bodyPr>
           <a:p>
-            <a:endParaRPr b="0" lang="en-US" sz="2800" spc="-1" strike="noStrike">
-              <a:solidFill>
-                <a:srgbClr val="000000"/>
-              </a:solidFill>
+            <a:endParaRPr b="0" lang="en-US" sz="3200" spc="-1" strike="noStrike">
               <a:latin typeface="Arial"/>
             </a:endParaRPr>
           </a:p>
@@ -4727,10 +4438,8 @@
             <a:noAutofit/>
           </a:bodyPr>
           <a:p>
-            <a:endParaRPr b="0" lang="en-US" sz="1800" spc="-1" strike="noStrike">
-              <a:solidFill>
-                <a:srgbClr val="000000"/>
-              </a:solidFill>
+            <a:pPr algn="ctr"/>
+            <a:endParaRPr b="0" lang="en-US" sz="4400" spc="-1" strike="noStrike">
               <a:latin typeface="Arial"/>
             </a:endParaRPr>
           </a:p>
@@ -4760,10 +4469,7 @@
             <a:normAutofit/>
           </a:bodyPr>
           <a:p>
-            <a:endParaRPr b="0" lang="en-US" sz="2800" spc="-1" strike="noStrike">
-              <a:solidFill>
-                <a:srgbClr val="000000"/>
-              </a:solidFill>
+            <a:endParaRPr b="0" lang="en-US" sz="3200" spc="-1" strike="noStrike">
               <a:latin typeface="Arial"/>
             </a:endParaRPr>
           </a:p>
@@ -4793,10 +4499,7 @@
             <a:normAutofit/>
           </a:bodyPr>
           <a:p>
-            <a:endParaRPr b="0" lang="en-US" sz="2800" spc="-1" strike="noStrike">
-              <a:solidFill>
-                <a:srgbClr val="000000"/>
-              </a:solidFill>
+            <a:endParaRPr b="0" lang="en-US" sz="3200" spc="-1" strike="noStrike">
               <a:latin typeface="Arial"/>
             </a:endParaRPr>
           </a:p>
@@ -4848,10 +4551,8 @@
             <a:noAutofit/>
           </a:bodyPr>
           <a:p>
-            <a:endParaRPr b="0" lang="en-US" sz="1800" spc="-1" strike="noStrike">
-              <a:solidFill>
-                <a:srgbClr val="000000"/>
-              </a:solidFill>
+            <a:pPr algn="ctr"/>
+            <a:endParaRPr b="0" lang="en-US" sz="4400" spc="-1" strike="noStrike">
               <a:latin typeface="Arial"/>
             </a:endParaRPr>
           </a:p>
@@ -4881,10 +4582,7 @@
             <a:normAutofit/>
           </a:bodyPr>
           <a:p>
-            <a:endParaRPr b="0" lang="en-US" sz="2800" spc="-1" strike="noStrike">
-              <a:solidFill>
-                <a:srgbClr val="000000"/>
-              </a:solidFill>
+            <a:endParaRPr b="0" lang="en-US" sz="3200" spc="-1" strike="noStrike">
               <a:latin typeface="Arial"/>
             </a:endParaRPr>
           </a:p>
@@ -4914,10 +4612,7 @@
             <a:normAutofit/>
           </a:bodyPr>
           <a:p>
-            <a:endParaRPr b="0" lang="en-US" sz="2800" spc="-1" strike="noStrike">
-              <a:solidFill>
-                <a:srgbClr val="000000"/>
-              </a:solidFill>
+            <a:endParaRPr b="0" lang="en-US" sz="3200" spc="-1" strike="noStrike">
               <a:latin typeface="Arial"/>
             </a:endParaRPr>
           </a:p>
@@ -4947,10 +4642,7 @@
             <a:normAutofit/>
           </a:bodyPr>
           <a:p>
-            <a:endParaRPr b="0" lang="en-US" sz="2800" spc="-1" strike="noStrike">
-              <a:solidFill>
-                <a:srgbClr val="000000"/>
-              </a:solidFill>
+            <a:endParaRPr b="0" lang="en-US" sz="3200" spc="-1" strike="noStrike">
               <a:latin typeface="Arial"/>
             </a:endParaRPr>
           </a:p>
@@ -4980,10 +4672,7 @@
             <a:normAutofit/>
           </a:bodyPr>
           <a:p>
-            <a:endParaRPr b="0" lang="en-US" sz="2800" spc="-1" strike="noStrike">
-              <a:solidFill>
-                <a:srgbClr val="000000"/>
-              </a:solidFill>
+            <a:endParaRPr b="0" lang="en-US" sz="3200" spc="-1" strike="noStrike">
               <a:latin typeface="Arial"/>
             </a:endParaRPr>
           </a:p>
@@ -5035,10 +4724,8 @@
             <a:noAutofit/>
           </a:bodyPr>
           <a:p>
-            <a:endParaRPr b="0" lang="en-US" sz="1800" spc="-1" strike="noStrike">
-              <a:solidFill>
-                <a:srgbClr val="000000"/>
-              </a:solidFill>
+            <a:pPr algn="ctr"/>
+            <a:endParaRPr b="0" lang="en-US" sz="4400" spc="-1" strike="noStrike">
               <a:latin typeface="Arial"/>
             </a:endParaRPr>
           </a:p>
@@ -5068,10 +4755,7 @@
             <a:normAutofit/>
           </a:bodyPr>
           <a:p>
-            <a:endParaRPr b="0" lang="en-US" sz="2800" spc="-1" strike="noStrike">
-              <a:solidFill>
-                <a:srgbClr val="000000"/>
-              </a:solidFill>
+            <a:endParaRPr b="0" lang="en-US" sz="3200" spc="-1" strike="noStrike">
               <a:latin typeface="Arial"/>
             </a:endParaRPr>
           </a:p>
@@ -5101,10 +4785,7 @@
             <a:normAutofit/>
           </a:bodyPr>
           <a:p>
-            <a:endParaRPr b="0" lang="en-US" sz="2800" spc="-1" strike="noStrike">
-              <a:solidFill>
-                <a:srgbClr val="000000"/>
-              </a:solidFill>
+            <a:endParaRPr b="0" lang="en-US" sz="3200" spc="-1" strike="noStrike">
               <a:latin typeface="Arial"/>
             </a:endParaRPr>
           </a:p>
@@ -5134,10 +4815,7 @@
             <a:normAutofit/>
           </a:bodyPr>
           <a:p>
-            <a:endParaRPr b="0" lang="en-US" sz="2800" spc="-1" strike="noStrike">
-              <a:solidFill>
-                <a:srgbClr val="000000"/>
-              </a:solidFill>
+            <a:endParaRPr b="0" lang="en-US" sz="3200" spc="-1" strike="noStrike">
               <a:latin typeface="Arial"/>
             </a:endParaRPr>
           </a:p>
@@ -5167,10 +4845,7 @@
             <a:normAutofit/>
           </a:bodyPr>
           <a:p>
-            <a:endParaRPr b="0" lang="en-US" sz="2800" spc="-1" strike="noStrike">
-              <a:solidFill>
-                <a:srgbClr val="000000"/>
-              </a:solidFill>
+            <a:endParaRPr b="0" lang="en-US" sz="3200" spc="-1" strike="noStrike">
               <a:latin typeface="Arial"/>
             </a:endParaRPr>
           </a:p>
@@ -5200,10 +4875,7 @@
             <a:normAutofit/>
           </a:bodyPr>
           <a:p>
-            <a:endParaRPr b="0" lang="en-US" sz="2800" spc="-1" strike="noStrike">
-              <a:solidFill>
-                <a:srgbClr val="000000"/>
-              </a:solidFill>
+            <a:endParaRPr b="0" lang="en-US" sz="3200" spc="-1" strike="noStrike">
               <a:latin typeface="Arial"/>
             </a:endParaRPr>
           </a:p>
@@ -5233,10 +4905,7 @@
             <a:normAutofit/>
           </a:bodyPr>
           <a:p>
-            <a:endParaRPr b="0" lang="en-US" sz="2800" spc="-1" strike="noStrike">
-              <a:solidFill>
-                <a:srgbClr val="000000"/>
-              </a:solidFill>
+            <a:endParaRPr b="0" lang="en-US" sz="3200" spc="-1" strike="noStrike">
               <a:latin typeface="Arial"/>
             </a:endParaRPr>
           </a:p>
@@ -5288,10 +4957,8 @@
             <a:noAutofit/>
           </a:bodyPr>
           <a:p>
-            <a:endParaRPr b="0" lang="en-US" sz="1800" spc="-1" strike="noStrike">
-              <a:solidFill>
-                <a:srgbClr val="000000"/>
-              </a:solidFill>
+            <a:pPr algn="ctr"/>
+            <a:endParaRPr b="0" lang="en-US" sz="4400" spc="-1" strike="noStrike">
               <a:latin typeface="Arial"/>
             </a:endParaRPr>
           </a:p>
@@ -5396,10 +5063,8 @@
             <a:noAutofit/>
           </a:bodyPr>
           <a:p>
-            <a:endParaRPr b="0" lang="en-US" sz="1800" spc="-1" strike="noStrike">
-              <a:solidFill>
-                <a:srgbClr val="000000"/>
-              </a:solidFill>
+            <a:pPr algn="ctr"/>
+            <a:endParaRPr b="0" lang="en-US" sz="4400" spc="-1" strike="noStrike">
               <a:latin typeface="Arial"/>
             </a:endParaRPr>
           </a:p>
@@ -5429,10 +5094,7 @@
             <a:normAutofit/>
           </a:bodyPr>
           <a:p>
-            <a:endParaRPr b="0" lang="en-US" sz="2800" spc="-1" strike="noStrike">
-              <a:solidFill>
-                <a:srgbClr val="000000"/>
-              </a:solidFill>
+            <a:endParaRPr b="0" lang="en-US" sz="3200" spc="-1" strike="noStrike">
               <a:latin typeface="Arial"/>
             </a:endParaRPr>
           </a:p>
@@ -5462,10 +5124,7 @@
             <a:normAutofit/>
           </a:bodyPr>
           <a:p>
-            <a:endParaRPr b="0" lang="en-US" sz="2800" spc="-1" strike="noStrike">
-              <a:solidFill>
-                <a:srgbClr val="000000"/>
-              </a:solidFill>
+            <a:endParaRPr b="0" lang="en-US" sz="3200" spc="-1" strike="noStrike">
               <a:latin typeface="Arial"/>
             </a:endParaRPr>
           </a:p>
@@ -5495,10 +5154,7 @@
             <a:normAutofit/>
           </a:bodyPr>
           <a:p>
-            <a:endParaRPr b="0" lang="en-US" sz="2800" spc="-1" strike="noStrike">
-              <a:solidFill>
-                <a:srgbClr val="000000"/>
-              </a:solidFill>
+            <a:endParaRPr b="0" lang="en-US" sz="3200" spc="-1" strike="noStrike">
               <a:latin typeface="Arial"/>
             </a:endParaRPr>
           </a:p>
@@ -5550,10 +5206,8 @@
             <a:noAutofit/>
           </a:bodyPr>
           <a:p>
-            <a:endParaRPr b="0" lang="en-US" sz="1800" spc="-1" strike="noStrike">
-              <a:solidFill>
-                <a:srgbClr val="000000"/>
-              </a:solidFill>
+            <a:pPr algn="ctr"/>
+            <a:endParaRPr b="0" lang="en-US" sz="4400" spc="-1" strike="noStrike">
               <a:latin typeface="Arial"/>
             </a:endParaRPr>
           </a:p>
@@ -5583,10 +5237,7 @@
             <a:normAutofit/>
           </a:bodyPr>
           <a:p>
-            <a:endParaRPr b="0" lang="en-US" sz="2800" spc="-1" strike="noStrike">
-              <a:solidFill>
-                <a:srgbClr val="000000"/>
-              </a:solidFill>
+            <a:endParaRPr b="0" lang="en-US" sz="3200" spc="-1" strike="noStrike">
               <a:latin typeface="Arial"/>
             </a:endParaRPr>
           </a:p>
@@ -5616,10 +5267,7 @@
             <a:normAutofit/>
           </a:bodyPr>
           <a:p>
-            <a:endParaRPr b="0" lang="en-US" sz="2800" spc="-1" strike="noStrike">
-              <a:solidFill>
-                <a:srgbClr val="000000"/>
-              </a:solidFill>
+            <a:endParaRPr b="0" lang="en-US" sz="3200" spc="-1" strike="noStrike">
               <a:latin typeface="Arial"/>
             </a:endParaRPr>
           </a:p>
@@ -5649,10 +5297,7 @@
             <a:normAutofit/>
           </a:bodyPr>
           <a:p>
-            <a:endParaRPr b="0" lang="en-US" sz="2800" spc="-1" strike="noStrike">
-              <a:solidFill>
-                <a:srgbClr val="000000"/>
-              </a:solidFill>
+            <a:endParaRPr b="0" lang="en-US" sz="3200" spc="-1" strike="noStrike">
               <a:latin typeface="Arial"/>
             </a:endParaRPr>
           </a:p>
@@ -5704,10 +5349,8 @@
             <a:noAutofit/>
           </a:bodyPr>
           <a:p>
-            <a:endParaRPr b="0" lang="en-US" sz="1800" spc="-1" strike="noStrike">
-              <a:solidFill>
-                <a:srgbClr val="000000"/>
-              </a:solidFill>
+            <a:pPr algn="ctr"/>
+            <a:endParaRPr b="0" lang="en-US" sz="4400" spc="-1" strike="noStrike">
               <a:latin typeface="Arial"/>
             </a:endParaRPr>
           </a:p>
@@ -5737,10 +5380,7 @@
             <a:normAutofit/>
           </a:bodyPr>
           <a:p>
-            <a:endParaRPr b="0" lang="en-US" sz="2800" spc="-1" strike="noStrike">
-              <a:solidFill>
-                <a:srgbClr val="000000"/>
-              </a:solidFill>
+            <a:endParaRPr b="0" lang="en-US" sz="3200" spc="-1" strike="noStrike">
               <a:latin typeface="Arial"/>
             </a:endParaRPr>
           </a:p>
@@ -5770,10 +5410,7 @@
             <a:normAutofit/>
           </a:bodyPr>
           <a:p>
-            <a:endParaRPr b="0" lang="en-US" sz="2800" spc="-1" strike="noStrike">
-              <a:solidFill>
-                <a:srgbClr val="000000"/>
-              </a:solidFill>
+            <a:endParaRPr b="0" lang="en-US" sz="3200" spc="-1" strike="noStrike">
               <a:latin typeface="Arial"/>
             </a:endParaRPr>
           </a:p>
@@ -5803,10 +5440,7 @@
             <a:normAutofit/>
           </a:bodyPr>
           <a:p>
-            <a:endParaRPr b="0" lang="en-US" sz="2800" spc="-1" strike="noStrike">
-              <a:solidFill>
-                <a:srgbClr val="000000"/>
-              </a:solidFill>
+            <a:endParaRPr b="0" lang="en-US" sz="3200" spc="-1" strike="noStrike">
               <a:latin typeface="Arial"/>
             </a:endParaRPr>
           </a:p>
@@ -5854,7 +5488,7 @@
         <p:spPr>
           <a:xfrm>
             <a:off x="12608280" y="9347400"/>
-            <a:ext cx="370080" cy="368280"/>
+            <a:ext cx="369720" cy="367920"/>
           </a:xfrm>
           <a:prstGeom prst="rect">
             <a:avLst/>
@@ -5879,7 +5513,7 @@
         <p:spPr>
           <a:xfrm>
             <a:off x="360" y="9307800"/>
-            <a:ext cx="13003200" cy="447840"/>
+            <a:ext cx="13002840" cy="447480"/>
           </a:xfrm>
           <a:prstGeom prst="rect">
             <a:avLst/>
@@ -5902,7 +5536,7 @@
         <p:spPr>
           <a:xfrm>
             <a:off x="9105840" y="164880"/>
-            <a:ext cx="3584160" cy="1582200"/>
+            <a:ext cx="3583800" cy="1581840"/>
           </a:xfrm>
           <a:prstGeom prst="rect">
             <a:avLst/>
@@ -5925,7 +5559,7 @@
         <p:spPr>
           <a:xfrm>
             <a:off x="11110320" y="7959960"/>
-            <a:ext cx="1579680" cy="1582200"/>
+            <a:ext cx="1579320" cy="1581840"/>
           </a:xfrm>
           <a:prstGeom prst="rect">
             <a:avLst/>
@@ -5959,28 +5593,14 @@
             <a:noAutofit/>
           </a:bodyPr>
           <a:p>
+            <a:pPr algn="ctr"/>
             <a:r>
-              <a:rPr b="0" lang="en-US" sz="1800" spc="-1" strike="noStrike">
-                <a:solidFill>
-                  <a:srgbClr val="000000"/>
-                </a:solidFill>
+              <a:rPr b="0" lang="en-US" sz="4400" spc="-1" strike="noStrike">
                 <a:latin typeface="Arial"/>
               </a:rPr>
-              <a:t>Click to edit the title </a:t>
+              <a:t>Click to edit the title text format</a:t>
             </a:r>
-            <a:r>
-              <a:rPr b="0" lang="en-US" sz="1800" spc="-1" strike="noStrike">
-                <a:solidFill>
-                  <a:srgbClr val="000000"/>
-                </a:solidFill>
-                <a:latin typeface="Arial"/>
-              </a:rPr>
-              <a:t>text format</a:t>
-            </a:r>
-            <a:endParaRPr b="0" lang="en-US" sz="1800" spc="-1" strike="noStrike">
-              <a:solidFill>
-                <a:srgbClr val="000000"/>
-              </a:solidFill>
+            <a:endParaRPr b="0" lang="en-US" sz="4400" spc="-1" strike="noStrike">
               <a:latin typeface="Arial"/>
             </a:endParaRPr>
           </a:p>
@@ -6022,18 +5642,12 @@
               <a:buChar char=""/>
             </a:pPr>
             <a:r>
-              <a:rPr b="0" lang="en-US" sz="2800" spc="-1" strike="noStrike">
-                <a:solidFill>
-                  <a:srgbClr val="000000"/>
-                </a:solidFill>
+              <a:rPr b="0" lang="en-US" sz="3200" spc="-1" strike="noStrike">
                 <a:latin typeface="Arial"/>
               </a:rPr>
               <a:t>Click to edit the outline text format</a:t>
             </a:r>
-            <a:endParaRPr b="0" lang="en-US" sz="2800" spc="-1" strike="noStrike">
-              <a:solidFill>
-                <a:srgbClr val="000000"/>
-              </a:solidFill>
+            <a:endParaRPr b="0" lang="en-US" sz="3200" spc="-1" strike="noStrike">
               <a:latin typeface="Arial"/>
             </a:endParaRPr>
           </a:p>
@@ -6050,18 +5664,12 @@
               <a:buChar char=""/>
             </a:pPr>
             <a:r>
-              <a:rPr b="0" lang="en-US" sz="2000" spc="-1" strike="noStrike">
-                <a:solidFill>
-                  <a:srgbClr val="000000"/>
-                </a:solidFill>
+              <a:rPr b="0" lang="en-US" sz="2800" spc="-1" strike="noStrike">
                 <a:latin typeface="Arial"/>
               </a:rPr>
               <a:t>Second Outline Level</a:t>
             </a:r>
-            <a:endParaRPr b="0" lang="en-US" sz="2000" spc="-1" strike="noStrike">
-              <a:solidFill>
-                <a:srgbClr val="000000"/>
-              </a:solidFill>
+            <a:endParaRPr b="0" lang="en-US" sz="2800" spc="-1" strike="noStrike">
               <a:latin typeface="Arial"/>
             </a:endParaRPr>
           </a:p>
@@ -6078,18 +5686,12 @@
               <a:buChar char=""/>
             </a:pPr>
             <a:r>
-              <a:rPr b="0" lang="en-US" sz="1800" spc="-1" strike="noStrike">
-                <a:solidFill>
-                  <a:srgbClr val="000000"/>
-                </a:solidFill>
+              <a:rPr b="0" lang="en-US" sz="2400" spc="-1" strike="noStrike">
                 <a:latin typeface="Arial"/>
               </a:rPr>
               <a:t>Third Outline Level</a:t>
             </a:r>
-            <a:endParaRPr b="0" lang="en-US" sz="1800" spc="-1" strike="noStrike">
-              <a:solidFill>
-                <a:srgbClr val="000000"/>
-              </a:solidFill>
+            <a:endParaRPr b="0" lang="en-US" sz="2400" spc="-1" strike="noStrike">
               <a:latin typeface="Arial"/>
             </a:endParaRPr>
           </a:p>
@@ -6106,18 +5708,12 @@
               <a:buChar char=""/>
             </a:pPr>
             <a:r>
-              <a:rPr b="0" lang="en-US" sz="1800" spc="-1" strike="noStrike">
-                <a:solidFill>
-                  <a:srgbClr val="000000"/>
-                </a:solidFill>
+              <a:rPr b="0" lang="en-US" sz="2000" spc="-1" strike="noStrike">
                 <a:latin typeface="Arial"/>
               </a:rPr>
               <a:t>Fourth Outline Level</a:t>
             </a:r>
-            <a:endParaRPr b="0" lang="en-US" sz="1800" spc="-1" strike="noStrike">
-              <a:solidFill>
-                <a:srgbClr val="000000"/>
-              </a:solidFill>
+            <a:endParaRPr b="0" lang="en-US" sz="2000" spc="-1" strike="noStrike">
               <a:latin typeface="Arial"/>
             </a:endParaRPr>
           </a:p>
@@ -6135,17 +5731,11 @@
             </a:pPr>
             <a:r>
               <a:rPr b="0" lang="en-US" sz="2000" spc="-1" strike="noStrike">
-                <a:solidFill>
-                  <a:srgbClr val="000000"/>
-                </a:solidFill>
                 <a:latin typeface="Arial"/>
               </a:rPr>
               <a:t>Fifth Outline Level</a:t>
             </a:r>
             <a:endParaRPr b="0" lang="en-US" sz="2000" spc="-1" strike="noStrike">
-              <a:solidFill>
-                <a:srgbClr val="000000"/>
-              </a:solidFill>
               <a:latin typeface="Arial"/>
             </a:endParaRPr>
           </a:p>
@@ -6163,17 +5753,11 @@
             </a:pPr>
             <a:r>
               <a:rPr b="0" lang="en-US" sz="2000" spc="-1" strike="noStrike">
-                <a:solidFill>
-                  <a:srgbClr val="000000"/>
-                </a:solidFill>
                 <a:latin typeface="Arial"/>
               </a:rPr>
               <a:t>Sixth Outline Level</a:t>
             </a:r>
             <a:endParaRPr b="0" lang="en-US" sz="2000" spc="-1" strike="noStrike">
-              <a:solidFill>
-                <a:srgbClr val="000000"/>
-              </a:solidFill>
               <a:latin typeface="Arial"/>
             </a:endParaRPr>
           </a:p>
@@ -6191,17 +5775,11 @@
             </a:pPr>
             <a:r>
               <a:rPr b="0" lang="en-US" sz="2000" spc="-1" strike="noStrike">
-                <a:solidFill>
-                  <a:srgbClr val="000000"/>
-                </a:solidFill>
                 <a:latin typeface="Arial"/>
               </a:rPr>
               <a:t>Seventh Outline Level</a:t>
             </a:r>
             <a:endParaRPr b="0" lang="en-US" sz="2000" spc="-1" strike="noStrike">
-              <a:solidFill>
-                <a:srgbClr val="000000"/>
-              </a:solidFill>
               <a:latin typeface="Arial"/>
             </a:endParaRPr>
           </a:p>
@@ -6264,7 +5842,7 @@
         <p:spPr>
           <a:xfrm>
             <a:off x="12608280" y="9347400"/>
-            <a:ext cx="370080" cy="368280"/>
+            <a:ext cx="369720" cy="367920"/>
           </a:xfrm>
           <a:prstGeom prst="rect">
             <a:avLst/>
@@ -6289,7 +5867,7 @@
         <p:spPr>
           <a:xfrm>
             <a:off x="360" y="9307800"/>
-            <a:ext cx="13003200" cy="447840"/>
+            <a:ext cx="13002840" cy="447480"/>
           </a:xfrm>
           <a:prstGeom prst="rect">
             <a:avLst/>
@@ -6323,28 +5901,14 @@
             <a:noAutofit/>
           </a:bodyPr>
           <a:p>
+            <a:pPr algn="ctr"/>
             <a:r>
-              <a:rPr b="0" lang="en-US" sz="1800" spc="-1" strike="noStrike">
-                <a:solidFill>
-                  <a:srgbClr val="000000"/>
-                </a:solidFill>
+              <a:rPr b="0" lang="en-US" sz="4400" spc="-1" strike="noStrike">
                 <a:latin typeface="Arial"/>
               </a:rPr>
-              <a:t>Click to edit the </a:t>
+              <a:t>Click to edit the title text format</a:t>
             </a:r>
-            <a:r>
-              <a:rPr b="0" lang="en-US" sz="1800" spc="-1" strike="noStrike">
-                <a:solidFill>
-                  <a:srgbClr val="000000"/>
-                </a:solidFill>
-                <a:latin typeface="Arial"/>
-              </a:rPr>
-              <a:t>title text format</a:t>
-            </a:r>
-            <a:endParaRPr b="0" lang="en-US" sz="1800" spc="-1" strike="noStrike">
-              <a:solidFill>
-                <a:srgbClr val="000000"/>
-              </a:solidFill>
+            <a:endParaRPr b="0" lang="en-US" sz="4400" spc="-1" strike="noStrike">
               <a:latin typeface="Arial"/>
             </a:endParaRPr>
           </a:p>
@@ -6386,18 +5950,12 @@
               <a:buChar char=""/>
             </a:pPr>
             <a:r>
-              <a:rPr b="0" lang="en-US" sz="2800" spc="-1" strike="noStrike">
-                <a:solidFill>
-                  <a:srgbClr val="000000"/>
-                </a:solidFill>
+              <a:rPr b="0" lang="en-US" sz="3200" spc="-1" strike="noStrike">
                 <a:latin typeface="Arial"/>
               </a:rPr>
               <a:t>Click to edit the outline text format</a:t>
             </a:r>
-            <a:endParaRPr b="0" lang="en-US" sz="2800" spc="-1" strike="noStrike">
-              <a:solidFill>
-                <a:srgbClr val="000000"/>
-              </a:solidFill>
+            <a:endParaRPr b="0" lang="en-US" sz="3200" spc="-1" strike="noStrike">
               <a:latin typeface="Arial"/>
             </a:endParaRPr>
           </a:p>
@@ -6414,18 +5972,12 @@
               <a:buChar char=""/>
             </a:pPr>
             <a:r>
-              <a:rPr b="0" lang="en-US" sz="2000" spc="-1" strike="noStrike">
-                <a:solidFill>
-                  <a:srgbClr val="000000"/>
-                </a:solidFill>
+              <a:rPr b="0" lang="en-US" sz="2800" spc="-1" strike="noStrike">
                 <a:latin typeface="Arial"/>
               </a:rPr>
               <a:t>Second Outline Level</a:t>
             </a:r>
-            <a:endParaRPr b="0" lang="en-US" sz="2000" spc="-1" strike="noStrike">
-              <a:solidFill>
-                <a:srgbClr val="000000"/>
-              </a:solidFill>
+            <a:endParaRPr b="0" lang="en-US" sz="2800" spc="-1" strike="noStrike">
               <a:latin typeface="Arial"/>
             </a:endParaRPr>
           </a:p>
@@ -6442,18 +5994,12 @@
               <a:buChar char=""/>
             </a:pPr>
             <a:r>
-              <a:rPr b="0" lang="en-US" sz="1800" spc="-1" strike="noStrike">
-                <a:solidFill>
-                  <a:srgbClr val="000000"/>
-                </a:solidFill>
+              <a:rPr b="0" lang="en-US" sz="2400" spc="-1" strike="noStrike">
                 <a:latin typeface="Arial"/>
               </a:rPr>
               <a:t>Third Outline Level</a:t>
             </a:r>
-            <a:endParaRPr b="0" lang="en-US" sz="1800" spc="-1" strike="noStrike">
-              <a:solidFill>
-                <a:srgbClr val="000000"/>
-              </a:solidFill>
+            <a:endParaRPr b="0" lang="en-US" sz="2400" spc="-1" strike="noStrike">
               <a:latin typeface="Arial"/>
             </a:endParaRPr>
           </a:p>
@@ -6470,18 +6016,12 @@
               <a:buChar char=""/>
             </a:pPr>
             <a:r>
-              <a:rPr b="0" lang="en-US" sz="1800" spc="-1" strike="noStrike">
-                <a:solidFill>
-                  <a:srgbClr val="000000"/>
-                </a:solidFill>
+              <a:rPr b="0" lang="en-US" sz="2000" spc="-1" strike="noStrike">
                 <a:latin typeface="Arial"/>
               </a:rPr>
               <a:t>Fourth Outline Level</a:t>
             </a:r>
-            <a:endParaRPr b="0" lang="en-US" sz="1800" spc="-1" strike="noStrike">
-              <a:solidFill>
-                <a:srgbClr val="000000"/>
-              </a:solidFill>
+            <a:endParaRPr b="0" lang="en-US" sz="2000" spc="-1" strike="noStrike">
               <a:latin typeface="Arial"/>
             </a:endParaRPr>
           </a:p>
@@ -6499,17 +6039,11 @@
             </a:pPr>
             <a:r>
               <a:rPr b="0" lang="en-US" sz="2000" spc="-1" strike="noStrike">
-                <a:solidFill>
-                  <a:srgbClr val="000000"/>
-                </a:solidFill>
                 <a:latin typeface="Arial"/>
               </a:rPr>
               <a:t>Fifth Outline Level</a:t>
             </a:r>
             <a:endParaRPr b="0" lang="en-US" sz="2000" spc="-1" strike="noStrike">
-              <a:solidFill>
-                <a:srgbClr val="000000"/>
-              </a:solidFill>
               <a:latin typeface="Arial"/>
             </a:endParaRPr>
           </a:p>
@@ -6527,17 +6061,11 @@
             </a:pPr>
             <a:r>
               <a:rPr b="0" lang="en-US" sz="2000" spc="-1" strike="noStrike">
-                <a:solidFill>
-                  <a:srgbClr val="000000"/>
-                </a:solidFill>
                 <a:latin typeface="Arial"/>
               </a:rPr>
               <a:t>Sixth Outline Level</a:t>
             </a:r>
             <a:endParaRPr b="0" lang="en-US" sz="2000" spc="-1" strike="noStrike">
-              <a:solidFill>
-                <a:srgbClr val="000000"/>
-              </a:solidFill>
               <a:latin typeface="Arial"/>
             </a:endParaRPr>
           </a:p>
@@ -6555,17 +6083,11 @@
             </a:pPr>
             <a:r>
               <a:rPr b="0" lang="en-US" sz="2000" spc="-1" strike="noStrike">
-                <a:solidFill>
-                  <a:srgbClr val="000000"/>
-                </a:solidFill>
                 <a:latin typeface="Arial"/>
               </a:rPr>
               <a:t>Seventh Outline Level</a:t>
             </a:r>
             <a:endParaRPr b="0" lang="en-US" sz="2000" spc="-1" strike="noStrike">
-              <a:solidFill>
-                <a:srgbClr val="000000"/>
-              </a:solidFill>
               <a:latin typeface="Arial"/>
             </a:endParaRPr>
           </a:p>
@@ -6628,7 +6150,7 @@
         <p:spPr>
           <a:xfrm>
             <a:off x="12608280" y="9347400"/>
-            <a:ext cx="370080" cy="368280"/>
+            <a:ext cx="369720" cy="367920"/>
           </a:xfrm>
           <a:prstGeom prst="rect">
             <a:avLst/>
@@ -6653,7 +6175,7 @@
         <p:spPr>
           <a:xfrm>
             <a:off x="360" y="9307800"/>
-            <a:ext cx="13003200" cy="447840"/>
+            <a:ext cx="13002840" cy="447480"/>
           </a:xfrm>
           <a:prstGeom prst="rect">
             <a:avLst/>
@@ -6676,7 +6198,7 @@
         <p:spPr>
           <a:xfrm>
             <a:off x="650160" y="389160"/>
-            <a:ext cx="11702880" cy="1627560"/>
+            <a:ext cx="11703240" cy="1627920"/>
           </a:xfrm>
           <a:prstGeom prst="rect">
             <a:avLst/>
@@ -6688,45 +6210,216 @@
           </a:bodyPr>
           <a:p>
             <a:r>
-              <a:rPr b="0" lang="en-US" sz="4400" spc="-1" strike="noStrike">
-                <a:solidFill>
-                  <a:srgbClr val="000000"/>
-                </a:solidFill>
+              <a:rPr b="0" lang="en-US" sz="1800" spc="-1" strike="noStrike">
                 <a:latin typeface="Arial"/>
               </a:rPr>
-              <a:t>Click to </a:t>
+              <a:t>C</a:t>
             </a:r>
             <a:r>
-              <a:rPr b="0" lang="en-US" sz="4400" spc="-1" strike="noStrike">
-                <a:solidFill>
-                  <a:srgbClr val="000000"/>
-                </a:solidFill>
+              <a:rPr b="0" lang="en-US" sz="1800" spc="-1" strike="noStrike">
                 <a:latin typeface="Arial"/>
               </a:rPr>
-              <a:t>edit the </a:t>
+              <a:t>l</a:t>
             </a:r>
             <a:r>
-              <a:rPr b="0" lang="en-US" sz="4400" spc="-1" strike="noStrike">
-                <a:solidFill>
-                  <a:srgbClr val="000000"/>
-                </a:solidFill>
+              <a:rPr b="0" lang="en-US" sz="1800" spc="-1" strike="noStrike">
                 <a:latin typeface="Arial"/>
               </a:rPr>
-              <a:t>title text </a:t>
+              <a:t>i</a:t>
             </a:r>
             <a:r>
-              <a:rPr b="0" lang="en-US" sz="4400" spc="-1" strike="noStrike">
-                <a:solidFill>
-                  <a:srgbClr val="000000"/>
-                </a:solidFill>
+              <a:rPr b="0" lang="en-US" sz="1800" spc="-1" strike="noStrike">
                 <a:latin typeface="Arial"/>
               </a:rPr>
-              <a:t>format</a:t>
+              <a:t>c</a:t>
             </a:r>
-            <a:endParaRPr b="0" lang="en-US" sz="4400" spc="-1" strike="noStrike">
-              <a:solidFill>
-                <a:srgbClr val="000000"/>
-              </a:solidFill>
+            <a:r>
+              <a:rPr b="0" lang="en-US" sz="1800" spc="-1" strike="noStrike">
+                <a:latin typeface="Arial"/>
+              </a:rPr>
+              <a:t>k</a:t>
+            </a:r>
+            <a:r>
+              <a:rPr b="0" lang="en-US" sz="1800" spc="-1" strike="noStrike">
+                <a:latin typeface="Arial"/>
+              </a:rPr>
+              <a:t> </a:t>
+            </a:r>
+            <a:r>
+              <a:rPr b="0" lang="en-US" sz="1800" spc="-1" strike="noStrike">
+                <a:latin typeface="Arial"/>
+              </a:rPr>
+              <a:t>t</a:t>
+            </a:r>
+            <a:r>
+              <a:rPr b="0" lang="en-US" sz="1800" spc="-1" strike="noStrike">
+                <a:latin typeface="Arial"/>
+              </a:rPr>
+              <a:t>o</a:t>
+            </a:r>
+            <a:r>
+              <a:rPr b="0" lang="en-US" sz="1800" spc="-1" strike="noStrike">
+                <a:latin typeface="Arial"/>
+              </a:rPr>
+              <a:t> </a:t>
+            </a:r>
+            <a:r>
+              <a:rPr b="0" lang="en-US" sz="1800" spc="-1" strike="noStrike">
+                <a:latin typeface="Arial"/>
+              </a:rPr>
+              <a:t>e</a:t>
+            </a:r>
+            <a:r>
+              <a:rPr b="0" lang="en-US" sz="1800" spc="-1" strike="noStrike">
+                <a:latin typeface="Arial"/>
+              </a:rPr>
+              <a:t>d</a:t>
+            </a:r>
+            <a:r>
+              <a:rPr b="0" lang="en-US" sz="1800" spc="-1" strike="noStrike">
+                <a:latin typeface="Arial"/>
+              </a:rPr>
+              <a:t>i</a:t>
+            </a:r>
+            <a:r>
+              <a:rPr b="0" lang="en-US" sz="1800" spc="-1" strike="noStrike">
+                <a:latin typeface="Arial"/>
+              </a:rPr>
+              <a:t>t</a:t>
+            </a:r>
+            <a:r>
+              <a:rPr b="0" lang="en-US" sz="1800" spc="-1" strike="noStrike">
+                <a:latin typeface="Arial"/>
+              </a:rPr>
+              <a:t> </a:t>
+            </a:r>
+            <a:r>
+              <a:rPr b="0" lang="en-US" sz="1800" spc="-1" strike="noStrike">
+                <a:latin typeface="Arial"/>
+              </a:rPr>
+              <a:t>t</a:t>
+            </a:r>
+            <a:r>
+              <a:rPr b="0" lang="en-US" sz="1800" spc="-1" strike="noStrike">
+                <a:latin typeface="Arial"/>
+              </a:rPr>
+              <a:t>h</a:t>
+            </a:r>
+            <a:r>
+              <a:rPr b="0" lang="en-US" sz="1800" spc="-1" strike="noStrike">
+                <a:latin typeface="Arial"/>
+              </a:rPr>
+              <a:t>e</a:t>
+            </a:r>
+            <a:r>
+              <a:rPr b="0" lang="en-US" sz="1800" spc="-1" strike="noStrike">
+                <a:latin typeface="Arial"/>
+              </a:rPr>
+              <a:t> </a:t>
+            </a:r>
+            <a:r>
+              <a:rPr b="0" lang="en-US" sz="1800" spc="-1" strike="noStrike">
+                <a:latin typeface="Arial"/>
+              </a:rPr>
+              <a:t>t</a:t>
+            </a:r>
+            <a:r>
+              <a:rPr b="0" lang="en-US" sz="1800" spc="-1" strike="noStrike">
+                <a:latin typeface="Arial"/>
+              </a:rPr>
+              <a:t>i</a:t>
+            </a:r>
+            <a:r>
+              <a:rPr b="0" lang="en-US" sz="1800" spc="-1" strike="noStrike">
+                <a:latin typeface="Arial"/>
+              </a:rPr>
+              <a:t>t</a:t>
+            </a:r>
+            <a:r>
+              <a:rPr b="0" lang="en-US" sz="1800" spc="-1" strike="noStrike">
+                <a:latin typeface="Arial"/>
+              </a:rPr>
+              <a:t>l</a:t>
+            </a:r>
+            <a:r>
+              <a:rPr b="0" lang="en-US" sz="1800" spc="-1" strike="noStrike">
+                <a:latin typeface="Arial"/>
+              </a:rPr>
+              <a:t>e</a:t>
+            </a:r>
+            <a:r>
+              <a:rPr b="0" lang="en-US" sz="1800" spc="-1" strike="noStrike">
+                <a:latin typeface="Arial"/>
+              </a:rPr>
+              <a:t> </a:t>
+            </a:r>
+            <a:r>
+              <a:rPr b="0" lang="en-US" sz="1800" spc="-1" strike="noStrike">
+                <a:latin typeface="Arial"/>
+              </a:rPr>
+              <a:t>t</a:t>
+            </a:r>
+            <a:r>
+              <a:rPr b="0" lang="en-US" sz="1800" spc="-1" strike="noStrike">
+                <a:latin typeface="Arial"/>
+              </a:rPr>
+              <a:t>e</a:t>
+            </a:r>
+            <a:r>
+              <a:rPr b="0" lang="en-US" sz="1800" spc="-1" strike="noStrike">
+                <a:latin typeface="Arial"/>
+              </a:rPr>
+              <a:t>x</a:t>
+            </a:r>
+            <a:r>
+              <a:rPr b="0" lang="en-US" sz="1800" spc="-1" strike="noStrike">
+                <a:latin typeface="Arial"/>
+              </a:rPr>
+              <a:t>t</a:t>
+            </a:r>
+            <a:r>
+              <a:rPr b="0" lang="en-US" sz="1800" spc="-1" strike="noStrike">
+                <a:latin typeface="Arial"/>
+              </a:rPr>
+              <a:t> </a:t>
+            </a:r>
+            <a:r>
+              <a:rPr b="0" lang="en-US" sz="1800" spc="-1" strike="noStrike">
+                <a:latin typeface="Arial"/>
+              </a:rPr>
+              <a:t>f</a:t>
+            </a:r>
+            <a:r>
+              <a:rPr b="0" lang="en-US" sz="1800" spc="-1" strike="noStrike">
+                <a:latin typeface="Arial"/>
+              </a:rPr>
+              <a:t>o</a:t>
+            </a:r>
+            <a:r>
+              <a:rPr b="0" lang="en-US" sz="1800" spc="-1" strike="noStrike">
+                <a:latin typeface="Arial"/>
+              </a:rPr>
+              <a:t>r</a:t>
+            </a:r>
+            <a:r>
+              <a:rPr b="0" lang="en-US" sz="1800" spc="-1" strike="noStrike">
+                <a:latin typeface="Arial"/>
+              </a:rPr>
+              <a:t>m</a:t>
+            </a:r>
+            <a:r>
+              <a:rPr b="0" lang="en-US" sz="1800" spc="-1" strike="noStrike">
+                <a:latin typeface="Arial"/>
+              </a:rPr>
+              <a:t>a</a:t>
+            </a:r>
+            <a:r>
+              <a:rPr b="0" lang="en-US" sz="1800" spc="-1" strike="noStrike">
+                <a:latin typeface="Arial"/>
+              </a:rPr>
+              <a:t>t</a:t>
+            </a:r>
+            <a:endParaRPr b="0" lang="en-US" sz="1800" spc="-1" strike="noStrike">
               <a:latin typeface="Arial"/>
             </a:endParaRPr>
           </a:p>
@@ -6745,7 +6438,7 @@
         <p:spPr>
           <a:xfrm>
             <a:off x="650160" y="2282040"/>
-            <a:ext cx="11703600" cy="5656320"/>
+            <a:ext cx="11703240" cy="5655960"/>
           </a:xfrm>
           <a:prstGeom prst="rect">
             <a:avLst/>
@@ -6768,18 +6461,12 @@
               <a:buChar char=""/>
             </a:pPr>
             <a:r>
-              <a:rPr b="0" lang="en-US" sz="2800" spc="-1" strike="noStrike">
-                <a:solidFill>
-                  <a:srgbClr val="000000"/>
-                </a:solidFill>
+              <a:rPr b="0" lang="en-US" sz="1800" spc="-1" strike="noStrike">
                 <a:latin typeface="Arial"/>
               </a:rPr>
               <a:t>Click to edit the outline text format</a:t>
             </a:r>
-            <a:endParaRPr b="0" lang="en-US" sz="2800" spc="-1" strike="noStrike">
-              <a:solidFill>
-                <a:srgbClr val="000000"/>
-              </a:solidFill>
+            <a:endParaRPr b="0" lang="en-US" sz="1800" spc="-1" strike="noStrike">
               <a:latin typeface="Arial"/>
             </a:endParaRPr>
           </a:p>
@@ -6796,18 +6483,12 @@
               <a:buChar char=""/>
             </a:pPr>
             <a:r>
-              <a:rPr b="0" lang="en-US" sz="2000" spc="-1" strike="noStrike">
-                <a:solidFill>
-                  <a:srgbClr val="000000"/>
-                </a:solidFill>
+              <a:rPr b="0" lang="en-US" sz="1800" spc="-1" strike="noStrike">
                 <a:latin typeface="Arial"/>
               </a:rPr>
               <a:t>Second Outline Level</a:t>
             </a:r>
-            <a:endParaRPr b="0" lang="en-US" sz="2000" spc="-1" strike="noStrike">
-              <a:solidFill>
-                <a:srgbClr val="000000"/>
-              </a:solidFill>
+            <a:endParaRPr b="0" lang="en-US" sz="1800" spc="-1" strike="noStrike">
               <a:latin typeface="Arial"/>
             </a:endParaRPr>
           </a:p>
@@ -6825,17 +6506,11 @@
             </a:pPr>
             <a:r>
               <a:rPr b="0" lang="en-US" sz="1800" spc="-1" strike="noStrike">
-                <a:solidFill>
-                  <a:srgbClr val="000000"/>
-                </a:solidFill>
                 <a:latin typeface="Arial"/>
               </a:rPr>
               <a:t>Third Outline Level</a:t>
             </a:r>
             <a:endParaRPr b="0" lang="en-US" sz="1800" spc="-1" strike="noStrike">
-              <a:solidFill>
-                <a:srgbClr val="000000"/>
-              </a:solidFill>
               <a:latin typeface="Arial"/>
             </a:endParaRPr>
           </a:p>
@@ -6853,17 +6528,11 @@
             </a:pPr>
             <a:r>
               <a:rPr b="0" lang="en-US" sz="1800" spc="-1" strike="noStrike">
-                <a:solidFill>
-                  <a:srgbClr val="000000"/>
-                </a:solidFill>
                 <a:latin typeface="Arial"/>
               </a:rPr>
               <a:t>Fourth Outline Level</a:t>
             </a:r>
             <a:endParaRPr b="0" lang="en-US" sz="1800" spc="-1" strike="noStrike">
-              <a:solidFill>
-                <a:srgbClr val="000000"/>
-              </a:solidFill>
               <a:latin typeface="Arial"/>
             </a:endParaRPr>
           </a:p>
@@ -6880,18 +6549,12 @@
               <a:buChar char=""/>
             </a:pPr>
             <a:r>
-              <a:rPr b="0" lang="en-US" sz="2000" spc="-1" strike="noStrike">
-                <a:solidFill>
-                  <a:srgbClr val="000000"/>
-                </a:solidFill>
+              <a:rPr b="0" lang="en-US" sz="1800" spc="-1" strike="noStrike">
                 <a:latin typeface="Arial"/>
               </a:rPr>
               <a:t>Fifth Outline Level</a:t>
             </a:r>
-            <a:endParaRPr b="0" lang="en-US" sz="2000" spc="-1" strike="noStrike">
-              <a:solidFill>
-                <a:srgbClr val="000000"/>
-              </a:solidFill>
+            <a:endParaRPr b="0" lang="en-US" sz="1800" spc="-1" strike="noStrike">
               <a:latin typeface="Arial"/>
             </a:endParaRPr>
           </a:p>
@@ -6908,18 +6571,12 @@
               <a:buChar char=""/>
             </a:pPr>
             <a:r>
-              <a:rPr b="0" lang="en-US" sz="2000" spc="-1" strike="noStrike">
-                <a:solidFill>
-                  <a:srgbClr val="000000"/>
-                </a:solidFill>
+              <a:rPr b="0" lang="en-US" sz="1800" spc="-1" strike="noStrike">
                 <a:latin typeface="Arial"/>
               </a:rPr>
               <a:t>Sixth Outline Level</a:t>
             </a:r>
-            <a:endParaRPr b="0" lang="en-US" sz="2000" spc="-1" strike="noStrike">
-              <a:solidFill>
-                <a:srgbClr val="000000"/>
-              </a:solidFill>
+            <a:endParaRPr b="0" lang="en-US" sz="1800" spc="-1" strike="noStrike">
               <a:latin typeface="Arial"/>
             </a:endParaRPr>
           </a:p>
@@ -6936,18 +6593,12 @@
               <a:buChar char=""/>
             </a:pPr>
             <a:r>
-              <a:rPr b="0" lang="en-US" sz="2000" spc="-1" strike="noStrike">
-                <a:solidFill>
-                  <a:srgbClr val="000000"/>
-                </a:solidFill>
+              <a:rPr b="0" lang="en-US" sz="1800" spc="-1" strike="noStrike">
                 <a:latin typeface="Arial"/>
               </a:rPr>
               <a:t>Seventh Outline Level</a:t>
             </a:r>
-            <a:endParaRPr b="0" lang="en-US" sz="2000" spc="-1" strike="noStrike">
-              <a:solidFill>
-                <a:srgbClr val="000000"/>
-              </a:solidFill>
+            <a:endParaRPr b="0" lang="en-US" sz="1800" spc="-1" strike="noStrike">
               <a:latin typeface="Arial"/>
             </a:endParaRPr>
           </a:p>
@@ -7010,7 +6661,7 @@
         <p:spPr>
           <a:xfrm>
             <a:off x="12608280" y="9347400"/>
-            <a:ext cx="370080" cy="368280"/>
+            <a:ext cx="369720" cy="367920"/>
           </a:xfrm>
           <a:prstGeom prst="rect">
             <a:avLst/>
@@ -7035,7 +6686,7 @@
         <p:spPr>
           <a:xfrm>
             <a:off x="360" y="9307800"/>
-            <a:ext cx="13003200" cy="447840"/>
+            <a:ext cx="13002840" cy="447480"/>
           </a:xfrm>
           <a:prstGeom prst="rect">
             <a:avLst/>
@@ -7058,7 +6709,7 @@
         <p:spPr>
           <a:xfrm>
             <a:off x="6399000" y="3334320"/>
-            <a:ext cx="4800960" cy="2119320"/>
+            <a:ext cx="4800600" cy="2118960"/>
           </a:xfrm>
           <a:prstGeom prst="rect">
             <a:avLst/>
@@ -7081,7 +6732,7 @@
         <p:spPr>
           <a:xfrm>
             <a:off x="1803600" y="3334320"/>
-            <a:ext cx="2116080" cy="2119320"/>
+            <a:ext cx="2115720" cy="2118960"/>
           </a:xfrm>
           <a:prstGeom prst="rect">
             <a:avLst/>
@@ -7115,19 +6766,14 @@
             <a:noAutofit/>
           </a:bodyPr>
           <a:p>
+            <a:pPr algn="ctr"/>
             <a:r>
-              <a:rPr b="0" lang="en-US" sz="1800" spc="-1" strike="noStrike">
-                <a:solidFill>
-                  <a:srgbClr val="000000"/>
-                </a:solidFill>
+              <a:rPr b="0" lang="en-US" sz="4400" spc="-1" strike="noStrike">
                 <a:latin typeface="Arial"/>
               </a:rPr>
               <a:t>Click to edit the title text format</a:t>
             </a:r>
-            <a:endParaRPr b="0" lang="en-US" sz="1800" spc="-1" strike="noStrike">
-              <a:solidFill>
-                <a:srgbClr val="000000"/>
-              </a:solidFill>
+            <a:endParaRPr b="0" lang="en-US" sz="4400" spc="-1" strike="noStrike">
               <a:latin typeface="Arial"/>
             </a:endParaRPr>
           </a:p>
@@ -7169,18 +6815,12 @@
               <a:buChar char=""/>
             </a:pPr>
             <a:r>
-              <a:rPr b="0" lang="en-US" sz="2800" spc="-1" strike="noStrike">
-                <a:solidFill>
-                  <a:srgbClr val="000000"/>
-                </a:solidFill>
+              <a:rPr b="0" lang="en-US" sz="3200" spc="-1" strike="noStrike">
                 <a:latin typeface="Arial"/>
               </a:rPr>
               <a:t>Click to edit the outline text format</a:t>
             </a:r>
-            <a:endParaRPr b="0" lang="en-US" sz="2800" spc="-1" strike="noStrike">
-              <a:solidFill>
-                <a:srgbClr val="000000"/>
-              </a:solidFill>
+            <a:endParaRPr b="0" lang="en-US" sz="3200" spc="-1" strike="noStrike">
               <a:latin typeface="Arial"/>
             </a:endParaRPr>
           </a:p>
@@ -7197,18 +6837,12 @@
               <a:buChar char=""/>
             </a:pPr>
             <a:r>
-              <a:rPr b="0" lang="en-US" sz="2000" spc="-1" strike="noStrike">
-                <a:solidFill>
-                  <a:srgbClr val="000000"/>
-                </a:solidFill>
+              <a:rPr b="0" lang="en-US" sz="2800" spc="-1" strike="noStrike">
                 <a:latin typeface="Arial"/>
               </a:rPr>
               <a:t>Second Outline Level</a:t>
             </a:r>
-            <a:endParaRPr b="0" lang="en-US" sz="2000" spc="-1" strike="noStrike">
-              <a:solidFill>
-                <a:srgbClr val="000000"/>
-              </a:solidFill>
+            <a:endParaRPr b="0" lang="en-US" sz="2800" spc="-1" strike="noStrike">
               <a:latin typeface="Arial"/>
             </a:endParaRPr>
           </a:p>
@@ -7225,18 +6859,12 @@
               <a:buChar char=""/>
             </a:pPr>
             <a:r>
-              <a:rPr b="0" lang="en-US" sz="1800" spc="-1" strike="noStrike">
-                <a:solidFill>
-                  <a:srgbClr val="000000"/>
-                </a:solidFill>
+              <a:rPr b="0" lang="en-US" sz="2400" spc="-1" strike="noStrike">
                 <a:latin typeface="Arial"/>
               </a:rPr>
               <a:t>Third Outline Level</a:t>
             </a:r>
-            <a:endParaRPr b="0" lang="en-US" sz="1800" spc="-1" strike="noStrike">
-              <a:solidFill>
-                <a:srgbClr val="000000"/>
-              </a:solidFill>
+            <a:endParaRPr b="0" lang="en-US" sz="2400" spc="-1" strike="noStrike">
               <a:latin typeface="Arial"/>
             </a:endParaRPr>
           </a:p>
@@ -7253,18 +6881,12 @@
               <a:buChar char=""/>
             </a:pPr>
             <a:r>
-              <a:rPr b="0" lang="en-US" sz="1800" spc="-1" strike="noStrike">
-                <a:solidFill>
-                  <a:srgbClr val="000000"/>
-                </a:solidFill>
+              <a:rPr b="0" lang="en-US" sz="2000" spc="-1" strike="noStrike">
                 <a:latin typeface="Arial"/>
               </a:rPr>
               <a:t>Fourth Outline Level</a:t>
             </a:r>
-            <a:endParaRPr b="0" lang="en-US" sz="1800" spc="-1" strike="noStrike">
-              <a:solidFill>
-                <a:srgbClr val="000000"/>
-              </a:solidFill>
+            <a:endParaRPr b="0" lang="en-US" sz="2000" spc="-1" strike="noStrike">
               <a:latin typeface="Arial"/>
             </a:endParaRPr>
           </a:p>
@@ -7282,17 +6904,11 @@
             </a:pPr>
             <a:r>
               <a:rPr b="0" lang="en-US" sz="2000" spc="-1" strike="noStrike">
-                <a:solidFill>
-                  <a:srgbClr val="000000"/>
-                </a:solidFill>
                 <a:latin typeface="Arial"/>
               </a:rPr>
               <a:t>Fifth Outline Level</a:t>
             </a:r>
             <a:endParaRPr b="0" lang="en-US" sz="2000" spc="-1" strike="noStrike">
-              <a:solidFill>
-                <a:srgbClr val="000000"/>
-              </a:solidFill>
               <a:latin typeface="Arial"/>
             </a:endParaRPr>
           </a:p>
@@ -7310,17 +6926,11 @@
             </a:pPr>
             <a:r>
               <a:rPr b="0" lang="en-US" sz="2000" spc="-1" strike="noStrike">
-                <a:solidFill>
-                  <a:srgbClr val="000000"/>
-                </a:solidFill>
                 <a:latin typeface="Arial"/>
               </a:rPr>
               <a:t>Sixth Outline Level</a:t>
             </a:r>
             <a:endParaRPr b="0" lang="en-US" sz="2000" spc="-1" strike="noStrike">
-              <a:solidFill>
-                <a:srgbClr val="000000"/>
-              </a:solidFill>
               <a:latin typeface="Arial"/>
             </a:endParaRPr>
           </a:p>
@@ -7338,17 +6948,11 @@
             </a:pPr>
             <a:r>
               <a:rPr b="0" lang="en-US" sz="2000" spc="-1" strike="noStrike">
-                <a:solidFill>
-                  <a:srgbClr val="000000"/>
-                </a:solidFill>
                 <a:latin typeface="Arial"/>
               </a:rPr>
               <a:t>Seventh Outline Level</a:t>
             </a:r>
             <a:endParaRPr b="0" lang="en-US" sz="2000" spc="-1" strike="noStrike">
-              <a:solidFill>
-                <a:srgbClr val="000000"/>
-              </a:solidFill>
               <a:latin typeface="Arial"/>
             </a:endParaRPr>
           </a:p>
@@ -7400,7 +7004,7 @@
         <p:spPr>
           <a:xfrm>
             <a:off x="2226240" y="3344040"/>
-            <a:ext cx="10463760" cy="1581120"/>
+            <a:ext cx="10463400" cy="1580760"/>
           </a:xfrm>
           <a:prstGeom prst="rect">
             <a:avLst/>
@@ -7461,7 +7065,7 @@
         <p:spPr>
           <a:xfrm>
             <a:off x="2226240" y="5035680"/>
-            <a:ext cx="10463760" cy="2112120"/>
+            <a:ext cx="10463400" cy="2111760"/>
           </a:xfrm>
           <a:prstGeom prst="rect">
             <a:avLst/>
@@ -7561,7 +7165,7 @@
         <p:spPr>
           <a:xfrm>
             <a:off x="3858120" y="8402040"/>
-            <a:ext cx="7200000" cy="698400"/>
+            <a:ext cx="7199640" cy="698040"/>
           </a:xfrm>
           <a:prstGeom prst="rect">
             <a:avLst/>
@@ -7641,8 +7245,8 @@
         </p:nvSpPr>
         <p:spPr>
           <a:xfrm>
-            <a:off x="952560" y="2603520"/>
-            <a:ext cx="11098800" cy="6285600"/>
+            <a:off x="64080" y="457560"/>
+            <a:ext cx="13003560" cy="2157480"/>
           </a:xfrm>
           <a:prstGeom prst="rect">
             <a:avLst/>
@@ -7663,7 +7267,371 @@
             <a:noAutofit/>
           </a:bodyPr>
           <a:p>
-            <a:pPr marL="444600" indent="-443520">
+            <a:pPr algn="ctr">
+              <a:lnSpc>
+                <a:spcPct val="100000"/>
+              </a:lnSpc>
+            </a:pPr>
+            <a:r>
+              <a:rPr b="1" lang="en-US" sz="5400" spc="-1" strike="noStrike">
+                <a:solidFill>
+                  <a:srgbClr val="000000"/>
+                </a:solidFill>
+                <a:latin typeface="Arial"/>
+                <a:ea typeface="Franklin Gothic Book"/>
+              </a:rPr>
+              <a:t>Procesarea – Semnalului</a:t>
+            </a:r>
+            <a:endParaRPr b="0" lang="en-US" sz="5400" spc="-1" strike="noStrike">
+              <a:latin typeface="Arial"/>
+            </a:endParaRPr>
+          </a:p>
+          <a:p>
+            <a:pPr algn="ctr">
+              <a:lnSpc>
+                <a:spcPct val="100000"/>
+              </a:lnSpc>
+            </a:pPr>
+            <a:r>
+              <a:rPr b="1" lang="en-US" sz="5400" spc="-1" strike="noStrike">
+                <a:solidFill>
+                  <a:srgbClr val="000000"/>
+                </a:solidFill>
+                <a:latin typeface="Arial"/>
+                <a:ea typeface="Franklin Gothic Book"/>
+              </a:rPr>
+              <a:t>Smoothing</a:t>
+            </a:r>
+            <a:endParaRPr b="0" lang="en-US" sz="5400" spc="-1" strike="noStrike">
+              <a:latin typeface="Arial"/>
+            </a:endParaRPr>
+          </a:p>
+          <a:p>
+            <a:pPr algn="ctr">
+              <a:lnSpc>
+                <a:spcPct val="100000"/>
+              </a:lnSpc>
+            </a:pPr>
+            <a:r>
+              <a:rPr b="1" lang="en-US" sz="5400" spc="-1" strike="noStrike">
+                <a:solidFill>
+                  <a:srgbClr val="000000"/>
+                </a:solidFill>
+                <a:latin typeface="Arial"/>
+                <a:ea typeface="Franklin Gothic Book"/>
+              </a:rPr>
+              <a:t>(Functia Dirac delta)</a:t>
+            </a:r>
+            <a:endParaRPr b="0" lang="en-US" sz="5400" spc="-1" strike="noStrike">
+              <a:latin typeface="Arial"/>
+            </a:endParaRPr>
+          </a:p>
+        </p:txBody>
+      </p:sp>
+      <p:pic>
+        <p:nvPicPr>
+          <p:cNvPr id="254" name="" descr=""/>
+          <p:cNvPicPr/>
+          <p:nvPr/>
+        </p:nvPicPr>
+        <p:blipFill>
+          <a:blip r:embed="rId1"/>
+          <a:stretch/>
+        </p:blipFill>
+        <p:spPr>
+          <a:xfrm>
+            <a:off x="570960" y="3123720"/>
+            <a:ext cx="6012720" cy="5901840"/>
+          </a:xfrm>
+          <a:prstGeom prst="rect">
+            <a:avLst/>
+          </a:prstGeom>
+          <a:ln>
+            <a:noFill/>
+          </a:ln>
+        </p:spPr>
+      </p:pic>
+      <p:pic>
+        <p:nvPicPr>
+          <p:cNvPr id="255" name="" descr=""/>
+          <p:cNvPicPr/>
+          <p:nvPr/>
+        </p:nvPicPr>
+        <p:blipFill>
+          <a:blip r:embed="rId2"/>
+          <a:stretch/>
+        </p:blipFill>
+        <p:spPr>
+          <a:xfrm>
+            <a:off x="6417000" y="2743200"/>
+            <a:ext cx="6293160" cy="5943600"/>
+          </a:xfrm>
+          <a:prstGeom prst="rect">
+            <a:avLst/>
+          </a:prstGeom>
+          <a:ln>
+            <a:noFill/>
+          </a:ln>
+        </p:spPr>
+      </p:pic>
+      <p:sp>
+        <p:nvSpPr>
+          <p:cNvPr id="256" name="TextShape 2"/>
+          <p:cNvSpPr txBox="1"/>
+          <p:nvPr/>
+        </p:nvSpPr>
+        <p:spPr>
+          <a:xfrm>
+            <a:off x="3566160" y="9326880"/>
+            <a:ext cx="6172920" cy="346680"/>
+          </a:xfrm>
+          <a:prstGeom prst="rect">
+            <a:avLst/>
+          </a:prstGeom>
+          <a:noFill/>
+          <a:ln>
+            <a:noFill/>
+          </a:ln>
+        </p:spPr>
+        <p:txBody>
+          <a:bodyPr lIns="90000" rIns="90000" tIns="45000" bIns="45000">
+            <a:noAutofit/>
+          </a:bodyPr>
+          <a:p>
+            <a:r>
+              <a:rPr b="0" lang="en-US" sz="1800" spc="-1" strike="noStrike">
+                <a:latin typeface="Arial"/>
+              </a:rPr>
+              <a:t>https://engineering.purdue.edu/~malcolm/pct/CTI_Ch02.pdf</a:t>
+            </a:r>
+            <a:endParaRPr b="0" lang="en-US" sz="1800" spc="-1" strike="noStrike">
+              <a:latin typeface="Arial"/>
+            </a:endParaRPr>
+          </a:p>
+        </p:txBody>
+      </p:sp>
+    </p:spTree>
+  </p:cSld>
+  <mc:AlternateContent>
+    <mc:Choice Requires="p14">
+      <p:transition spd="slow" p14:dur="2000"/>
+    </mc:Choice>
+    <mc:Fallback>
+      <p:transition spd="slow"/>
+    </mc:Fallback>
+  </mc:AlternateContent>
+</p:sld>
+</file>
+
+<file path=ppt/slides/slide11.xml><?xml version="1.0" encoding="utf-8"?>
+<p:sld xmlns:a="http://schemas.openxmlformats.org/drawingml/2006/main" xmlns:p="http://schemas.openxmlformats.org/presentationml/2006/main" xmlns:r="http://schemas.openxmlformats.org/officeDocument/2006/relationships" xmlns:p14="http://schemas.microsoft.com/office/powerpoint/2010/main" xmlns:p15="http://schemas.microsoft.com/office/powerpoint/2012/main" xmlns:mc="http://schemas.openxmlformats.org/markup-compatibility/2006">
+  <p:cSld>
+    <p:spTree>
+      <p:nvGrpSpPr>
+        <p:cNvPr id="1" name=""/>
+        <p:cNvGrpSpPr/>
+        <p:nvPr/>
+      </p:nvGrpSpPr>
+      <p:grpSpPr>
+        <a:xfrm>
+          <a:off x="0" y="0"/>
+          <a:ext cx="0" cy="0"/>
+          <a:chOff x="0" y="0"/>
+          <a:chExt cx="0" cy="0"/>
+        </a:xfrm>
+      </p:grpSpPr>
+      <p:sp>
+        <p:nvSpPr>
+          <p:cNvPr id="257" name="CustomShape 1"/>
+          <p:cNvSpPr/>
+          <p:nvPr/>
+        </p:nvSpPr>
+        <p:spPr>
+          <a:xfrm>
+            <a:off x="952560" y="2113200"/>
+            <a:ext cx="11098440" cy="3612240"/>
+          </a:xfrm>
+          <a:prstGeom prst="rect">
+            <a:avLst/>
+          </a:prstGeom>
+          <a:noFill/>
+          <a:ln w="12600">
+            <a:noFill/>
+          </a:ln>
+        </p:spPr>
+        <p:style>
+          <a:lnRef idx="0"/>
+          <a:fillRef idx="0"/>
+          <a:effectRef idx="0"/>
+          <a:fontRef idx="minor"/>
+        </p:style>
+        <p:txBody>
+          <a:bodyPr lIns="0" rIns="0" tIns="0" bIns="0" anchor="ctr">
+            <a:noAutofit/>
+          </a:bodyPr>
+          <a:p>
+            <a:pPr marL="720" algn="ctr">
+              <a:lnSpc>
+                <a:spcPct val="100000"/>
+              </a:lnSpc>
+              <a:spcBef>
+                <a:spcPts val="1417"/>
+              </a:spcBef>
+            </a:pPr>
+            <a:r>
+              <a:rPr b="0" lang="en-US" sz="3600" spc="-1" strike="noStrike">
+                <a:solidFill>
+                  <a:srgbClr val="000000"/>
+                </a:solidFill>
+                <a:latin typeface="Franklin Gothic Book"/>
+                <a:ea typeface="Franklin Gothic Book"/>
+              </a:rPr>
+              <a:t>Generarea de imagine Elemental Dust Map folosind operatii paralele ce pot procesa semnalul de intrare sub forma unei imagini folosind metode de procesare paralele ale sistemului </a:t>
+            </a:r>
+            <a:endParaRPr b="0" lang="en-US" sz="3600" spc="-1" strike="noStrike">
+              <a:latin typeface="Arial"/>
+            </a:endParaRPr>
+          </a:p>
+        </p:txBody>
+      </p:sp>
+      <p:sp>
+        <p:nvSpPr>
+          <p:cNvPr id="258" name="CustomShape 2"/>
+          <p:cNvSpPr/>
+          <p:nvPr/>
+        </p:nvSpPr>
+        <p:spPr>
+          <a:xfrm>
+            <a:off x="952560" y="444600"/>
+            <a:ext cx="11098440" cy="2157480"/>
+          </a:xfrm>
+          <a:prstGeom prst="rect">
+            <a:avLst/>
+          </a:prstGeom>
+          <a:noFill/>
+          <a:ln w="12600">
+            <a:noFill/>
+          </a:ln>
+        </p:spPr>
+        <p:style>
+          <a:lnRef idx="0"/>
+          <a:fillRef idx="0"/>
+          <a:effectRef idx="0"/>
+          <a:fontRef idx="minor"/>
+        </p:style>
+        <p:txBody>
+          <a:bodyPr lIns="0" rIns="0" tIns="0" bIns="0" anchor="ctr">
+            <a:noAutofit/>
+          </a:bodyPr>
+          <a:p>
+            <a:pPr algn="ctr">
+              <a:lnSpc>
+                <a:spcPct val="100000"/>
+              </a:lnSpc>
+            </a:pPr>
+            <a:r>
+              <a:rPr b="0" lang="en-US" sz="8000" spc="-1" strike="noStrike">
+                <a:solidFill>
+                  <a:srgbClr val="000000"/>
+                </a:solidFill>
+                <a:latin typeface="Franklin Gothic Book"/>
+                <a:ea typeface="Franklin Gothic Book"/>
+              </a:rPr>
+              <a:t>Optimizari</a:t>
+            </a:r>
+            <a:endParaRPr b="0" lang="en-US" sz="8000" spc="-1" strike="noStrike">
+              <a:latin typeface="Arial"/>
+            </a:endParaRPr>
+          </a:p>
+        </p:txBody>
+      </p:sp>
+      <p:sp>
+        <p:nvSpPr>
+          <p:cNvPr id="259" name="CustomShape 3"/>
+          <p:cNvSpPr/>
+          <p:nvPr/>
+        </p:nvSpPr>
+        <p:spPr>
+          <a:xfrm>
+            <a:off x="60120" y="9341640"/>
+            <a:ext cx="246960" cy="354240"/>
+          </a:xfrm>
+          <a:prstGeom prst="rect">
+            <a:avLst/>
+          </a:prstGeom>
+          <a:noFill/>
+          <a:ln w="12600">
+            <a:noFill/>
+          </a:ln>
+        </p:spPr>
+        <p:style>
+          <a:lnRef idx="0"/>
+          <a:fillRef idx="0"/>
+          <a:effectRef idx="0"/>
+          <a:fontRef idx="minor"/>
+        </p:style>
+      </p:sp>
+    </p:spTree>
+  </p:cSld>
+  <mc:AlternateContent>
+    <mc:Choice Requires="p14">
+      <p:transition spd="slow" p14:dur="2000"/>
+    </mc:Choice>
+    <mc:Fallback>
+      <p:transition spd="slow"/>
+    </mc:Fallback>
+  </mc:AlternateContent>
+</p:sld>
+</file>
+
+<file path=ppt/slides/slide12.xml><?xml version="1.0" encoding="utf-8"?>
+<p:sld xmlns:a="http://schemas.openxmlformats.org/drawingml/2006/main" xmlns:p="http://schemas.openxmlformats.org/presentationml/2006/main" xmlns:r="http://schemas.openxmlformats.org/officeDocument/2006/relationships" xmlns:p14="http://schemas.microsoft.com/office/powerpoint/2010/main" xmlns:p15="http://schemas.microsoft.com/office/powerpoint/2012/main" xmlns:mc="http://schemas.openxmlformats.org/markup-compatibility/2006">
+  <p:cSld>
+    <p:spTree>
+      <p:nvGrpSpPr>
+        <p:cNvPr id="1" name=""/>
+        <p:cNvGrpSpPr/>
+        <p:nvPr/>
+      </p:nvGrpSpPr>
+      <p:grpSpPr>
+        <a:xfrm>
+          <a:off x="0" y="0"/>
+          <a:ext cx="0" cy="0"/>
+          <a:chOff x="0" y="0"/>
+          <a:chExt cx="0" cy="0"/>
+        </a:xfrm>
+      </p:grpSpPr>
+      <p:sp>
+        <p:nvSpPr>
+          <p:cNvPr id="260" name="CustomShape 1"/>
+          <p:cNvSpPr/>
+          <p:nvPr/>
+        </p:nvSpPr>
+        <p:spPr>
+          <a:xfrm>
+            <a:off x="952560" y="2603520"/>
+            <a:ext cx="11098440" cy="6285240"/>
+          </a:xfrm>
+          <a:prstGeom prst="rect">
+            <a:avLst/>
+          </a:prstGeom>
+          <a:noFill/>
+          <a:ln w="12600">
+            <a:noFill/>
+          </a:ln>
+        </p:spPr>
+        <p:style>
+          <a:lnRef idx="0"/>
+          <a:fillRef idx="0"/>
+          <a:effectRef idx="0"/>
+          <a:fontRef idx="minor"/>
+        </p:style>
+        <p:txBody>
+          <a:bodyPr lIns="0" rIns="0" tIns="0" bIns="0" anchor="ctr">
+            <a:noAutofit/>
+          </a:bodyPr>
+          <a:p>
+            <a:pPr marL="444600" indent="-443160">
               <a:lnSpc>
                 <a:spcPct val="100000"/>
               </a:lnSpc>
@@ -7705,14 +7673,14 @@
       </p:sp>
       <p:sp>
         <p:nvSpPr>
-          <p:cNvPr id="254" name="CustomShape 2"/>
+          <p:cNvPr id="261" name="CustomShape 2"/>
           <p:cNvSpPr/>
           <p:nvPr/>
         </p:nvSpPr>
         <p:spPr>
           <a:xfrm>
             <a:off x="952560" y="444600"/>
-            <a:ext cx="11098800" cy="2157840"/>
+            <a:ext cx="11098440" cy="2157480"/>
           </a:xfrm>
           <a:prstGeom prst="rect">
             <a:avLst/>
@@ -7756,14 +7724,14 @@
       </p:sp>
       <p:sp>
         <p:nvSpPr>
-          <p:cNvPr id="255" name="CustomShape 3"/>
+          <p:cNvPr id="262" name="CustomShape 3"/>
           <p:cNvSpPr/>
           <p:nvPr/>
         </p:nvSpPr>
         <p:spPr>
           <a:xfrm>
             <a:off x="60120" y="9341640"/>
-            <a:ext cx="247320" cy="354600"/>
+            <a:ext cx="246960" cy="354240"/>
           </a:xfrm>
           <a:prstGeom prst="rect">
             <a:avLst/>
@@ -7793,7 +7761,7 @@
 </p:sld>
 </file>
 
-<file path=ppt/slides/slide11.xml><?xml version="1.0" encoding="utf-8"?>
+<file path=ppt/slides/slide13.xml><?xml version="1.0" encoding="utf-8"?>
 <p:sld xmlns:a="http://schemas.openxmlformats.org/drawingml/2006/main" xmlns:p="http://schemas.openxmlformats.org/presentationml/2006/main" xmlns:r="http://schemas.openxmlformats.org/officeDocument/2006/relationships" xmlns:p14="http://schemas.microsoft.com/office/powerpoint/2010/main" xmlns:p15="http://schemas.microsoft.com/office/powerpoint/2012/main" xmlns:mc="http://schemas.openxmlformats.org/markup-compatibility/2006">
   <p:cSld>
     <p:spTree>
@@ -7812,14 +7780,14 @@
       </p:grpSpPr>
       <p:sp>
         <p:nvSpPr>
-          <p:cNvPr id="256" name="CustomShape 1"/>
+          <p:cNvPr id="263" name="CustomShape 1"/>
           <p:cNvSpPr/>
           <p:nvPr/>
         </p:nvSpPr>
         <p:spPr>
           <a:xfrm>
             <a:off x="-53640" y="6774480"/>
-            <a:ext cx="13329360" cy="1158480"/>
+            <a:ext cx="13329000" cy="1158120"/>
           </a:xfrm>
           <a:prstGeom prst="rect">
             <a:avLst/>
@@ -7883,14 +7851,14 @@
       </p:sp>
       <p:sp>
         <p:nvSpPr>
-          <p:cNvPr id="257" name="CustomShape 2"/>
+          <p:cNvPr id="264" name="CustomShape 2"/>
           <p:cNvSpPr/>
           <p:nvPr/>
         </p:nvSpPr>
         <p:spPr>
           <a:xfrm>
             <a:off x="1270080" y="1256760"/>
-            <a:ext cx="10463760" cy="761760"/>
+            <a:ext cx="10463400" cy="761400"/>
           </a:xfrm>
           <a:prstGeom prst="rect">
             <a:avLst/>
@@ -7971,7 +7939,7 @@
         <p:spPr>
           <a:xfrm>
             <a:off x="952560" y="444600"/>
-            <a:ext cx="11098800" cy="2157840"/>
+            <a:ext cx="11098440" cy="2157480"/>
           </a:xfrm>
           <a:prstGeom prst="rect">
             <a:avLst/>
@@ -8022,7 +7990,7 @@
         <p:spPr>
           <a:xfrm>
             <a:off x="85680" y="10882080"/>
-            <a:ext cx="247320" cy="354600"/>
+            <a:ext cx="246960" cy="354240"/>
           </a:xfrm>
           <a:prstGeom prst="rect">
             <a:avLst/>
@@ -8048,7 +8016,7 @@
         <p:spPr>
           <a:xfrm>
             <a:off x="459360" y="2429640"/>
-            <a:ext cx="2221920" cy="1168200"/>
+            <a:ext cx="2221560" cy="1167840"/>
           </a:xfrm>
           <a:prstGeom prst="rect">
             <a:avLst/>
@@ -8124,7 +8092,7 @@
         <p:spPr>
           <a:xfrm>
             <a:off x="3875040" y="2429640"/>
-            <a:ext cx="2029320" cy="1168200"/>
+            <a:ext cx="2028960" cy="1167840"/>
           </a:xfrm>
           <a:prstGeom prst="rect">
             <a:avLst/>
@@ -8146,7 +8114,7 @@
           <a:fontRef idx="minor"/>
         </p:style>
         <p:txBody>
-          <a:bodyPr anchor="ctr">
+          <a:bodyPr lIns="90000" rIns="90000" tIns="45000" bIns="45000" anchor="ctr">
             <a:noAutofit/>
           </a:bodyPr>
           <a:p>
@@ -8190,7 +8158,7 @@
         <p:spPr>
           <a:xfrm>
             <a:off x="7148520" y="2429640"/>
-            <a:ext cx="2157480" cy="1168200"/>
+            <a:ext cx="2157120" cy="1167840"/>
           </a:xfrm>
           <a:prstGeom prst="rect">
             <a:avLst/>
@@ -8212,7 +8180,7 @@
           <a:fontRef idx="minor"/>
         </p:style>
         <p:txBody>
-          <a:bodyPr anchor="ctr">
+          <a:bodyPr lIns="90000" rIns="90000" tIns="45000" bIns="45000" anchor="ctr">
             <a:noAutofit/>
           </a:bodyPr>
           <a:p>
@@ -8256,7 +8224,7 @@
         <p:spPr>
           <a:xfrm>
             <a:off x="10563480" y="2429640"/>
-            <a:ext cx="2157480" cy="1168200"/>
+            <a:ext cx="2157120" cy="1167840"/>
           </a:xfrm>
           <a:prstGeom prst="rect">
             <a:avLst/>
@@ -8278,7 +8246,7 @@
           <a:fontRef idx="minor"/>
         </p:style>
         <p:txBody>
-          <a:bodyPr anchor="ctr">
+          <a:bodyPr lIns="90000" rIns="90000" tIns="45000" bIns="45000" anchor="ctr">
             <a:noAutofit/>
           </a:bodyPr>
           <a:p>
@@ -8312,7 +8280,7 @@
         <p:spPr>
           <a:xfrm>
             <a:off x="7135920" y="3777840"/>
-            <a:ext cx="2183400" cy="577080"/>
+            <a:ext cx="2183040" cy="576720"/>
           </a:xfrm>
           <a:prstGeom prst="rect">
             <a:avLst/>
@@ -8334,7 +8302,7 @@
           <a:fontRef idx="minor"/>
         </p:style>
         <p:txBody>
-          <a:bodyPr anchor="ctr">
+          <a:bodyPr lIns="90000" rIns="90000" tIns="45000" bIns="45000" anchor="ctr">
             <a:noAutofit/>
           </a:bodyPr>
           <a:p>
@@ -8368,7 +8336,7 @@
         <p:spPr>
           <a:xfrm>
             <a:off x="2823120" y="2766600"/>
-            <a:ext cx="975240" cy="487440"/>
+            <a:ext cx="974880" cy="487080"/>
           </a:xfrm>
           <a:prstGeom prst="rightArrow">
             <a:avLst>
@@ -8409,7 +8377,7 @@
         <p:spPr>
           <a:xfrm>
             <a:off x="6032520" y="2766600"/>
-            <a:ext cx="975240" cy="487440"/>
+            <a:ext cx="974880" cy="487080"/>
           </a:xfrm>
           <a:prstGeom prst="rightArrow">
             <a:avLst>
@@ -8450,7 +8418,7 @@
         <p:spPr>
           <a:xfrm>
             <a:off x="9447480" y="2766600"/>
-            <a:ext cx="975240" cy="487440"/>
+            <a:ext cx="974880" cy="487080"/>
           </a:xfrm>
           <a:prstGeom prst="rightArrow">
             <a:avLst>
@@ -8491,7 +8459,7 @@
         <p:spPr>
           <a:xfrm>
             <a:off x="7135920" y="4560840"/>
-            <a:ext cx="2183400" cy="577080"/>
+            <a:ext cx="2183040" cy="576720"/>
           </a:xfrm>
           <a:prstGeom prst="rect">
             <a:avLst/>
@@ -8513,7 +8481,7 @@
           <a:fontRef idx="minor"/>
         </p:style>
         <p:txBody>
-          <a:bodyPr anchor="ctr">
+          <a:bodyPr lIns="90000" rIns="90000" tIns="45000" bIns="45000" anchor="ctr">
             <a:noAutofit/>
           </a:bodyPr>
           <a:p>
@@ -8577,7 +8545,7 @@
         <p:spPr>
           <a:xfrm>
             <a:off x="952560" y="444600"/>
-            <a:ext cx="11098800" cy="2157840"/>
+            <a:ext cx="11098440" cy="2157480"/>
           </a:xfrm>
           <a:prstGeom prst="rect">
             <a:avLst/>
@@ -8628,7 +8596,7 @@
         <p:spPr>
           <a:xfrm>
             <a:off x="85680" y="10882080"/>
-            <a:ext cx="247320" cy="354600"/>
+            <a:ext cx="246960" cy="354240"/>
           </a:xfrm>
           <a:prstGeom prst="rect">
             <a:avLst/>
@@ -8654,7 +8622,7 @@
         <p:spPr>
           <a:xfrm>
             <a:off x="459360" y="2429640"/>
-            <a:ext cx="2221920" cy="1168200"/>
+            <a:ext cx="2221560" cy="1167840"/>
           </a:xfrm>
           <a:prstGeom prst="rect">
             <a:avLst/>
@@ -8730,7 +8698,7 @@
         <p:spPr>
           <a:xfrm>
             <a:off x="3875040" y="2429640"/>
-            <a:ext cx="2029320" cy="1168200"/>
+            <a:ext cx="2028960" cy="1167840"/>
           </a:xfrm>
           <a:prstGeom prst="rect">
             <a:avLst/>
@@ -8752,7 +8720,7 @@
           <a:fontRef idx="minor"/>
         </p:style>
         <p:txBody>
-          <a:bodyPr anchor="ctr">
+          <a:bodyPr lIns="90000" rIns="90000" tIns="45000" bIns="45000" anchor="ctr">
             <a:noAutofit/>
           </a:bodyPr>
           <a:p>
@@ -8796,7 +8764,7 @@
         <p:spPr>
           <a:xfrm>
             <a:off x="7148520" y="2429640"/>
-            <a:ext cx="2157480" cy="1168200"/>
+            <a:ext cx="2157120" cy="1167840"/>
           </a:xfrm>
           <a:prstGeom prst="rect">
             <a:avLst/>
@@ -8818,7 +8786,7 @@
           <a:fontRef idx="minor"/>
         </p:style>
         <p:txBody>
-          <a:bodyPr anchor="ctr">
+          <a:bodyPr lIns="90000" rIns="90000" tIns="45000" bIns="45000" anchor="ctr">
             <a:noAutofit/>
           </a:bodyPr>
           <a:p>
@@ -8862,7 +8830,7 @@
         <p:spPr>
           <a:xfrm>
             <a:off x="10563480" y="2429640"/>
-            <a:ext cx="2157480" cy="1168200"/>
+            <a:ext cx="2157120" cy="1167840"/>
           </a:xfrm>
           <a:prstGeom prst="rect">
             <a:avLst/>
@@ -8884,7 +8852,7 @@
           <a:fontRef idx="minor"/>
         </p:style>
         <p:txBody>
-          <a:bodyPr anchor="ctr">
+          <a:bodyPr lIns="90000" rIns="90000" tIns="45000" bIns="45000" anchor="ctr">
             <a:noAutofit/>
           </a:bodyPr>
           <a:p>
@@ -8918,7 +8886,7 @@
         <p:spPr>
           <a:xfrm>
             <a:off x="7148520" y="3790440"/>
-            <a:ext cx="2157480" cy="1168200"/>
+            <a:ext cx="2157120" cy="1167840"/>
           </a:xfrm>
           <a:prstGeom prst="rect">
             <a:avLst/>
@@ -8951,7 +8919,7 @@
           <a:fontRef idx="minor"/>
         </p:style>
         <p:txBody>
-          <a:bodyPr anchor="ctr">
+          <a:bodyPr lIns="90000" rIns="90000" tIns="45000" bIns="45000" anchor="ctr">
             <a:noAutofit/>
           </a:bodyPr>
           <a:p>
@@ -9045,7 +9013,7 @@
         <p:spPr>
           <a:xfrm>
             <a:off x="2823120" y="2766600"/>
-            <a:ext cx="975240" cy="487440"/>
+            <a:ext cx="974880" cy="487080"/>
           </a:xfrm>
           <a:prstGeom prst="rightArrow">
             <a:avLst>
@@ -9086,7 +9054,7 @@
         <p:spPr>
           <a:xfrm>
             <a:off x="6032520" y="2766600"/>
-            <a:ext cx="975240" cy="487440"/>
+            <a:ext cx="974880" cy="487080"/>
           </a:xfrm>
           <a:prstGeom prst="rightArrow">
             <a:avLst>
@@ -9127,7 +9095,7 @@
         <p:spPr>
           <a:xfrm>
             <a:off x="9447480" y="2766600"/>
-            <a:ext cx="975240" cy="487440"/>
+            <a:ext cx="974880" cy="487080"/>
           </a:xfrm>
           <a:prstGeom prst="rightArrow">
             <a:avLst>
@@ -9168,7 +9136,7 @@
         <p:spPr>
           <a:xfrm>
             <a:off x="5006880" y="6026040"/>
-            <a:ext cx="911160" cy="911160"/>
+            <a:ext cx="910800" cy="910800"/>
           </a:xfrm>
           <a:prstGeom prst="rect">
             <a:avLst/>
@@ -9205,7 +9173,7 @@
         <p:spPr>
           <a:xfrm>
             <a:off x="4095360" y="6026040"/>
-            <a:ext cx="911160" cy="911160"/>
+            <a:ext cx="910800" cy="910800"/>
           </a:xfrm>
           <a:prstGeom prst="rect">
             <a:avLst/>
@@ -9239,7 +9207,7 @@
         <p:spPr>
           <a:xfrm>
             <a:off x="4095360" y="6937560"/>
-            <a:ext cx="911160" cy="911160"/>
+            <a:ext cx="910800" cy="910800"/>
           </a:xfrm>
           <a:prstGeom prst="rect">
             <a:avLst/>
@@ -9275,7 +9243,7 @@
         <p:spPr>
           <a:xfrm>
             <a:off x="5006880" y="6937560"/>
-            <a:ext cx="911160" cy="911160"/>
+            <a:ext cx="910800" cy="910800"/>
           </a:xfrm>
           <a:prstGeom prst="rect">
             <a:avLst/>
@@ -9309,7 +9277,7 @@
         <p:spPr>
           <a:xfrm>
             <a:off x="6174000" y="6695280"/>
-            <a:ext cx="975240" cy="487440"/>
+            <a:ext cx="974880" cy="487080"/>
           </a:xfrm>
           <a:prstGeom prst="rightArrow">
             <a:avLst>
@@ -9350,7 +9318,7 @@
         <p:spPr>
           <a:xfrm>
             <a:off x="8370720" y="5987520"/>
-            <a:ext cx="911160" cy="911160"/>
+            <a:ext cx="910800" cy="910800"/>
           </a:xfrm>
           <a:prstGeom prst="rect">
             <a:avLst/>
@@ -9387,7 +9355,7 @@
         <p:spPr>
           <a:xfrm>
             <a:off x="7459200" y="5987520"/>
-            <a:ext cx="911160" cy="911160"/>
+            <a:ext cx="910800" cy="910800"/>
           </a:xfrm>
           <a:prstGeom prst="rect">
             <a:avLst/>
@@ -9421,7 +9389,7 @@
         <p:spPr>
           <a:xfrm>
             <a:off x="7459200" y="6899040"/>
-            <a:ext cx="911160" cy="911160"/>
+            <a:ext cx="910800" cy="910800"/>
           </a:xfrm>
           <a:prstGeom prst="rect">
             <a:avLst/>
@@ -9457,7 +9425,7 @@
         <p:spPr>
           <a:xfrm>
             <a:off x="8370360" y="6899040"/>
-            <a:ext cx="911160" cy="911160"/>
+            <a:ext cx="910800" cy="910800"/>
           </a:xfrm>
           <a:prstGeom prst="rect">
             <a:avLst/>
@@ -9491,7 +9459,7 @@
         <p:spPr>
           <a:xfrm>
             <a:off x="7816680" y="6293880"/>
-            <a:ext cx="1116720" cy="1168200"/>
+            <a:ext cx="1116360" cy="1167840"/>
           </a:xfrm>
           <a:prstGeom prst="rect">
             <a:avLst/>
@@ -9527,7 +9495,7 @@
         <p:spPr>
           <a:xfrm>
             <a:off x="4196880" y="6294960"/>
-            <a:ext cx="815400" cy="366120"/>
+            <a:ext cx="815040" cy="364680"/>
           </a:xfrm>
           <a:prstGeom prst="rect">
             <a:avLst/>
@@ -9544,7 +9512,7 @@
           <a:fontRef idx="minor"/>
         </p:style>
         <p:txBody>
-          <a:bodyPr>
+          <a:bodyPr lIns="90000" rIns="90000" tIns="45000" bIns="45000">
             <a:spAutoFit/>
           </a:bodyPr>
           <a:p>
@@ -9578,7 +9546,7 @@
         <p:spPr>
           <a:xfrm>
             <a:off x="5056920" y="6294960"/>
-            <a:ext cx="815400" cy="366120"/>
+            <a:ext cx="815040" cy="364680"/>
           </a:xfrm>
           <a:prstGeom prst="rect">
             <a:avLst/>
@@ -9595,7 +9563,7 @@
           <a:fontRef idx="minor"/>
         </p:style>
         <p:txBody>
-          <a:bodyPr>
+          <a:bodyPr lIns="90000" rIns="90000" tIns="45000" bIns="45000">
             <a:spAutoFit/>
           </a:bodyPr>
           <a:p>
@@ -9629,7 +9597,7 @@
         <p:spPr>
           <a:xfrm>
             <a:off x="4196880" y="7167600"/>
-            <a:ext cx="815400" cy="366120"/>
+            <a:ext cx="815040" cy="364680"/>
           </a:xfrm>
           <a:prstGeom prst="rect">
             <a:avLst/>
@@ -9646,7 +9614,7 @@
           <a:fontRef idx="minor"/>
         </p:style>
         <p:txBody>
-          <a:bodyPr>
+          <a:bodyPr lIns="90000" rIns="90000" tIns="45000" bIns="45000">
             <a:spAutoFit/>
           </a:bodyPr>
           <a:p>
@@ -9680,7 +9648,7 @@
         <p:spPr>
           <a:xfrm>
             <a:off x="5108400" y="7167600"/>
-            <a:ext cx="815400" cy="366120"/>
+            <a:ext cx="815040" cy="364680"/>
           </a:xfrm>
           <a:prstGeom prst="rect">
             <a:avLst/>
@@ -9697,7 +9665,7 @@
           <a:fontRef idx="minor"/>
         </p:style>
         <p:txBody>
-          <a:bodyPr>
+          <a:bodyPr lIns="90000" rIns="90000" tIns="45000" bIns="45000">
             <a:spAutoFit/>
           </a:bodyPr>
           <a:p>
@@ -9735,7 +9703,7 @@
         <p:spPr>
           <a:xfrm>
             <a:off x="8688240" y="7162920"/>
-            <a:ext cx="194400" cy="168840"/>
+            <a:ext cx="194040" cy="168480"/>
           </a:xfrm>
           <a:prstGeom prst="rect">
             <a:avLst/>
@@ -9758,7 +9726,7 @@
         <p:spPr>
           <a:xfrm>
             <a:off x="7828200" y="6674760"/>
-            <a:ext cx="194400" cy="168840"/>
+            <a:ext cx="194040" cy="168480"/>
           </a:xfrm>
           <a:prstGeom prst="rect">
             <a:avLst/>
@@ -9781,7 +9749,7 @@
         <p:spPr>
           <a:xfrm>
             <a:off x="8380080" y="6982920"/>
-            <a:ext cx="194400" cy="168840"/>
+            <a:ext cx="194040" cy="168480"/>
           </a:xfrm>
           <a:prstGeom prst="rect">
             <a:avLst/>
@@ -9804,7 +9772,7 @@
         <p:spPr>
           <a:xfrm>
             <a:off x="8636760" y="7072920"/>
-            <a:ext cx="194400" cy="168840"/>
+            <a:ext cx="194040" cy="168480"/>
           </a:xfrm>
           <a:prstGeom prst="rect">
             <a:avLst/>
@@ -9827,7 +9795,7 @@
         <p:spPr>
           <a:xfrm>
             <a:off x="7866720" y="7175520"/>
-            <a:ext cx="194400" cy="168840"/>
+            <a:ext cx="194040" cy="168480"/>
           </a:xfrm>
           <a:prstGeom prst="rect">
             <a:avLst/>
@@ -9850,7 +9818,7 @@
         <p:spPr>
           <a:xfrm>
             <a:off x="8572680" y="6444000"/>
-            <a:ext cx="194400" cy="168840"/>
+            <a:ext cx="194040" cy="168480"/>
           </a:xfrm>
           <a:prstGeom prst="rect">
             <a:avLst/>
@@ -9868,14 +9836,14 @@
         </p:nvSpPr>
         <p:spPr>
           <a:xfrm rot="15717600">
-            <a:off x="7880400" y="6419520"/>
-            <a:ext cx="168120" cy="141840"/>
+            <a:off x="7880040" y="6419880"/>
+            <a:ext cx="167760" cy="141480"/>
           </a:xfrm>
           <a:custGeom>
             <a:avLst/>
             <a:gdLst/>
             <a:ahLst/>
-            <a:rect l="0" t="0" r="r" b="b"/>
+            <a:rect l="l" t="t" r="r" b="b"/>
             <a:pathLst>
               <a:path w="470" h="395">
                 <a:moveTo>
@@ -9932,14 +9900,14 @@
         </p:nvSpPr>
         <p:spPr>
           <a:xfrm rot="15717600">
-            <a:off x="7880400" y="6419520"/>
-            <a:ext cx="168120" cy="141840"/>
+            <a:off x="7880040" y="6419880"/>
+            <a:ext cx="167760" cy="141480"/>
           </a:xfrm>
           <a:custGeom>
             <a:avLst/>
             <a:gdLst/>
             <a:ahLst/>
-            <a:rect l="0" t="0" r="r" b="b"/>
+            <a:rect l="l" t="t" r="r" b="b"/>
             <a:pathLst>
               <a:path w="470" h="395">
                 <a:moveTo>
@@ -9996,14 +9964,14 @@
         </p:nvSpPr>
         <p:spPr>
           <a:xfrm rot="15717600">
-            <a:off x="8132400" y="6311520"/>
-            <a:ext cx="168120" cy="141840"/>
+            <a:off x="8132040" y="6311880"/>
+            <a:ext cx="167760" cy="141480"/>
           </a:xfrm>
           <a:custGeom>
             <a:avLst/>
             <a:gdLst/>
             <a:ahLst/>
-            <a:rect l="0" t="0" r="r" b="b"/>
+            <a:rect l="l" t="t" r="r" b="b"/>
             <a:pathLst>
               <a:path w="469" h="395">
                 <a:moveTo>
@@ -10060,14 +10028,14 @@
         </p:nvSpPr>
         <p:spPr>
           <a:xfrm rot="15717600">
-            <a:off x="7880400" y="6527520"/>
-            <a:ext cx="168120" cy="141840"/>
+            <a:off x="7880040" y="6527880"/>
+            <a:ext cx="167760" cy="141480"/>
           </a:xfrm>
           <a:custGeom>
             <a:avLst/>
             <a:gdLst/>
             <a:ahLst/>
-            <a:rect l="0" t="0" r="r" b="b"/>
+            <a:rect l="l" t="t" r="r" b="b"/>
             <a:pathLst>
               <a:path w="470" h="395">
                 <a:moveTo>
@@ -10124,14 +10092,14 @@
         </p:nvSpPr>
         <p:spPr>
           <a:xfrm rot="15717600">
-            <a:off x="7988400" y="6311520"/>
-            <a:ext cx="168120" cy="141840"/>
+            <a:off x="7988040" y="6311880"/>
+            <a:ext cx="167760" cy="141480"/>
           </a:xfrm>
           <a:custGeom>
             <a:avLst/>
             <a:gdLst/>
             <a:ahLst/>
-            <a:rect l="0" t="0" r="r" b="b"/>
+            <a:rect l="l" t="t" r="r" b="b"/>
             <a:pathLst>
               <a:path w="470" h="395">
                 <a:moveTo>
@@ -10188,14 +10156,14 @@
         </p:nvSpPr>
         <p:spPr>
           <a:xfrm rot="15717600">
-            <a:off x="7844400" y="6311520"/>
-            <a:ext cx="168120" cy="141840"/>
+            <a:off x="7844040" y="6311880"/>
+            <a:ext cx="167760" cy="141480"/>
           </a:xfrm>
           <a:custGeom>
             <a:avLst/>
             <a:gdLst/>
             <a:ahLst/>
-            <a:rect l="0" t="0" r="r" b="b"/>
+            <a:rect l="l" t="t" r="r" b="b"/>
             <a:pathLst>
               <a:path w="470" h="395">
                 <a:moveTo>
@@ -10252,14 +10220,14 @@
         </p:nvSpPr>
         <p:spPr>
           <a:xfrm rot="15717600">
-            <a:off x="8159760" y="6500160"/>
-            <a:ext cx="158760" cy="196200"/>
+            <a:off x="8159760" y="6500520"/>
+            <a:ext cx="158400" cy="195840"/>
           </a:xfrm>
           <a:custGeom>
             <a:avLst/>
             <a:gdLst/>
             <a:ahLst/>
-            <a:rect l="0" t="0" r="r" b="b"/>
+            <a:rect l="l" t="t" r="r" b="b"/>
             <a:pathLst>
               <a:path w="443" h="546">
                 <a:moveTo>
@@ -10316,14 +10284,14 @@
         </p:nvSpPr>
         <p:spPr>
           <a:xfrm rot="15717600">
-            <a:off x="8015760" y="6392160"/>
-            <a:ext cx="158760" cy="196200"/>
+            <a:off x="8015760" y="6392520"/>
+            <a:ext cx="158400" cy="195840"/>
           </a:xfrm>
           <a:custGeom>
             <a:avLst/>
             <a:gdLst/>
             <a:ahLst/>
-            <a:rect l="0" t="0" r="r" b="b"/>
+            <a:rect l="l" t="t" r="r" b="b"/>
             <a:pathLst>
               <a:path w="443" h="547">
                 <a:moveTo>
@@ -10380,14 +10348,14 @@
         </p:nvSpPr>
         <p:spPr>
           <a:xfrm rot="15717600">
-            <a:off x="8159760" y="6608160"/>
-            <a:ext cx="158760" cy="196200"/>
+            <a:off x="8159760" y="6608520"/>
+            <a:ext cx="158400" cy="195840"/>
           </a:xfrm>
           <a:custGeom>
             <a:avLst/>
             <a:gdLst/>
             <a:ahLst/>
-            <a:rect l="0" t="0" r="r" b="b"/>
+            <a:rect l="l" t="t" r="r" b="b"/>
             <a:pathLst>
               <a:path w="443" h="546">
                 <a:moveTo>
@@ -10444,14 +10412,14 @@
         </p:nvSpPr>
         <p:spPr>
           <a:xfrm rot="15717600">
-            <a:off x="8483760" y="6572160"/>
-            <a:ext cx="158760" cy="196200"/>
+            <a:off x="8483760" y="6572520"/>
+            <a:ext cx="158400" cy="195840"/>
           </a:xfrm>
           <a:custGeom>
             <a:avLst/>
             <a:gdLst/>
             <a:ahLst/>
-            <a:rect l="0" t="0" r="r" b="b"/>
+            <a:rect l="l" t="t" r="r" b="b"/>
             <a:pathLst>
               <a:path w="443" h="547">
                 <a:moveTo>
@@ -10508,14 +10476,14 @@
         </p:nvSpPr>
         <p:spPr>
           <a:xfrm rot="15717600">
-            <a:off x="8159760" y="6500160"/>
-            <a:ext cx="158760" cy="196200"/>
+            <a:off x="8159760" y="6500520"/>
+            <a:ext cx="158400" cy="195840"/>
           </a:xfrm>
           <a:custGeom>
             <a:avLst/>
             <a:gdLst/>
             <a:ahLst/>
-            <a:rect l="0" t="0" r="r" b="b"/>
+            <a:rect l="l" t="t" r="r" b="b"/>
             <a:pathLst>
               <a:path w="443" h="546">
                 <a:moveTo>
@@ -10572,14 +10540,14 @@
         </p:nvSpPr>
         <p:spPr>
           <a:xfrm rot="15717600">
-            <a:off x="8699760" y="6356160"/>
-            <a:ext cx="158760" cy="196200"/>
+            <a:off x="8699760" y="6356520"/>
+            <a:ext cx="158400" cy="195840"/>
           </a:xfrm>
           <a:custGeom>
             <a:avLst/>
             <a:gdLst/>
             <a:ahLst/>
-            <a:rect l="0" t="0" r="r" b="b"/>
+            <a:rect l="l" t="t" r="r" b="b"/>
             <a:pathLst>
               <a:path w="444" h="546">
                 <a:moveTo>
@@ -10636,14 +10604,14 @@
         </p:nvSpPr>
         <p:spPr>
           <a:xfrm rot="15717600">
-            <a:off x="8699760" y="6572160"/>
-            <a:ext cx="158760" cy="196200"/>
+            <a:off x="8699760" y="6572520"/>
+            <a:ext cx="158400" cy="195840"/>
           </a:xfrm>
           <a:custGeom>
             <a:avLst/>
             <a:gdLst/>
             <a:ahLst/>
-            <a:rect l="0" t="0" r="r" b="b"/>
+            <a:rect l="l" t="t" r="r" b="b"/>
             <a:pathLst>
               <a:path w="443" h="547">
                 <a:moveTo>
@@ -10700,14 +10668,14 @@
         </p:nvSpPr>
         <p:spPr>
           <a:xfrm rot="15717600">
-            <a:off x="7871760" y="6932160"/>
-            <a:ext cx="158760" cy="196200"/>
+            <a:off x="7871760" y="6932520"/>
+            <a:ext cx="158400" cy="195840"/>
           </a:xfrm>
           <a:custGeom>
             <a:avLst/>
             <a:gdLst/>
             <a:ahLst/>
-            <a:rect l="0" t="0" r="r" b="b"/>
+            <a:rect l="l" t="t" r="r" b="b"/>
             <a:pathLst>
               <a:path w="443" h="546">
                 <a:moveTo>
@@ -10764,14 +10732,14 @@
         </p:nvSpPr>
         <p:spPr>
           <a:xfrm rot="15717600">
-            <a:off x="8159760" y="6500160"/>
-            <a:ext cx="158760" cy="196200"/>
+            <a:off x="8159760" y="6500520"/>
+            <a:ext cx="158400" cy="195840"/>
           </a:xfrm>
           <a:custGeom>
             <a:avLst/>
             <a:gdLst/>
             <a:ahLst/>
-            <a:rect l="0" t="0" r="r" b="b"/>
+            <a:rect l="l" t="t" r="r" b="b"/>
             <a:pathLst>
               <a:path w="443" h="546">
                 <a:moveTo>
@@ -10828,14 +10796,14 @@
         </p:nvSpPr>
         <p:spPr>
           <a:xfrm rot="15717600">
-            <a:off x="8483760" y="6356160"/>
-            <a:ext cx="158760" cy="196200"/>
+            <a:off x="8483760" y="6356520"/>
+            <a:ext cx="158400" cy="195840"/>
           </a:xfrm>
           <a:custGeom>
             <a:avLst/>
             <a:gdLst/>
             <a:ahLst/>
-            <a:rect l="0" t="0" r="r" b="b"/>
+            <a:rect l="l" t="t" r="r" b="b"/>
             <a:pathLst>
               <a:path w="443" h="546">
                 <a:moveTo>
@@ -10892,14 +10860,14 @@
         </p:nvSpPr>
         <p:spPr>
           <a:xfrm rot="15717600">
-            <a:off x="8159760" y="6500160"/>
-            <a:ext cx="158760" cy="196200"/>
+            <a:off x="8159760" y="6500520"/>
+            <a:ext cx="158400" cy="195840"/>
           </a:xfrm>
           <a:custGeom>
             <a:avLst/>
             <a:gdLst/>
             <a:ahLst/>
-            <a:rect l="0" t="0" r="r" b="b"/>
+            <a:rect l="l" t="t" r="r" b="b"/>
             <a:pathLst>
               <a:path w="443" h="546">
                 <a:moveTo>
@@ -10956,14 +10924,14 @@
         </p:nvSpPr>
         <p:spPr>
           <a:xfrm rot="15717600">
-            <a:off x="8015760" y="6608160"/>
-            <a:ext cx="158760" cy="196200"/>
+            <a:off x="8015760" y="6608520"/>
+            <a:ext cx="158400" cy="195840"/>
           </a:xfrm>
           <a:custGeom>
             <a:avLst/>
             <a:gdLst/>
             <a:ahLst/>
-            <a:rect l="0" t="0" r="r" b="b"/>
+            <a:rect l="l" t="t" r="r" b="b"/>
             <a:pathLst>
               <a:path w="443" h="546">
                 <a:moveTo>
@@ -11020,14 +10988,14 @@
         </p:nvSpPr>
         <p:spPr>
           <a:xfrm rot="15717600">
-            <a:off x="8051760" y="7112160"/>
-            <a:ext cx="158760" cy="196200"/>
+            <a:off x="8051760" y="7112520"/>
+            <a:ext cx="158400" cy="195840"/>
           </a:xfrm>
           <a:custGeom>
             <a:avLst/>
             <a:gdLst/>
             <a:ahLst/>
-            <a:rect l="0" t="0" r="r" b="b"/>
+            <a:rect l="l" t="t" r="r" b="b"/>
             <a:pathLst>
               <a:path w="444" h="546">
                 <a:moveTo>
@@ -11084,14 +11052,14 @@
         </p:nvSpPr>
         <p:spPr>
           <a:xfrm rot="15717600">
-            <a:off x="8159760" y="6392160"/>
-            <a:ext cx="158760" cy="196200"/>
+            <a:off x="8159760" y="6392520"/>
+            <a:ext cx="158400" cy="195840"/>
           </a:xfrm>
           <a:custGeom>
             <a:avLst/>
             <a:gdLst/>
             <a:ahLst/>
-            <a:rect l="0" t="0" r="r" b="b"/>
+            <a:rect l="l" t="t" r="r" b="b"/>
             <a:pathLst>
               <a:path w="443" h="546">
                 <a:moveTo>
@@ -11148,14 +11116,14 @@
         </p:nvSpPr>
         <p:spPr>
           <a:xfrm rot="15717600">
-            <a:off x="8051760" y="6932160"/>
-            <a:ext cx="158760" cy="196200"/>
+            <a:off x="8051760" y="6932520"/>
+            <a:ext cx="158400" cy="195840"/>
           </a:xfrm>
           <a:custGeom>
             <a:avLst/>
             <a:gdLst/>
             <a:ahLst/>
-            <a:rect l="0" t="0" r="r" b="b"/>
+            <a:rect l="l" t="t" r="r" b="b"/>
             <a:pathLst>
               <a:path w="444" h="546">
                 <a:moveTo>
@@ -11212,14 +11180,14 @@
         </p:nvSpPr>
         <p:spPr>
           <a:xfrm rot="15717600">
-            <a:off x="8015760" y="6500160"/>
-            <a:ext cx="158760" cy="196200"/>
+            <a:off x="8015760" y="6500520"/>
+            <a:ext cx="158400" cy="195840"/>
           </a:xfrm>
           <a:custGeom>
             <a:avLst/>
             <a:gdLst/>
             <a:ahLst/>
-            <a:rect l="0" t="0" r="r" b="b"/>
+            <a:rect l="l" t="t" r="r" b="b"/>
             <a:pathLst>
               <a:path w="443" h="546">
                 <a:moveTo>
@@ -11276,14 +11244,14 @@
         </p:nvSpPr>
         <p:spPr>
           <a:xfrm rot="15717600">
-            <a:off x="7907760" y="6608160"/>
-            <a:ext cx="158760" cy="196200"/>
+            <a:off x="7907760" y="6608520"/>
+            <a:ext cx="158400" cy="195840"/>
           </a:xfrm>
           <a:custGeom>
             <a:avLst/>
             <a:gdLst/>
             <a:ahLst/>
-            <a:rect l="0" t="0" r="r" b="b"/>
+            <a:rect l="l" t="t" r="r" b="b"/>
             <a:pathLst>
               <a:path w="444" h="546">
                 <a:moveTo>
@@ -11340,14 +11308,14 @@
         </p:nvSpPr>
         <p:spPr>
           <a:xfrm rot="15717600">
-            <a:off x="8591760" y="6680160"/>
-            <a:ext cx="158760" cy="196200"/>
+            <a:off x="8591760" y="6680520"/>
+            <a:ext cx="158400" cy="195840"/>
           </a:xfrm>
           <a:custGeom>
             <a:avLst/>
             <a:gdLst/>
             <a:ahLst/>
-            <a:rect l="0" t="0" r="r" b="b"/>
+            <a:rect l="l" t="t" r="r" b="b"/>
             <a:pathLst>
               <a:path w="443" h="546">
                 <a:moveTo>
@@ -11404,14 +11372,14 @@
         </p:nvSpPr>
         <p:spPr>
           <a:xfrm rot="15717600">
-            <a:off x="8591760" y="6320160"/>
-            <a:ext cx="158760" cy="196200"/>
+            <a:off x="8591760" y="6320520"/>
+            <a:ext cx="158400" cy="195840"/>
           </a:xfrm>
           <a:custGeom>
             <a:avLst/>
             <a:gdLst/>
             <a:ahLst/>
-            <a:rect l="0" t="0" r="r" b="b"/>
+            <a:rect l="l" t="t" r="r" b="b"/>
             <a:pathLst>
               <a:path w="443" h="546">
                 <a:moveTo>
@@ -11499,7 +11467,7 @@
         <p:spPr>
           <a:xfrm>
             <a:off x="1261080" y="2333880"/>
-            <a:ext cx="10790280" cy="6285600"/>
+            <a:ext cx="10789920" cy="6285240"/>
           </a:xfrm>
           <a:prstGeom prst="rect">
             <a:avLst/>
@@ -11543,7 +11511,7 @@
             </a:endParaRPr>
           </a:p>
           <a:p>
-            <a:pPr algn="ctr">
+            <a:pPr marL="720" algn="ctr">
               <a:lnSpc>
                 <a:spcPct val="100000"/>
               </a:lnSpc>
@@ -11566,7 +11534,7 @@
         <p:spPr>
           <a:xfrm>
             <a:off x="0" y="906840"/>
-            <a:ext cx="13003920" cy="2157840"/>
+            <a:ext cx="13003560" cy="2157480"/>
           </a:xfrm>
           <a:prstGeom prst="rect">
             <a:avLst/>
@@ -11637,7 +11605,7 @@
         <p:spPr>
           <a:xfrm>
             <a:off x="60120" y="9341640"/>
-            <a:ext cx="247320" cy="354600"/>
+            <a:ext cx="246960" cy="354240"/>
           </a:xfrm>
           <a:prstGeom prst="rect">
             <a:avLst/>
@@ -11693,7 +11661,7 @@
         <p:spPr>
           <a:xfrm>
             <a:off x="1158120" y="2677320"/>
-            <a:ext cx="11098800" cy="4383720"/>
+            <a:ext cx="11098440" cy="4383360"/>
           </a:xfrm>
           <a:prstGeom prst="rect">
             <a:avLst/>
@@ -11747,7 +11715,7 @@
         <p:spPr>
           <a:xfrm>
             <a:off x="64080" y="457560"/>
-            <a:ext cx="13003920" cy="2157840"/>
+            <a:ext cx="13003560" cy="2157480"/>
           </a:xfrm>
           <a:prstGeom prst="rect">
             <a:avLst/>
@@ -11798,7 +11766,7 @@
         <p:spPr>
           <a:xfrm>
             <a:off x="60120" y="9341640"/>
-            <a:ext cx="247320" cy="354600"/>
+            <a:ext cx="246960" cy="354240"/>
           </a:xfrm>
           <a:prstGeom prst="rect">
             <a:avLst/>
@@ -11854,7 +11822,7 @@
         <p:spPr>
           <a:xfrm>
             <a:off x="1222200" y="2908800"/>
-            <a:ext cx="11098800" cy="3921120"/>
+            <a:ext cx="11098440" cy="3920760"/>
           </a:xfrm>
           <a:prstGeom prst="rect">
             <a:avLst/>
@@ -11898,7 +11866,7 @@
             </a:endParaRPr>
           </a:p>
           <a:p>
-            <a:pPr algn="ctr">
+            <a:pPr marL="720" algn="ctr">
               <a:lnSpc>
                 <a:spcPct val="100000"/>
               </a:lnSpc>
@@ -11921,7 +11889,7 @@
         <p:spPr>
           <a:xfrm>
             <a:off x="182880" y="444600"/>
-            <a:ext cx="12821040" cy="2157840"/>
+            <a:ext cx="12820680" cy="2157480"/>
           </a:xfrm>
           <a:prstGeom prst="rect">
             <a:avLst/>
@@ -11972,7 +11940,7 @@
         <p:spPr>
           <a:xfrm>
             <a:off x="60120" y="9341640"/>
-            <a:ext cx="247320" cy="354600"/>
+            <a:ext cx="246960" cy="354240"/>
           </a:xfrm>
           <a:prstGeom prst="rect">
             <a:avLst/>
@@ -12021,14 +11989,14 @@
       </p:grpSpPr>
       <p:sp>
         <p:nvSpPr>
-          <p:cNvPr id="242" name="TextShape 1"/>
-          <p:cNvSpPr txBox="1"/>
+          <p:cNvPr id="242" name="CustomShape 1"/>
+          <p:cNvSpPr/>
           <p:nvPr/>
         </p:nvSpPr>
         <p:spPr>
           <a:xfrm>
             <a:off x="650160" y="645840"/>
-            <a:ext cx="11702880" cy="2038680"/>
+            <a:ext cx="11702520" cy="2038320"/>
           </a:xfrm>
           <a:prstGeom prst="rect">
             <a:avLst/>
@@ -12038,6 +12006,12 @@
             <a:noFill/>
           </a:ln>
         </p:spPr>
+        <p:style>
+          <a:lnRef idx="0"/>
+          <a:fillRef idx="0"/>
+          <a:effectRef idx="0"/>
+          <a:fontRef idx="minor"/>
+        </p:style>
         <p:txBody>
           <a:bodyPr lIns="0" rIns="0" tIns="0" bIns="0" anchor="ctr">
             <a:noAutofit/>
@@ -12070,24 +12044,21 @@
               <a:t>(intrare)</a:t>
             </a:r>
             <a:endParaRPr b="0" lang="en-US" sz="5400" spc="-1" strike="noStrike">
-              <a:solidFill>
-                <a:srgbClr val="000000"/>
-              </a:solidFill>
-              <a:latin typeface="Arial"/>
-            </a:endParaRPr>
-          </a:p>
-        </p:txBody>
-      </p:sp>
-      <p:sp>
-        <p:nvSpPr>
-          <p:cNvPr id="243" name="TextShape 2"/>
-          <p:cNvSpPr txBox="1"/>
+              <a:latin typeface="Arial"/>
+            </a:endParaRPr>
+          </a:p>
+        </p:txBody>
+      </p:sp>
+      <p:sp>
+        <p:nvSpPr>
+          <p:cNvPr id="243" name="CustomShape 2"/>
+          <p:cNvSpPr/>
           <p:nvPr/>
         </p:nvSpPr>
         <p:spPr>
           <a:xfrm>
             <a:off x="1408680" y="2692800"/>
-            <a:ext cx="10597680" cy="5655600"/>
+            <a:ext cx="10597320" cy="5655240"/>
           </a:xfrm>
           <a:prstGeom prst="rect">
             <a:avLst/>
@@ -12097,6 +12068,12 @@
             <a:noFill/>
           </a:ln>
         </p:spPr>
+        <p:style>
+          <a:lnRef idx="0"/>
+          <a:fillRef idx="0"/>
+          <a:effectRef idx="0"/>
+          <a:fontRef idx="minor"/>
+        </p:style>
         <p:txBody>
           <a:bodyPr lIns="0" rIns="0" tIns="0" bIns="0" anchor="ctr">
             <a:noAutofit/>
@@ -12298,7 +12275,7 @@
         <p:spPr>
           <a:xfrm>
             <a:off x="60120" y="9341640"/>
-            <a:ext cx="247320" cy="354600"/>
+            <a:ext cx="246960" cy="354240"/>
           </a:xfrm>
           <a:prstGeom prst="rect">
             <a:avLst/>
@@ -12324,7 +12301,7 @@
         <p:spPr>
           <a:xfrm>
             <a:off x="-30600" y="3992760"/>
-            <a:ext cx="8168760" cy="2042280"/>
+            <a:ext cx="8168400" cy="2041920"/>
           </a:xfrm>
           <a:prstGeom prst="rect">
             <a:avLst/>
@@ -12385,7 +12362,7 @@
         <p:spPr>
           <a:xfrm>
             <a:off x="-677880" y="1587240"/>
-            <a:ext cx="6074280" cy="2042280"/>
+            <a:ext cx="6073920" cy="2041920"/>
           </a:xfrm>
           <a:prstGeom prst="rect">
             <a:avLst/>
@@ -12446,7 +12423,7 @@
         <p:spPr>
           <a:xfrm>
             <a:off x="1453320" y="6235200"/>
-            <a:ext cx="10931760" cy="2494800"/>
+            <a:ext cx="10931400" cy="2494440"/>
           </a:xfrm>
           <a:prstGeom prst="rect">
             <a:avLst/>
@@ -12490,7 +12467,7 @@
             </a:endParaRPr>
           </a:p>
           <a:p>
-            <a:pPr algn="ctr">
+            <a:pPr marL="720" algn="ctr">
               <a:lnSpc>
                 <a:spcPct val="100000"/>
               </a:lnSpc>
@@ -12513,7 +12490,7 @@
         <p:spPr>
           <a:xfrm>
             <a:off x="1453320" y="2871720"/>
-            <a:ext cx="10931760" cy="2494800"/>
+            <a:ext cx="10931400" cy="2494440"/>
           </a:xfrm>
           <a:prstGeom prst="rect">
             <a:avLst/>
@@ -12557,7 +12534,7 @@
             </a:endParaRPr>
           </a:p>
           <a:p>
-            <a:pPr algn="ctr">
+            <a:pPr marL="720" algn="ctr">
               <a:lnSpc>
                 <a:spcPct val="100000"/>
               </a:lnSpc>
@@ -12580,7 +12557,7 @@
         <p:spPr>
           <a:xfrm>
             <a:off x="650160" y="633240"/>
-            <a:ext cx="11702880" cy="2038680"/>
+            <a:ext cx="11702520" cy="2038320"/>
           </a:xfrm>
           <a:prstGeom prst="rect">
             <a:avLst/>
@@ -12597,7 +12574,7 @@
           <a:fontRef idx="minor"/>
         </p:style>
         <p:txBody>
-          <a:bodyPr>
+          <a:bodyPr lIns="90000" rIns="90000" tIns="45000" bIns="45000">
             <a:noAutofit/>
           </a:bodyPr>
           <a:p>
@@ -12671,8 +12648,8 @@
         </p:nvSpPr>
         <p:spPr>
           <a:xfrm>
-            <a:off x="952560" y="2113200"/>
-            <a:ext cx="11098800" cy="3612600"/>
+            <a:off x="64080" y="457560"/>
+            <a:ext cx="13003560" cy="2157480"/>
           </a:xfrm>
           <a:prstGeom prst="rect">
             <a:avLst/>
@@ -12693,107 +12670,93 @@
             <a:noAutofit/>
           </a:bodyPr>
           <a:p>
-            <a:pPr marL="720" algn="ctr">
-              <a:lnSpc>
-                <a:spcPct val="100000"/>
-              </a:lnSpc>
-              <a:spcBef>
-                <a:spcPts val="1417"/>
-              </a:spcBef>
-            </a:pPr>
-            <a:r>
-              <a:rPr b="0" lang="en-US" sz="3600" spc="-1" strike="noStrike">
-                <a:solidFill>
-                  <a:srgbClr val="000000"/>
-                </a:solidFill>
-                <a:latin typeface="Franklin Gothic Book"/>
-                <a:ea typeface="Franklin Gothic Book"/>
-              </a:rPr>
-              <a:t>Generarea de imagine Elemental Dust Map folosind operatii paralele ce pot procesa semnalul de intrare sub forma unei imagini folosind metode de procesare paralele ale sistemului </a:t>
-            </a:r>
-            <a:endParaRPr b="0" lang="en-US" sz="3600" spc="-1" strike="noStrike">
-              <a:latin typeface="Arial"/>
-            </a:endParaRPr>
-          </a:p>
-        </p:txBody>
-      </p:sp>
-      <p:sp>
-        <p:nvSpPr>
-          <p:cNvPr id="251" name="CustomShape 2"/>
-          <p:cNvSpPr/>
-          <p:nvPr/>
-        </p:nvSpPr>
-        <p:spPr>
-          <a:xfrm>
-            <a:off x="952560" y="444600"/>
-            <a:ext cx="11098800" cy="2157840"/>
-          </a:xfrm>
-          <a:prstGeom prst="rect">
-            <a:avLst/>
-          </a:prstGeom>
-          <a:noFill/>
-          <a:ln w="12600">
-            <a:noFill/>
-          </a:ln>
-        </p:spPr>
-        <p:style>
-          <a:lnRef idx="0"/>
-          <a:fillRef idx="0"/>
-          <a:effectRef idx="0"/>
-          <a:fontRef idx="minor"/>
-        </p:style>
-        <p:txBody>
-          <a:bodyPr lIns="0" rIns="0" tIns="0" bIns="0" anchor="ctr">
-            <a:noAutofit/>
-          </a:bodyPr>
-          <a:p>
             <a:pPr algn="ctr">
               <a:lnSpc>
                 <a:spcPct val="100000"/>
               </a:lnSpc>
             </a:pPr>
             <a:r>
-              <a:rPr b="0" lang="en-US" sz="8000" spc="-1" strike="noStrike">
+              <a:rPr b="1" lang="en-US" sz="5400" spc="-1" strike="noStrike">
                 <a:solidFill>
                   <a:srgbClr val="000000"/>
                 </a:solidFill>
-                <a:latin typeface="Franklin Gothic Book"/>
+                <a:latin typeface="Arial"/>
                 <a:ea typeface="Franklin Gothic Book"/>
               </a:rPr>
-              <a:t>Optimizari</a:t>
+              <a:t>Fasii de imagine </a:t>
             </a:r>
-            <a:endParaRPr b="0" lang="en-US" sz="8000" spc="-1" strike="noStrike">
-              <a:latin typeface="Arial"/>
-            </a:endParaRPr>
-          </a:p>
-        </p:txBody>
-      </p:sp>
-      <p:sp>
-        <p:nvSpPr>
-          <p:cNvPr id="252" name="CustomShape 3"/>
-          <p:cNvSpPr/>
+            <a:endParaRPr b="0" lang="en-US" sz="5400" spc="-1" strike="noStrike">
+              <a:latin typeface="Arial"/>
+            </a:endParaRPr>
+          </a:p>
+          <a:p>
+            <a:pPr algn="ctr">
+              <a:lnSpc>
+                <a:spcPct val="100000"/>
+              </a:lnSpc>
+            </a:pPr>
+            <a:r>
+              <a:rPr b="1" lang="en-US" sz="5400" spc="-1" strike="noStrike">
+                <a:solidFill>
+                  <a:srgbClr val="000000"/>
+                </a:solidFill>
+                <a:latin typeface="Arial"/>
+                <a:ea typeface="Franklin Gothic Book"/>
+              </a:rPr>
+              <a:t>(descompunere pe canale de culoare)</a:t>
+            </a:r>
+            <a:endParaRPr b="0" lang="en-US" sz="5400" spc="-1" strike="noStrike">
+              <a:latin typeface="Arial"/>
+            </a:endParaRPr>
+          </a:p>
+        </p:txBody>
+      </p:sp>
+      <p:pic>
+        <p:nvPicPr>
+          <p:cNvPr id="251" name="" descr=""/>
+          <p:cNvPicPr/>
           <p:nvPr/>
-        </p:nvSpPr>
-        <p:spPr>
-          <a:xfrm>
-            <a:off x="60120" y="9341640"/>
-            <a:ext cx="247320" cy="354600"/>
-          </a:xfrm>
-          <a:prstGeom prst="rect">
-            <a:avLst/>
-          </a:prstGeom>
-          <a:noFill/>
-          <a:ln w="12600">
+        </p:nvPicPr>
+        <p:blipFill>
+          <a:blip r:embed="rId1"/>
+          <a:stretch/>
+        </p:blipFill>
+        <p:spPr>
+          <a:xfrm>
+            <a:off x="457200" y="2743200"/>
+            <a:ext cx="6286320" cy="5495400"/>
+          </a:xfrm>
+          <a:prstGeom prst="rect">
+            <a:avLst/>
+          </a:prstGeom>
+          <a:ln>
             <a:noFill/>
           </a:ln>
         </p:spPr>
-        <p:style>
-          <a:lnRef idx="0"/>
-          <a:fillRef idx="0"/>
-          <a:effectRef idx="0"/>
-          <a:fontRef idx="minor"/>
-        </p:style>
-      </p:sp>
+      </p:pic>
+      <p:pic>
+        <p:nvPicPr>
+          <p:cNvPr id="252" name="" descr=""/>
+          <p:cNvPicPr/>
+          <p:nvPr/>
+        </p:nvPicPr>
+        <p:blipFill>
+          <a:blip r:embed="rId2"/>
+          <a:stretch/>
+        </p:blipFill>
+        <p:spPr>
+          <a:xfrm>
+            <a:off x="6743520" y="2734200"/>
+            <a:ext cx="6286320" cy="5495400"/>
+          </a:xfrm>
+          <a:prstGeom prst="rect">
+            <a:avLst/>
+          </a:prstGeom>
+          <a:ln>
+            <a:noFill/>
+          </a:ln>
+        </p:spPr>
+      </p:pic>
     </p:spTree>
   </p:cSld>
   <mc:AlternateContent>

</xml_diff>

<commit_message>
am exportat prezentarea ca PDF denumita Cristofor_Rotsching_AAC2_Harta_particule_elementare.pdf
</commit_message>
<xml_diff>
--- a/presentation/Cristofor_Rotsching_AAC2_Harta_particule_elementare.pptx
+++ b/presentation/Cristofor_Rotsching_AAC2_Harta_particule_elementare.pptx
@@ -6213,211 +6213,7 @@
               <a:rPr b="0" lang="en-US" sz="1800" spc="-1" strike="noStrike">
                 <a:latin typeface="Arial"/>
               </a:rPr>
-              <a:t>C</a:t>
-            </a:r>
-            <a:r>
-              <a:rPr b="0" lang="en-US" sz="1800" spc="-1" strike="noStrike">
-                <a:latin typeface="Arial"/>
-              </a:rPr>
-              <a:t>l</a:t>
-            </a:r>
-            <a:r>
-              <a:rPr b="0" lang="en-US" sz="1800" spc="-1" strike="noStrike">
-                <a:latin typeface="Arial"/>
-              </a:rPr>
-              <a:t>i</a:t>
-            </a:r>
-            <a:r>
-              <a:rPr b="0" lang="en-US" sz="1800" spc="-1" strike="noStrike">
-                <a:latin typeface="Arial"/>
-              </a:rPr>
-              <a:t>c</a:t>
-            </a:r>
-            <a:r>
-              <a:rPr b="0" lang="en-US" sz="1800" spc="-1" strike="noStrike">
-                <a:latin typeface="Arial"/>
-              </a:rPr>
-              <a:t>k</a:t>
-            </a:r>
-            <a:r>
-              <a:rPr b="0" lang="en-US" sz="1800" spc="-1" strike="noStrike">
-                <a:latin typeface="Arial"/>
-              </a:rPr>
-              <a:t> </a:t>
-            </a:r>
-            <a:r>
-              <a:rPr b="0" lang="en-US" sz="1800" spc="-1" strike="noStrike">
-                <a:latin typeface="Arial"/>
-              </a:rPr>
-              <a:t>t</a:t>
-            </a:r>
-            <a:r>
-              <a:rPr b="0" lang="en-US" sz="1800" spc="-1" strike="noStrike">
-                <a:latin typeface="Arial"/>
-              </a:rPr>
-              <a:t>o</a:t>
-            </a:r>
-            <a:r>
-              <a:rPr b="0" lang="en-US" sz="1800" spc="-1" strike="noStrike">
-                <a:latin typeface="Arial"/>
-              </a:rPr>
-              <a:t> </a:t>
-            </a:r>
-            <a:r>
-              <a:rPr b="0" lang="en-US" sz="1800" spc="-1" strike="noStrike">
-                <a:latin typeface="Arial"/>
-              </a:rPr>
-              <a:t>e</a:t>
-            </a:r>
-            <a:r>
-              <a:rPr b="0" lang="en-US" sz="1800" spc="-1" strike="noStrike">
-                <a:latin typeface="Arial"/>
-              </a:rPr>
-              <a:t>d</a:t>
-            </a:r>
-            <a:r>
-              <a:rPr b="0" lang="en-US" sz="1800" spc="-1" strike="noStrike">
-                <a:latin typeface="Arial"/>
-              </a:rPr>
-              <a:t>i</a:t>
-            </a:r>
-            <a:r>
-              <a:rPr b="0" lang="en-US" sz="1800" spc="-1" strike="noStrike">
-                <a:latin typeface="Arial"/>
-              </a:rPr>
-              <a:t>t</a:t>
-            </a:r>
-            <a:r>
-              <a:rPr b="0" lang="en-US" sz="1800" spc="-1" strike="noStrike">
-                <a:latin typeface="Arial"/>
-              </a:rPr>
-              <a:t> </a:t>
-            </a:r>
-            <a:r>
-              <a:rPr b="0" lang="en-US" sz="1800" spc="-1" strike="noStrike">
-                <a:latin typeface="Arial"/>
-              </a:rPr>
-              <a:t>t</a:t>
-            </a:r>
-            <a:r>
-              <a:rPr b="0" lang="en-US" sz="1800" spc="-1" strike="noStrike">
-                <a:latin typeface="Arial"/>
-              </a:rPr>
-              <a:t>h</a:t>
-            </a:r>
-            <a:r>
-              <a:rPr b="0" lang="en-US" sz="1800" spc="-1" strike="noStrike">
-                <a:latin typeface="Arial"/>
-              </a:rPr>
-              <a:t>e</a:t>
-            </a:r>
-            <a:r>
-              <a:rPr b="0" lang="en-US" sz="1800" spc="-1" strike="noStrike">
-                <a:latin typeface="Arial"/>
-              </a:rPr>
-              <a:t> </a:t>
-            </a:r>
-            <a:r>
-              <a:rPr b="0" lang="en-US" sz="1800" spc="-1" strike="noStrike">
-                <a:latin typeface="Arial"/>
-              </a:rPr>
-              <a:t>t</a:t>
-            </a:r>
-            <a:r>
-              <a:rPr b="0" lang="en-US" sz="1800" spc="-1" strike="noStrike">
-                <a:latin typeface="Arial"/>
-              </a:rPr>
-              <a:t>i</a:t>
-            </a:r>
-            <a:r>
-              <a:rPr b="0" lang="en-US" sz="1800" spc="-1" strike="noStrike">
-                <a:latin typeface="Arial"/>
-              </a:rPr>
-              <a:t>t</a:t>
-            </a:r>
-            <a:r>
-              <a:rPr b="0" lang="en-US" sz="1800" spc="-1" strike="noStrike">
-                <a:latin typeface="Arial"/>
-              </a:rPr>
-              <a:t>l</a:t>
-            </a:r>
-            <a:r>
-              <a:rPr b="0" lang="en-US" sz="1800" spc="-1" strike="noStrike">
-                <a:latin typeface="Arial"/>
-              </a:rPr>
-              <a:t>e</a:t>
-            </a:r>
-            <a:r>
-              <a:rPr b="0" lang="en-US" sz="1800" spc="-1" strike="noStrike">
-                <a:latin typeface="Arial"/>
-              </a:rPr>
-              <a:t> </a:t>
-            </a:r>
-            <a:r>
-              <a:rPr b="0" lang="en-US" sz="1800" spc="-1" strike="noStrike">
-                <a:latin typeface="Arial"/>
-              </a:rPr>
-              <a:t>t</a:t>
-            </a:r>
-            <a:r>
-              <a:rPr b="0" lang="en-US" sz="1800" spc="-1" strike="noStrike">
-                <a:latin typeface="Arial"/>
-              </a:rPr>
-              <a:t>e</a:t>
-            </a:r>
-            <a:r>
-              <a:rPr b="0" lang="en-US" sz="1800" spc="-1" strike="noStrike">
-                <a:latin typeface="Arial"/>
-              </a:rPr>
-              <a:t>x</a:t>
-            </a:r>
-            <a:r>
-              <a:rPr b="0" lang="en-US" sz="1800" spc="-1" strike="noStrike">
-                <a:latin typeface="Arial"/>
-              </a:rPr>
-              <a:t>t</a:t>
-            </a:r>
-            <a:r>
-              <a:rPr b="0" lang="en-US" sz="1800" spc="-1" strike="noStrike">
-                <a:latin typeface="Arial"/>
-              </a:rPr>
-              <a:t> </a:t>
-            </a:r>
-            <a:r>
-              <a:rPr b="0" lang="en-US" sz="1800" spc="-1" strike="noStrike">
-                <a:latin typeface="Arial"/>
-              </a:rPr>
-              <a:t>f</a:t>
-            </a:r>
-            <a:r>
-              <a:rPr b="0" lang="en-US" sz="1800" spc="-1" strike="noStrike">
-                <a:latin typeface="Arial"/>
-              </a:rPr>
-              <a:t>o</a:t>
-            </a:r>
-            <a:r>
-              <a:rPr b="0" lang="en-US" sz="1800" spc="-1" strike="noStrike">
-                <a:latin typeface="Arial"/>
-              </a:rPr>
-              <a:t>r</a:t>
-            </a:r>
-            <a:r>
-              <a:rPr b="0" lang="en-US" sz="1800" spc="-1" strike="noStrike">
-                <a:latin typeface="Arial"/>
-              </a:rPr>
-              <a:t>m</a:t>
-            </a:r>
-            <a:r>
-              <a:rPr b="0" lang="en-US" sz="1800" spc="-1" strike="noStrike">
-                <a:latin typeface="Arial"/>
-              </a:rPr>
-              <a:t>a</a:t>
-            </a:r>
-            <a:r>
-              <a:rPr b="0" lang="en-US" sz="1800" spc="-1" strike="noStrike">
-                <a:latin typeface="Arial"/>
-              </a:rPr>
-              <a:t>t</a:t>
+              <a:t>Click to edit the title text format</a:t>
             </a:r>
             <a:endParaRPr b="0" lang="en-US" sz="1800" spc="-1" strike="noStrike">
               <a:latin typeface="Arial"/>
@@ -7312,16 +7108,6 @@
                 <a:spcPct val="100000"/>
               </a:lnSpc>
             </a:pPr>
-            <a:r>
-              <a:rPr b="1" lang="en-US" sz="5400" spc="-1" strike="noStrike">
-                <a:solidFill>
-                  <a:srgbClr val="000000"/>
-                </a:solidFill>
-                <a:latin typeface="Arial"/>
-                <a:ea typeface="Franklin Gothic Book"/>
-              </a:rPr>
-              <a:t>(Functia Dirac delta)</a:t>
-            </a:r>
             <a:endParaRPr b="0" lang="en-US" sz="5400" spc="-1" strike="noStrike">
               <a:latin typeface="Arial"/>
             </a:endParaRPr>

</xml_diff>

<commit_message>
implemented rect(t) function from fundamentals of signal processing
</commit_message>
<xml_diff>
--- a/presentation/Cristofor_Rotsching_AAC2_Harta_particule_elementare.pptx
+++ b/presentation/Cristofor_Rotsching_AAC2_Harta_particule_elementare.pptx
@@ -21,6 +21,7 @@
     <p:sldId id="266" r:id="rId16"/>
     <p:sldId id="267" r:id="rId17"/>
     <p:sldId id="268" r:id="rId18"/>
+    <p:sldId id="269" r:id="rId19"/>
   </p:sldIdLst>
   <p:sldSz cx="13004800" cy="9753600"/>
   <p:notesSz cx="7559675" cy="10691812"/>
@@ -7149,8 +7150,8 @@
         </p:blipFill>
         <p:spPr>
           <a:xfrm>
-            <a:off x="6417000" y="2743200"/>
-            <a:ext cx="6293160" cy="5943600"/>
+            <a:off x="6417000" y="3840480"/>
+            <a:ext cx="6293160" cy="4023360"/>
           </a:xfrm>
           <a:prstGeom prst="rect">
             <a:avLst/>
@@ -7234,8 +7235,8 @@
         </p:nvSpPr>
         <p:spPr>
           <a:xfrm>
-            <a:off x="952560" y="2113200"/>
-            <a:ext cx="11098440" cy="3612240"/>
+            <a:off x="64080" y="457560"/>
+            <a:ext cx="13003560" cy="2157480"/>
           </a:xfrm>
           <a:prstGeom prst="rect">
             <a:avLst/>
@@ -7256,25 +7257,52 @@
             <a:noAutofit/>
           </a:bodyPr>
           <a:p>
-            <a:pPr marL="720" algn="ctr">
+            <a:pPr algn="ctr">
               <a:lnSpc>
                 <a:spcPct val="100000"/>
               </a:lnSpc>
-              <a:spcBef>
-                <a:spcPts val="1417"/>
-              </a:spcBef>
             </a:pPr>
             <a:r>
-              <a:rPr b="0" lang="en-US" sz="3600" spc="-1" strike="noStrike">
+              <a:rPr b="1" lang="en-US" sz="5400" spc="-1" strike="noStrike">
                 <a:solidFill>
                   <a:srgbClr val="000000"/>
                 </a:solidFill>
-                <a:latin typeface="Franklin Gothic Book"/>
+                <a:latin typeface="Arial"/>
                 <a:ea typeface="Franklin Gothic Book"/>
               </a:rPr>
-              <a:t>Generarea de imagine Elemental Dust Map folosind operatii paralele ce pot procesa semnalul de intrare sub forma unei imagini folosind metode de procesare paralele ale sistemului </a:t>
+              <a:t>Timpi de procesare</a:t>
             </a:r>
-            <a:endParaRPr b="0" lang="en-US" sz="3600" spc="-1" strike="noStrike">
+            <a:endParaRPr b="0" lang="en-US" sz="5400" spc="-1" strike="noStrike">
+              <a:latin typeface="Arial"/>
+            </a:endParaRPr>
+          </a:p>
+          <a:p>
+            <a:pPr algn="ctr">
+              <a:lnSpc>
+                <a:spcPct val="100000"/>
+              </a:lnSpc>
+            </a:pPr>
+            <a:r>
+              <a:rPr b="1" lang="en-US" sz="5400" spc="-1" strike="noStrike">
+                <a:solidFill>
+                  <a:srgbClr val="000000"/>
+                </a:solidFill>
+                <a:latin typeface="Arial"/>
+                <a:ea typeface="Franklin Gothic Book"/>
+              </a:rPr>
+              <a:t>Fasii de imagine</a:t>
+            </a:r>
+            <a:endParaRPr b="0" lang="en-US" sz="5400" spc="-1" strike="noStrike">
+              <a:latin typeface="Arial"/>
+            </a:endParaRPr>
+          </a:p>
+          <a:p>
+            <a:pPr algn="ctr">
+              <a:lnSpc>
+                <a:spcPct val="100000"/>
+              </a:lnSpc>
+            </a:pPr>
+            <a:endParaRPr b="0" lang="en-US" sz="5400" spc="-1" strike="noStrike">
               <a:latin typeface="Arial"/>
             </a:endParaRPr>
           </a:p>
@@ -7288,8 +7316,8 @@
         </p:nvSpPr>
         <p:spPr>
           <a:xfrm>
-            <a:off x="952560" y="444600"/>
-            <a:ext cx="11098440" cy="2157480"/>
+            <a:off x="8125200" y="4831920"/>
+            <a:ext cx="13003560" cy="2157480"/>
           </a:xfrm>
           <a:prstGeom prst="rect">
             <a:avLst/>
@@ -7305,42 +7333,37 @@
           <a:effectRef idx="0"/>
           <a:fontRef idx="minor"/>
         </p:style>
-        <p:txBody>
-          <a:bodyPr lIns="0" rIns="0" tIns="0" bIns="0" anchor="ctr">
-            <a:noAutofit/>
-          </a:bodyPr>
-          <a:p>
-            <a:pPr algn="ctr">
-              <a:lnSpc>
-                <a:spcPct val="100000"/>
-              </a:lnSpc>
-            </a:pPr>
-            <a:r>
-              <a:rPr b="0" lang="en-US" sz="8000" spc="-1" strike="noStrike">
-                <a:solidFill>
-                  <a:srgbClr val="000000"/>
-                </a:solidFill>
-                <a:latin typeface="Franklin Gothic Book"/>
-                <a:ea typeface="Franklin Gothic Book"/>
-              </a:rPr>
-              <a:t>Optimizari</a:t>
-            </a:r>
-            <a:endParaRPr b="0" lang="en-US" sz="8000" spc="-1" strike="noStrike">
-              <a:latin typeface="Arial"/>
-            </a:endParaRPr>
-          </a:p>
-        </p:txBody>
-      </p:sp>
-      <p:sp>
-        <p:nvSpPr>
-          <p:cNvPr id="259" name="CustomShape 3"/>
+      </p:sp>
+      <p:sp>
+        <p:nvSpPr>
+          <p:cNvPr id="259" name="TextShape 3"/>
+          <p:cNvSpPr txBox="1"/>
+          <p:nvPr/>
+        </p:nvSpPr>
+        <p:spPr>
+          <a:xfrm>
+            <a:off x="1463040" y="6309360"/>
+            <a:ext cx="4480560" cy="346320"/>
+          </a:xfrm>
+          <a:prstGeom prst="rect">
+            <a:avLst/>
+          </a:prstGeom>
+          <a:noFill/>
+          <a:ln>
+            <a:noFill/>
+          </a:ln>
+        </p:spPr>
+      </p:sp>
+      <p:sp>
+        <p:nvSpPr>
+          <p:cNvPr id="260" name="CustomShape 4"/>
           <p:cNvSpPr/>
           <p:nvPr/>
         </p:nvSpPr>
         <p:spPr>
           <a:xfrm>
-            <a:off x="60120" y="9341640"/>
-            <a:ext cx="246960" cy="354240"/>
+            <a:off x="3867480" y="1813680"/>
+            <a:ext cx="13003560" cy="2157480"/>
           </a:xfrm>
           <a:prstGeom prst="rect">
             <a:avLst/>
@@ -7357,6 +7380,161 @@
           <a:fontRef idx="minor"/>
         </p:style>
       </p:sp>
+      <p:sp>
+        <p:nvSpPr>
+          <p:cNvPr id="261" name="TextShape 5"/>
+          <p:cNvSpPr txBox="1"/>
+          <p:nvPr/>
+        </p:nvSpPr>
+        <p:spPr>
+          <a:xfrm>
+            <a:off x="2103120" y="7315200"/>
+            <a:ext cx="3657600" cy="858240"/>
+          </a:xfrm>
+          <a:prstGeom prst="rect">
+            <a:avLst/>
+          </a:prstGeom>
+          <a:noFill/>
+          <a:ln>
+            <a:noFill/>
+          </a:ln>
+        </p:spPr>
+        <p:txBody>
+          <a:bodyPr lIns="90000" rIns="90000" tIns="45000" bIns="45000">
+            <a:noAutofit/>
+          </a:bodyPr>
+          <a:p>
+            <a:r>
+              <a:rPr b="0" lang="en-US" sz="1800" spc="-1" strike="noStrike">
+                <a:latin typeface="Arial"/>
+              </a:rPr>
+              <a:t>26.80814290046692 s</a:t>
+            </a:r>
+            <a:endParaRPr b="0" lang="en-US" sz="1800" spc="-1" strike="noStrike">
+              <a:latin typeface="Arial"/>
+            </a:endParaRPr>
+          </a:p>
+          <a:p>
+            <a:endParaRPr b="0" lang="en-US" sz="1800" spc="-1" strike="noStrike">
+              <a:latin typeface="Arial"/>
+            </a:endParaRPr>
+          </a:p>
+          <a:p>
+            <a:r>
+              <a:rPr b="0" lang="en-US" sz="1800" spc="-1" strike="noStrike">
+                <a:latin typeface="Arial"/>
+              </a:rPr>
+              <a:t>1213x1126 x 3</a:t>
+            </a:r>
+            <a:endParaRPr b="0" lang="en-US" sz="1800" spc="-1" strike="noStrike">
+              <a:latin typeface="Arial"/>
+            </a:endParaRPr>
+          </a:p>
+        </p:txBody>
+      </p:sp>
+      <p:sp>
+        <p:nvSpPr>
+          <p:cNvPr id="262" name="TextShape 6"/>
+          <p:cNvSpPr txBox="1"/>
+          <p:nvPr/>
+        </p:nvSpPr>
+        <p:spPr>
+          <a:xfrm>
+            <a:off x="7498080" y="7406640"/>
+            <a:ext cx="1658880" cy="858240"/>
+          </a:xfrm>
+          <a:prstGeom prst="rect">
+            <a:avLst/>
+          </a:prstGeom>
+          <a:noFill/>
+          <a:ln>
+            <a:noFill/>
+          </a:ln>
+        </p:spPr>
+        <p:txBody>
+          <a:bodyPr lIns="90000" rIns="90000" tIns="45000" bIns="45000">
+            <a:noAutofit/>
+          </a:bodyPr>
+          <a:p>
+            <a:r>
+              <a:rPr b="0" lang="en-US" sz="1800" spc="-1" strike="noStrike">
+                <a:latin typeface="Arial"/>
+              </a:rPr>
+              <a:t>5.4 s</a:t>
+            </a:r>
+            <a:endParaRPr b="0" lang="en-US" sz="1800" spc="-1" strike="noStrike">
+              <a:latin typeface="Arial"/>
+            </a:endParaRPr>
+          </a:p>
+          <a:p>
+            <a:endParaRPr b="0" lang="en-US" sz="1800" spc="-1" strike="noStrike">
+              <a:latin typeface="Arial"/>
+            </a:endParaRPr>
+          </a:p>
+          <a:p>
+            <a:pPr>
+              <a:lnSpc>
+                <a:spcPct val="100000"/>
+              </a:lnSpc>
+            </a:pPr>
+            <a:r>
+              <a:rPr b="0" lang="en-US" sz="1800" spc="-1" strike="noStrike">
+                <a:latin typeface="Arial"/>
+              </a:rPr>
+              <a:t>1213x1126 x 3</a:t>
+            </a:r>
+            <a:endParaRPr b="0" lang="en-US" sz="1800" spc="-1" strike="noStrike">
+              <a:latin typeface="Arial"/>
+            </a:endParaRPr>
+          </a:p>
+        </p:txBody>
+      </p:sp>
+      <p:pic>
+        <p:nvPicPr>
+          <p:cNvPr id="263" name="" descr=""/>
+          <p:cNvPicPr/>
+          <p:nvPr/>
+        </p:nvPicPr>
+        <p:blipFill>
+          <a:blip r:embed="rId1"/>
+          <a:stretch/>
+        </p:blipFill>
+        <p:spPr>
+          <a:xfrm>
+            <a:off x="548640" y="1828800"/>
+            <a:ext cx="6286320" cy="5495400"/>
+          </a:xfrm>
+          <a:prstGeom prst="rect">
+            <a:avLst/>
+          </a:prstGeom>
+          <a:ln>
+            <a:noFill/>
+          </a:ln>
+        </p:spPr>
+      </p:pic>
+      <p:pic>
+        <p:nvPicPr>
+          <p:cNvPr id="264" name="" descr=""/>
+          <p:cNvPicPr/>
+          <p:nvPr/>
+        </p:nvPicPr>
+        <p:blipFill>
+          <a:blip r:embed="rId2"/>
+          <a:stretch/>
+        </p:blipFill>
+        <p:spPr>
+          <a:xfrm>
+            <a:off x="6720480" y="1801440"/>
+            <a:ext cx="6286320" cy="5495400"/>
+          </a:xfrm>
+          <a:prstGeom prst="rect">
+            <a:avLst/>
+          </a:prstGeom>
+          <a:ln>
+            <a:noFill/>
+          </a:ln>
+        </p:spPr>
+      </p:pic>
     </p:spTree>
   </p:cSld>
   <mc:AlternateContent>
@@ -7389,7 +7567,168 @@
       </p:grpSpPr>
       <p:sp>
         <p:nvSpPr>
-          <p:cNvPr id="260" name="CustomShape 1"/>
+          <p:cNvPr id="265" name="CustomShape 1"/>
+          <p:cNvSpPr/>
+          <p:nvPr/>
+        </p:nvSpPr>
+        <p:spPr>
+          <a:xfrm>
+            <a:off x="952560" y="2113200"/>
+            <a:ext cx="11098440" cy="3612240"/>
+          </a:xfrm>
+          <a:prstGeom prst="rect">
+            <a:avLst/>
+          </a:prstGeom>
+          <a:noFill/>
+          <a:ln w="12600">
+            <a:noFill/>
+          </a:ln>
+        </p:spPr>
+        <p:style>
+          <a:lnRef idx="0"/>
+          <a:fillRef idx="0"/>
+          <a:effectRef idx="0"/>
+          <a:fontRef idx="minor"/>
+        </p:style>
+        <p:txBody>
+          <a:bodyPr lIns="0" rIns="0" tIns="0" bIns="0" anchor="ctr">
+            <a:noAutofit/>
+          </a:bodyPr>
+          <a:p>
+            <a:pPr marL="720" algn="ctr">
+              <a:lnSpc>
+                <a:spcPct val="100000"/>
+              </a:lnSpc>
+              <a:spcBef>
+                <a:spcPts val="1417"/>
+              </a:spcBef>
+            </a:pPr>
+            <a:r>
+              <a:rPr b="0" lang="en-US" sz="3600" spc="-1" strike="noStrike">
+                <a:solidFill>
+                  <a:srgbClr val="000000"/>
+                </a:solidFill>
+                <a:latin typeface="Franklin Gothic Book"/>
+                <a:ea typeface="Franklin Gothic Book"/>
+              </a:rPr>
+              <a:t>Generarea de imagine Elemental Dust Map folosind operatii paralele ce pot procesa semnalul de intrare sub forma unei imagini folosind metode de procesare paralele ale sistemului </a:t>
+            </a:r>
+            <a:endParaRPr b="0" lang="en-US" sz="3600" spc="-1" strike="noStrike">
+              <a:latin typeface="Arial"/>
+            </a:endParaRPr>
+          </a:p>
+        </p:txBody>
+      </p:sp>
+      <p:sp>
+        <p:nvSpPr>
+          <p:cNvPr id="266" name="CustomShape 2"/>
+          <p:cNvSpPr/>
+          <p:nvPr/>
+        </p:nvSpPr>
+        <p:spPr>
+          <a:xfrm>
+            <a:off x="952560" y="444600"/>
+            <a:ext cx="11098440" cy="2157480"/>
+          </a:xfrm>
+          <a:prstGeom prst="rect">
+            <a:avLst/>
+          </a:prstGeom>
+          <a:noFill/>
+          <a:ln w="12600">
+            <a:noFill/>
+          </a:ln>
+        </p:spPr>
+        <p:style>
+          <a:lnRef idx="0"/>
+          <a:fillRef idx="0"/>
+          <a:effectRef idx="0"/>
+          <a:fontRef idx="minor"/>
+        </p:style>
+        <p:txBody>
+          <a:bodyPr lIns="0" rIns="0" tIns="0" bIns="0" anchor="ctr">
+            <a:noAutofit/>
+          </a:bodyPr>
+          <a:p>
+            <a:pPr algn="ctr">
+              <a:lnSpc>
+                <a:spcPct val="100000"/>
+              </a:lnSpc>
+            </a:pPr>
+            <a:r>
+              <a:rPr b="0" lang="en-US" sz="8000" spc="-1" strike="noStrike">
+                <a:solidFill>
+                  <a:srgbClr val="000000"/>
+                </a:solidFill>
+                <a:latin typeface="Franklin Gothic Book"/>
+                <a:ea typeface="Franklin Gothic Book"/>
+              </a:rPr>
+              <a:t>Optimizari</a:t>
+            </a:r>
+            <a:endParaRPr b="0" lang="en-US" sz="8000" spc="-1" strike="noStrike">
+              <a:latin typeface="Arial"/>
+            </a:endParaRPr>
+          </a:p>
+        </p:txBody>
+      </p:sp>
+      <p:sp>
+        <p:nvSpPr>
+          <p:cNvPr id="267" name="CustomShape 3"/>
+          <p:cNvSpPr/>
+          <p:nvPr/>
+        </p:nvSpPr>
+        <p:spPr>
+          <a:xfrm>
+            <a:off x="60120" y="9341640"/>
+            <a:ext cx="246960" cy="354240"/>
+          </a:xfrm>
+          <a:prstGeom prst="rect">
+            <a:avLst/>
+          </a:prstGeom>
+          <a:noFill/>
+          <a:ln w="12600">
+            <a:noFill/>
+          </a:ln>
+        </p:spPr>
+        <p:style>
+          <a:lnRef idx="0"/>
+          <a:fillRef idx="0"/>
+          <a:effectRef idx="0"/>
+          <a:fontRef idx="minor"/>
+        </p:style>
+      </p:sp>
+    </p:spTree>
+  </p:cSld>
+  <mc:AlternateContent>
+    <mc:Choice Requires="p14">
+      <p:transition spd="slow" p14:dur="2000"/>
+    </mc:Choice>
+    <mc:Fallback>
+      <p:transition spd="slow"/>
+    </mc:Fallback>
+  </mc:AlternateContent>
+</p:sld>
+</file>
+
+<file path=ppt/slides/slide13.xml><?xml version="1.0" encoding="utf-8"?>
+<p:sld xmlns:a="http://schemas.openxmlformats.org/drawingml/2006/main" xmlns:p="http://schemas.openxmlformats.org/presentationml/2006/main" xmlns:r="http://schemas.openxmlformats.org/officeDocument/2006/relationships" xmlns:p14="http://schemas.microsoft.com/office/powerpoint/2010/main" xmlns:p15="http://schemas.microsoft.com/office/powerpoint/2012/main" xmlns:mc="http://schemas.openxmlformats.org/markup-compatibility/2006">
+  <p:cSld>
+    <p:spTree>
+      <p:nvGrpSpPr>
+        <p:cNvPr id="1" name=""/>
+        <p:cNvGrpSpPr/>
+        <p:nvPr/>
+      </p:nvGrpSpPr>
+      <p:grpSpPr>
+        <a:xfrm>
+          <a:off x="0" y="0"/>
+          <a:ext cx="0" cy="0"/>
+          <a:chOff x="0" y="0"/>
+          <a:chExt cx="0" cy="0"/>
+        </a:xfrm>
+      </p:grpSpPr>
+      <p:sp>
+        <p:nvSpPr>
+          <p:cNvPr id="268" name="CustomShape 1"/>
           <p:cNvSpPr/>
           <p:nvPr/>
         </p:nvSpPr>
@@ -7455,11 +7794,30 @@
               <a:latin typeface="Arial"/>
             </a:endParaRPr>
           </a:p>
-        </p:txBody>
-      </p:sp>
-      <p:sp>
-        <p:nvSpPr>
-          <p:cNvPr id="261" name="CustomShape 2"/>
+          <a:p>
+            <a:pPr marL="444600" indent="-443160">
+              <a:lnSpc>
+                <a:spcPct val="100000"/>
+              </a:lnSpc>
+              <a:spcBef>
+                <a:spcPts val="4201"/>
+              </a:spcBef>
+              <a:buClr>
+                <a:srgbClr val="000000"/>
+              </a:buClr>
+              <a:buSzPct val="75000"/>
+              <a:buFont typeface="Symbol"/>
+              <a:buChar char=""/>
+            </a:pPr>
+            <a:endParaRPr b="0" lang="en-US" sz="2000" spc="-1" strike="noStrike">
+              <a:latin typeface="Arial"/>
+            </a:endParaRPr>
+          </a:p>
+        </p:txBody>
+      </p:sp>
+      <p:sp>
+        <p:nvSpPr>
+          <p:cNvPr id="269" name="CustomShape 2"/>
           <p:cNvSpPr/>
           <p:nvPr/>
         </p:nvSpPr>
@@ -7510,7 +7868,7 @@
       </p:sp>
       <p:sp>
         <p:nvSpPr>
-          <p:cNvPr id="262" name="CustomShape 3"/>
+          <p:cNvPr id="270" name="CustomShape 3"/>
           <p:cNvSpPr/>
           <p:nvPr/>
         </p:nvSpPr>
@@ -7547,7 +7905,7 @@
 </p:sld>
 </file>
 
-<file path=ppt/slides/slide13.xml><?xml version="1.0" encoding="utf-8"?>
+<file path=ppt/slides/slide14.xml><?xml version="1.0" encoding="utf-8"?>
 <p:sld xmlns:a="http://schemas.openxmlformats.org/drawingml/2006/main" xmlns:p="http://schemas.openxmlformats.org/presentationml/2006/main" xmlns:r="http://schemas.openxmlformats.org/officeDocument/2006/relationships" xmlns:p14="http://schemas.microsoft.com/office/powerpoint/2010/main" xmlns:p15="http://schemas.microsoft.com/office/powerpoint/2012/main" xmlns:mc="http://schemas.openxmlformats.org/markup-compatibility/2006">
   <p:cSld>
     <p:spTree>
@@ -7566,7 +7924,7 @@
       </p:grpSpPr>
       <p:sp>
         <p:nvSpPr>
-          <p:cNvPr id="263" name="CustomShape 1"/>
+          <p:cNvPr id="271" name="CustomShape 1"/>
           <p:cNvSpPr/>
           <p:nvPr/>
         </p:nvSpPr>
@@ -7637,7 +7995,7 @@
       </p:sp>
       <p:sp>
         <p:nvSpPr>
-          <p:cNvPr id="264" name="CustomShape 2"/>
+          <p:cNvPr id="272" name="CustomShape 2"/>
           <p:cNvSpPr/>
           <p:nvPr/>
         </p:nvSpPr>

</xml_diff>